<commit_message>
Modified Nav Bar Image & Modified PPT
</commit_message>
<xml_diff>
--- a/DB_Mgmt_Final_PPT.pptx
+++ b/DB_Mgmt_Final_PPT.pptx
@@ -114,7 +114,16 @@
       </a:defRPr>
     </a:lvl9pPr>
   </p:defaultTextStyle>
+  <p:extLst>
+    <p:ext uri="{EFAFB233-063F-42B5-8137-9DF3F51BA10A}">
+      <p15:sldGuideLst xmlns:p15="http://schemas.microsoft.com/office/powerpoint/2012/main"/>
+    </p:ext>
+  </p:extLst>
 </p:presentation>
+</file>
+
+<file path=ppt/revisionInfo.xml><?xml version="1.0" encoding="utf-8"?>
+<p1510:revInfo xmlns:a="http://schemas.openxmlformats.org/drawingml/2006/main" xmlns:r="http://schemas.openxmlformats.org/officeDocument/2006/relationships" xmlns:p1510="http://schemas.microsoft.com/office/powerpoint/2015/10/main"/>
 </file>
 
 <file path=ppt/slideLayouts/slideLayout1.xml><?xml version="1.0" encoding="utf-8"?>
@@ -303,7 +312,7 @@
           <a:p>
             <a:fld id="{4AAD347D-5ACD-4C99-B74B-A9C85AD731AF}" type="datetimeFigureOut">
               <a:rPr lang="en-US" dirty="0"/>
-              <a:t>12/10/2017</a:t>
+              <a:t>12/11/2017</a:t>
             </a:fld>
             <a:endParaRPr lang="en-US" dirty="0"/>
           </a:p>
@@ -573,7 +582,7 @@
           <a:p>
             <a:fld id="{4509A250-FF31-4206-8172-F9D3106AACB1}" type="datetimeFigureOut">
               <a:rPr lang="en-US" dirty="0"/>
-              <a:t>12/10/2017</a:t>
+              <a:t>12/11/2017</a:t>
             </a:fld>
             <a:endParaRPr lang="en-US" dirty="0"/>
           </a:p>
@@ -762,7 +771,7 @@
           <a:p>
             <a:fld id="{4509A250-FF31-4206-8172-F9D3106AACB1}" type="datetimeFigureOut">
               <a:rPr lang="en-US" dirty="0"/>
-              <a:t>12/10/2017</a:t>
+              <a:t>12/11/2017</a:t>
             </a:fld>
             <a:endParaRPr lang="en-US" dirty="0"/>
           </a:p>
@@ -1030,7 +1039,7 @@
           <a:p>
             <a:fld id="{4509A250-FF31-4206-8172-F9D3106AACB1}" type="datetimeFigureOut">
               <a:rPr lang="en-US" dirty="0"/>
-              <a:t>12/10/2017</a:t>
+              <a:t>12/11/2017</a:t>
             </a:fld>
             <a:endParaRPr lang="en-US" dirty="0"/>
           </a:p>
@@ -1366,7 +1375,7 @@
           <a:p>
             <a:fld id="{4509A250-FF31-4206-8172-F9D3106AACB1}" type="datetimeFigureOut">
               <a:rPr lang="en-US" dirty="0"/>
-              <a:t>12/10/2017</a:t>
+              <a:t>12/11/2017</a:t>
             </a:fld>
             <a:endParaRPr lang="en-US" dirty="0"/>
           </a:p>
@@ -1984,7 +1993,7 @@
           <a:p>
             <a:fld id="{4509A250-FF31-4206-8172-F9D3106AACB1}" type="datetimeFigureOut">
               <a:rPr lang="en-US" dirty="0"/>
-              <a:t>12/10/2017</a:t>
+              <a:t>12/11/2017</a:t>
             </a:fld>
             <a:endParaRPr lang="en-US" dirty="0"/>
           </a:p>
@@ -2839,7 +2848,7 @@
           <a:p>
             <a:fld id="{4509A250-FF31-4206-8172-F9D3106AACB1}" type="datetimeFigureOut">
               <a:rPr lang="en-US" dirty="0"/>
-              <a:t>12/10/2017</a:t>
+              <a:t>12/11/2017</a:t>
             </a:fld>
             <a:endParaRPr lang="en-US" dirty="0"/>
           </a:p>
@@ -3004,7 +3013,7 @@
           <a:p>
             <a:fld id="{4509A250-FF31-4206-8172-F9D3106AACB1}" type="datetimeFigureOut">
               <a:rPr lang="en-US" dirty="0"/>
-              <a:t>12/10/2017</a:t>
+              <a:t>12/11/2017</a:t>
             </a:fld>
             <a:endParaRPr lang="en-US" dirty="0"/>
           </a:p>
@@ -3179,7 +3188,7 @@
           <a:p>
             <a:fld id="{4509A250-FF31-4206-8172-F9D3106AACB1}" type="datetimeFigureOut">
               <a:rPr lang="en-US" dirty="0"/>
-              <a:t>12/10/2017</a:t>
+              <a:t>12/11/2017</a:t>
             </a:fld>
             <a:endParaRPr lang="en-US" dirty="0"/>
           </a:p>
@@ -3344,7 +3353,7 @@
           <a:p>
             <a:fld id="{4509A250-FF31-4206-8172-F9D3106AACB1}" type="datetimeFigureOut">
               <a:rPr lang="en-US" dirty="0"/>
-              <a:t>12/10/2017</a:t>
+              <a:t>12/11/2017</a:t>
             </a:fld>
             <a:endParaRPr lang="en-US" dirty="0"/>
           </a:p>
@@ -3586,7 +3595,7 @@
           <a:p>
             <a:fld id="{9796027F-7875-4030-9381-8BD8C4F21935}" type="datetimeFigureOut">
               <a:rPr lang="en-US" dirty="0"/>
-              <a:t>12/10/2017</a:t>
+              <a:t>12/11/2017</a:t>
             </a:fld>
             <a:endParaRPr lang="en-US" dirty="0"/>
           </a:p>
@@ -3873,7 +3882,7 @@
           <a:p>
             <a:fld id="{9796027F-7875-4030-9381-8BD8C4F21935}" type="datetimeFigureOut">
               <a:rPr lang="en-US" dirty="0"/>
-              <a:t>12/10/2017</a:t>
+              <a:t>12/11/2017</a:t>
             </a:fld>
             <a:endParaRPr lang="en-US" dirty="0"/>
           </a:p>
@@ -4312,7 +4321,7 @@
           <a:p>
             <a:fld id="{9796027F-7875-4030-9381-8BD8C4F21935}" type="datetimeFigureOut">
               <a:rPr lang="en-US" dirty="0"/>
-              <a:t>12/10/2017</a:t>
+              <a:t>12/11/2017</a:t>
             </a:fld>
             <a:endParaRPr lang="en-US" dirty="0"/>
           </a:p>
@@ -4425,7 +4434,7 @@
           <a:p>
             <a:fld id="{4509A250-FF31-4206-8172-F9D3106AACB1}" type="datetimeFigureOut">
               <a:rPr lang="en-US" dirty="0"/>
-              <a:t>12/10/2017</a:t>
+              <a:t>12/11/2017</a:t>
             </a:fld>
             <a:endParaRPr lang="en-US" dirty="0"/>
           </a:p>
@@ -4515,7 +4524,7 @@
           <a:p>
             <a:fld id="{4509A250-FF31-4206-8172-F9D3106AACB1}" type="datetimeFigureOut">
               <a:rPr lang="en-US" dirty="0"/>
-              <a:t>12/10/2017</a:t>
+              <a:t>12/11/2017</a:t>
             </a:fld>
             <a:endParaRPr lang="en-US" dirty="0"/>
           </a:p>
@@ -4789,7 +4798,7 @@
           <a:p>
             <a:fld id="{4509A250-FF31-4206-8172-F9D3106AACB1}" type="datetimeFigureOut">
               <a:rPr lang="en-US" dirty="0"/>
-              <a:t>12/10/2017</a:t>
+              <a:t>12/11/2017</a:t>
             </a:fld>
             <a:endParaRPr lang="en-US" dirty="0"/>
           </a:p>
@@ -5059,7 +5068,7 @@
           <a:p>
             <a:fld id="{4509A250-FF31-4206-8172-F9D3106AACB1}" type="datetimeFigureOut">
               <a:rPr lang="en-US" dirty="0"/>
-              <a:t>12/10/2017</a:t>
+              <a:t>12/11/2017</a:t>
             </a:fld>
             <a:endParaRPr lang="en-US" dirty="0"/>
           </a:p>
@@ -5483,7 +5492,7 @@
           <a:p>
             <a:fld id="{4AAD347D-5ACD-4C99-B74B-A9C85AD731AF}" type="datetimeFigureOut">
               <a:rPr lang="en-US" dirty="0"/>
-              <a:t>12/10/2017</a:t>
+              <a:t>12/11/2017</a:t>
             </a:fld>
             <a:endParaRPr lang="en-US" dirty="0"/>
           </a:p>
@@ -6478,7 +6487,7 @@
           <p:nvPr>
             <p:extLst>
               <p:ext uri="{D42A27DB-BD31-4B8C-83A1-F6EECF244321}">
-                <p14:modId xmlns:p14="http://schemas.microsoft.com/office/powerpoint/2010/main" val="1274901471"/>
+                <p14:modId xmlns:p14="http://schemas.microsoft.com/office/powerpoint/2010/main" val="140797090"/>
               </p:ext>
             </p:extLst>
           </p:nvPr>
@@ -6618,7 +6627,7 @@
                           <a:ea typeface="+mn-ea"/>
                           <a:cs typeface="+mn-cs"/>
                         </a:rPr>
-                        <a:t>5¢</a:t>
+                        <a:t>$0.0075</a:t>
                       </a:r>
                       <a:endParaRPr lang="en-US" sz="2400" b="1" dirty="0"/>
                     </a:p>

</xml_diff>

<commit_message>
Updated Query slides in PPT: Simplified
</commit_message>
<xml_diff>
--- a/DB_Mgmt_Final_PPT.pptx
+++ b/DB_Mgmt_Final_PPT.pptx
@@ -10,12 +10,15 @@
     <p:sldId id="266" r:id="rId4"/>
     <p:sldId id="258" r:id="rId5"/>
     <p:sldId id="259" r:id="rId6"/>
-    <p:sldId id="260" r:id="rId7"/>
-    <p:sldId id="267" r:id="rId8"/>
-    <p:sldId id="261" r:id="rId9"/>
-    <p:sldId id="262" r:id="rId10"/>
-    <p:sldId id="263" r:id="rId11"/>
-    <p:sldId id="265" r:id="rId12"/>
+    <p:sldId id="261" r:id="rId7"/>
+    <p:sldId id="262" r:id="rId8"/>
+    <p:sldId id="263" r:id="rId9"/>
+    <p:sldId id="265" r:id="rId10"/>
+    <p:sldId id="268" r:id="rId11"/>
+    <p:sldId id="269" r:id="rId12"/>
+    <p:sldId id="270" r:id="rId13"/>
+    <p:sldId id="271" r:id="rId14"/>
+    <p:sldId id="272" r:id="rId15"/>
   </p:sldIdLst>
   <p:sldSz cx="12192000" cy="6858000"/>
   <p:notesSz cx="6858000" cy="9144000"/>
@@ -312,7 +315,7 @@
           <a:p>
             <a:fld id="{4AAD347D-5ACD-4C99-B74B-A9C85AD731AF}" type="datetimeFigureOut">
               <a:rPr lang="en-US" dirty="0"/>
-              <a:t>12/11/2017</a:t>
+              <a:t>12/12/2017</a:t>
             </a:fld>
             <a:endParaRPr lang="en-US" dirty="0"/>
           </a:p>
@@ -582,7 +585,7 @@
           <a:p>
             <a:fld id="{4509A250-FF31-4206-8172-F9D3106AACB1}" type="datetimeFigureOut">
               <a:rPr lang="en-US" dirty="0"/>
-              <a:t>12/11/2017</a:t>
+              <a:t>12/12/2017</a:t>
             </a:fld>
             <a:endParaRPr lang="en-US" dirty="0"/>
           </a:p>
@@ -771,7 +774,7 @@
           <a:p>
             <a:fld id="{4509A250-FF31-4206-8172-F9D3106AACB1}" type="datetimeFigureOut">
               <a:rPr lang="en-US" dirty="0"/>
-              <a:t>12/11/2017</a:t>
+              <a:t>12/12/2017</a:t>
             </a:fld>
             <a:endParaRPr lang="en-US" dirty="0"/>
           </a:p>
@@ -1039,7 +1042,7 @@
           <a:p>
             <a:fld id="{4509A250-FF31-4206-8172-F9D3106AACB1}" type="datetimeFigureOut">
               <a:rPr lang="en-US" dirty="0"/>
-              <a:t>12/11/2017</a:t>
+              <a:t>12/12/2017</a:t>
             </a:fld>
             <a:endParaRPr lang="en-US" dirty="0"/>
           </a:p>
@@ -1375,7 +1378,7 @@
           <a:p>
             <a:fld id="{4509A250-FF31-4206-8172-F9D3106AACB1}" type="datetimeFigureOut">
               <a:rPr lang="en-US" dirty="0"/>
-              <a:t>12/11/2017</a:t>
+              <a:t>12/12/2017</a:t>
             </a:fld>
             <a:endParaRPr lang="en-US" dirty="0"/>
           </a:p>
@@ -1993,7 +1996,7 @@
           <a:p>
             <a:fld id="{4509A250-FF31-4206-8172-F9D3106AACB1}" type="datetimeFigureOut">
               <a:rPr lang="en-US" dirty="0"/>
-              <a:t>12/11/2017</a:t>
+              <a:t>12/12/2017</a:t>
             </a:fld>
             <a:endParaRPr lang="en-US" dirty="0"/>
           </a:p>
@@ -2848,7 +2851,7 @@
           <a:p>
             <a:fld id="{4509A250-FF31-4206-8172-F9D3106AACB1}" type="datetimeFigureOut">
               <a:rPr lang="en-US" dirty="0"/>
-              <a:t>12/11/2017</a:t>
+              <a:t>12/12/2017</a:t>
             </a:fld>
             <a:endParaRPr lang="en-US" dirty="0"/>
           </a:p>
@@ -3013,7 +3016,7 @@
           <a:p>
             <a:fld id="{4509A250-FF31-4206-8172-F9D3106AACB1}" type="datetimeFigureOut">
               <a:rPr lang="en-US" dirty="0"/>
-              <a:t>12/11/2017</a:t>
+              <a:t>12/12/2017</a:t>
             </a:fld>
             <a:endParaRPr lang="en-US" dirty="0"/>
           </a:p>
@@ -3188,7 +3191,7 @@
           <a:p>
             <a:fld id="{4509A250-FF31-4206-8172-F9D3106AACB1}" type="datetimeFigureOut">
               <a:rPr lang="en-US" dirty="0"/>
-              <a:t>12/11/2017</a:t>
+              <a:t>12/12/2017</a:t>
             </a:fld>
             <a:endParaRPr lang="en-US" dirty="0"/>
           </a:p>
@@ -3353,7 +3356,7 @@
           <a:p>
             <a:fld id="{4509A250-FF31-4206-8172-F9D3106AACB1}" type="datetimeFigureOut">
               <a:rPr lang="en-US" dirty="0"/>
-              <a:t>12/11/2017</a:t>
+              <a:t>12/12/2017</a:t>
             </a:fld>
             <a:endParaRPr lang="en-US" dirty="0"/>
           </a:p>
@@ -3595,7 +3598,7 @@
           <a:p>
             <a:fld id="{9796027F-7875-4030-9381-8BD8C4F21935}" type="datetimeFigureOut">
               <a:rPr lang="en-US" dirty="0"/>
-              <a:t>12/11/2017</a:t>
+              <a:t>12/12/2017</a:t>
             </a:fld>
             <a:endParaRPr lang="en-US" dirty="0"/>
           </a:p>
@@ -3882,7 +3885,7 @@
           <a:p>
             <a:fld id="{9796027F-7875-4030-9381-8BD8C4F21935}" type="datetimeFigureOut">
               <a:rPr lang="en-US" dirty="0"/>
-              <a:t>12/11/2017</a:t>
+              <a:t>12/12/2017</a:t>
             </a:fld>
             <a:endParaRPr lang="en-US" dirty="0"/>
           </a:p>
@@ -4321,7 +4324,7 @@
           <a:p>
             <a:fld id="{9796027F-7875-4030-9381-8BD8C4F21935}" type="datetimeFigureOut">
               <a:rPr lang="en-US" dirty="0"/>
-              <a:t>12/11/2017</a:t>
+              <a:t>12/12/2017</a:t>
             </a:fld>
             <a:endParaRPr lang="en-US" dirty="0"/>
           </a:p>
@@ -4434,7 +4437,7 @@
           <a:p>
             <a:fld id="{4509A250-FF31-4206-8172-F9D3106AACB1}" type="datetimeFigureOut">
               <a:rPr lang="en-US" dirty="0"/>
-              <a:t>12/11/2017</a:t>
+              <a:t>12/12/2017</a:t>
             </a:fld>
             <a:endParaRPr lang="en-US" dirty="0"/>
           </a:p>
@@ -4524,7 +4527,7 @@
           <a:p>
             <a:fld id="{4509A250-FF31-4206-8172-F9D3106AACB1}" type="datetimeFigureOut">
               <a:rPr lang="en-US" dirty="0"/>
-              <a:t>12/11/2017</a:t>
+              <a:t>12/12/2017</a:t>
             </a:fld>
             <a:endParaRPr lang="en-US" dirty="0"/>
           </a:p>
@@ -4798,7 +4801,7 @@
           <a:p>
             <a:fld id="{4509A250-FF31-4206-8172-F9D3106AACB1}" type="datetimeFigureOut">
               <a:rPr lang="en-US" dirty="0"/>
-              <a:t>12/11/2017</a:t>
+              <a:t>12/12/2017</a:t>
             </a:fld>
             <a:endParaRPr lang="en-US" dirty="0"/>
           </a:p>
@@ -5068,7 +5071,7 @@
           <a:p>
             <a:fld id="{4509A250-FF31-4206-8172-F9D3106AACB1}" type="datetimeFigureOut">
               <a:rPr lang="en-US" dirty="0"/>
-              <a:t>12/11/2017</a:t>
+              <a:t>12/12/2017</a:t>
             </a:fld>
             <a:endParaRPr lang="en-US" dirty="0"/>
           </a:p>
@@ -5492,7 +5495,7 @@
           <a:p>
             <a:fld id="{4AAD347D-5ACD-4C99-B74B-A9C85AD731AF}" type="datetimeFigureOut">
               <a:rPr lang="en-US" dirty="0"/>
-              <a:t>12/11/2017</a:t>
+              <a:t>12/12/2017</a:t>
             </a:fld>
             <a:endParaRPr lang="en-US" dirty="0"/>
           </a:p>
@@ -6114,61 +6117,383 @@
       </p:grpSpPr>
       <p:sp>
         <p:nvSpPr>
-          <p:cNvPr id="2" name="Title 1">
+          <p:cNvPr id="4" name="Content Placeholder 2">
             <a:extLst>
               <a:ext uri="{FF2B5EF4-FFF2-40B4-BE49-F238E27FC236}">
-                <a16:creationId xmlns:a16="http://schemas.microsoft.com/office/drawing/2014/main" id="{5AED2544-F0DD-4A83-A091-96832E613A0B}"/>
+                <a16:creationId xmlns:a16="http://schemas.microsoft.com/office/drawing/2014/main" id="{9C239D31-D67C-4619-AD39-D9908B8AB357}"/>
               </a:ext>
             </a:extLst>
           </p:cNvPr>
-          <p:cNvSpPr>
-            <a:spLocks noGrp="1"/>
-          </p:cNvSpPr>
-          <p:nvPr>
-            <p:ph type="title"/>
-          </p:nvPr>
-        </p:nvSpPr>
-        <p:spPr/>
-        <p:txBody>
-          <a:bodyPr/>
-          <a:lstStyle/>
-          <a:p>
-            <a:r>
-              <a:rPr lang="en-US" b="1" dirty="0"/>
-              <a:t>Importance of Database</a:t>
-            </a:r>
-          </a:p>
-        </p:txBody>
-      </p:sp>
-      <p:sp>
-        <p:nvSpPr>
-          <p:cNvPr id="3" name="Content Placeholder 2">
-            <a:extLst>
-              <a:ext uri="{FF2B5EF4-FFF2-40B4-BE49-F238E27FC236}">
-                <a16:creationId xmlns:a16="http://schemas.microsoft.com/office/drawing/2014/main" id="{E6024858-89E4-46CC-82EC-E547AF361C99}"/>
-              </a:ext>
-            </a:extLst>
-          </p:cNvPr>
-          <p:cNvSpPr>
-            <a:spLocks noGrp="1"/>
-          </p:cNvSpPr>
-          <p:nvPr>
-            <p:ph idx="1"/>
-          </p:nvPr>
-        </p:nvSpPr>
-        <p:spPr/>
-        <p:txBody>
-          <a:bodyPr/>
-          <a:lstStyle/>
-          <a:p>
-            <a:endParaRPr lang="en-US"/>
+          <p:cNvSpPr txBox="1">
+            <a:spLocks/>
+          </p:cNvSpPr>
+          <p:nvPr/>
+        </p:nvSpPr>
+        <p:spPr>
+          <a:xfrm>
+            <a:off x="818600" y="5066348"/>
+            <a:ext cx="10554799" cy="2363152"/>
+          </a:xfrm>
+          <a:prstGeom prst="rect">
+            <a:avLst/>
+          </a:prstGeom>
+        </p:spPr>
+        <p:txBody>
+          <a:bodyPr vert="horz" lIns="91440" tIns="45720" rIns="91440" bIns="45720" rtlCol="0" anchor="t">
+            <a:normAutofit/>
+          </a:bodyPr>
+          <a:lstStyle>
+            <a:lvl1pPr marL="0" indent="0" algn="l" defTabSz="457200" rtl="0" eaLnBrk="1" latinLnBrk="0" hangingPunct="1">
+              <a:spcBef>
+                <a:spcPts val="1000"/>
+              </a:spcBef>
+              <a:spcAft>
+                <a:spcPts val="0"/>
+              </a:spcAft>
+              <a:buClr>
+                <a:schemeClr val="bg2">
+                  <a:lumMod val="40000"/>
+                  <a:lumOff val="60000"/>
+                </a:schemeClr>
+              </a:buClr>
+              <a:buSzPct val="80000"/>
+              <a:buFont typeface="Wingdings 3" charset="2"/>
+              <a:buNone/>
+              <a:defRPr sz="2000" b="0" i="0" kern="1200" cap="all">
+                <a:solidFill>
+                  <a:schemeClr val="bg2">
+                    <a:lumMod val="40000"/>
+                    <a:lumOff val="60000"/>
+                  </a:schemeClr>
+                </a:solidFill>
+                <a:latin typeface="+mj-lt"/>
+                <a:ea typeface="+mj-ea"/>
+                <a:cs typeface="+mj-cs"/>
+              </a:defRPr>
+            </a:lvl1pPr>
+            <a:lvl2pPr marL="457200" indent="0" algn="l" defTabSz="457200" rtl="0" eaLnBrk="1" latinLnBrk="0" hangingPunct="1">
+              <a:spcBef>
+                <a:spcPts val="1000"/>
+              </a:spcBef>
+              <a:spcAft>
+                <a:spcPts val="0"/>
+              </a:spcAft>
+              <a:buClr>
+                <a:schemeClr val="bg2">
+                  <a:lumMod val="40000"/>
+                  <a:lumOff val="60000"/>
+                </a:schemeClr>
+              </a:buClr>
+              <a:buSzPct val="80000"/>
+              <a:buFont typeface="Wingdings 3" charset="2"/>
+              <a:buNone/>
+              <a:defRPr sz="1800" b="0" i="0" kern="1200">
+                <a:solidFill>
+                  <a:schemeClr val="tx1">
+                    <a:tint val="75000"/>
+                  </a:schemeClr>
+                </a:solidFill>
+                <a:latin typeface="+mj-lt"/>
+                <a:ea typeface="+mj-ea"/>
+                <a:cs typeface="+mj-cs"/>
+              </a:defRPr>
+            </a:lvl2pPr>
+            <a:lvl3pPr marL="914400" indent="0" algn="l" defTabSz="457200" rtl="0" eaLnBrk="1" latinLnBrk="0" hangingPunct="1">
+              <a:spcBef>
+                <a:spcPts val="1000"/>
+              </a:spcBef>
+              <a:spcAft>
+                <a:spcPts val="0"/>
+              </a:spcAft>
+              <a:buClr>
+                <a:schemeClr val="bg2">
+                  <a:lumMod val="40000"/>
+                  <a:lumOff val="60000"/>
+                </a:schemeClr>
+              </a:buClr>
+              <a:buSzPct val="80000"/>
+              <a:buFont typeface="Wingdings 3" charset="2"/>
+              <a:buNone/>
+              <a:defRPr sz="1600" b="0" i="0" kern="1200">
+                <a:solidFill>
+                  <a:schemeClr val="tx1">
+                    <a:tint val="75000"/>
+                  </a:schemeClr>
+                </a:solidFill>
+                <a:latin typeface="+mj-lt"/>
+                <a:ea typeface="+mj-ea"/>
+                <a:cs typeface="+mj-cs"/>
+              </a:defRPr>
+            </a:lvl3pPr>
+            <a:lvl4pPr marL="1371600" indent="0" algn="l" defTabSz="457200" rtl="0" eaLnBrk="1" latinLnBrk="0" hangingPunct="1">
+              <a:spcBef>
+                <a:spcPts val="1000"/>
+              </a:spcBef>
+              <a:spcAft>
+                <a:spcPts val="0"/>
+              </a:spcAft>
+              <a:buClr>
+                <a:schemeClr val="bg2">
+                  <a:lumMod val="40000"/>
+                  <a:lumOff val="60000"/>
+                </a:schemeClr>
+              </a:buClr>
+              <a:buSzPct val="80000"/>
+              <a:buFont typeface="Wingdings 3" charset="2"/>
+              <a:buNone/>
+              <a:defRPr sz="1400" b="0" i="0" kern="1200">
+                <a:solidFill>
+                  <a:schemeClr val="tx1">
+                    <a:tint val="75000"/>
+                  </a:schemeClr>
+                </a:solidFill>
+                <a:latin typeface="+mj-lt"/>
+                <a:ea typeface="+mj-ea"/>
+                <a:cs typeface="+mj-cs"/>
+              </a:defRPr>
+            </a:lvl4pPr>
+            <a:lvl5pPr marL="1828800" indent="0" algn="l" defTabSz="457200" rtl="0" eaLnBrk="1" latinLnBrk="0" hangingPunct="1">
+              <a:spcBef>
+                <a:spcPts val="1000"/>
+              </a:spcBef>
+              <a:spcAft>
+                <a:spcPts val="0"/>
+              </a:spcAft>
+              <a:buClr>
+                <a:schemeClr val="bg2">
+                  <a:lumMod val="40000"/>
+                  <a:lumOff val="60000"/>
+                </a:schemeClr>
+              </a:buClr>
+              <a:buSzPct val="80000"/>
+              <a:buFont typeface="Wingdings 3" charset="2"/>
+              <a:buNone/>
+              <a:defRPr sz="1400" b="0" i="0" kern="1200">
+                <a:solidFill>
+                  <a:schemeClr val="tx1">
+                    <a:tint val="75000"/>
+                  </a:schemeClr>
+                </a:solidFill>
+                <a:latin typeface="+mj-lt"/>
+                <a:ea typeface="+mj-ea"/>
+                <a:cs typeface="+mj-cs"/>
+              </a:defRPr>
+            </a:lvl5pPr>
+            <a:lvl6pPr marL="2286000" indent="0" algn="l" defTabSz="457200" rtl="0" eaLnBrk="1" latinLnBrk="0" hangingPunct="1">
+              <a:spcBef>
+                <a:spcPts val="1000"/>
+              </a:spcBef>
+              <a:spcAft>
+                <a:spcPts val="0"/>
+              </a:spcAft>
+              <a:buClr>
+                <a:schemeClr val="bg2">
+                  <a:lumMod val="40000"/>
+                  <a:lumOff val="60000"/>
+                </a:schemeClr>
+              </a:buClr>
+              <a:buSzPct val="80000"/>
+              <a:buFont typeface="Wingdings 3" charset="2"/>
+              <a:buNone/>
+              <a:defRPr sz="1400" b="0" i="0" kern="1200">
+                <a:solidFill>
+                  <a:schemeClr val="tx1">
+                    <a:tint val="75000"/>
+                  </a:schemeClr>
+                </a:solidFill>
+                <a:latin typeface="+mj-lt"/>
+                <a:ea typeface="+mj-ea"/>
+                <a:cs typeface="+mj-cs"/>
+              </a:defRPr>
+            </a:lvl6pPr>
+            <a:lvl7pPr marL="2743200" indent="0" algn="l" defTabSz="457200" rtl="0" eaLnBrk="1" latinLnBrk="0" hangingPunct="1">
+              <a:spcBef>
+                <a:spcPts val="1000"/>
+              </a:spcBef>
+              <a:spcAft>
+                <a:spcPts val="0"/>
+              </a:spcAft>
+              <a:buClr>
+                <a:schemeClr val="bg2">
+                  <a:lumMod val="40000"/>
+                  <a:lumOff val="60000"/>
+                </a:schemeClr>
+              </a:buClr>
+              <a:buSzPct val="80000"/>
+              <a:buFont typeface="Wingdings 3" charset="2"/>
+              <a:buNone/>
+              <a:defRPr sz="1400" b="0" i="0" kern="1200">
+                <a:solidFill>
+                  <a:schemeClr val="tx1">
+                    <a:tint val="75000"/>
+                  </a:schemeClr>
+                </a:solidFill>
+                <a:latin typeface="+mj-lt"/>
+                <a:ea typeface="+mj-ea"/>
+                <a:cs typeface="+mj-cs"/>
+              </a:defRPr>
+            </a:lvl7pPr>
+            <a:lvl8pPr marL="3200400" indent="0" algn="l" defTabSz="457200" rtl="0" eaLnBrk="1" latinLnBrk="0" hangingPunct="1">
+              <a:spcBef>
+                <a:spcPts val="1000"/>
+              </a:spcBef>
+              <a:spcAft>
+                <a:spcPts val="0"/>
+              </a:spcAft>
+              <a:buClr>
+                <a:schemeClr val="bg2">
+                  <a:lumMod val="40000"/>
+                  <a:lumOff val="60000"/>
+                </a:schemeClr>
+              </a:buClr>
+              <a:buSzPct val="80000"/>
+              <a:buFont typeface="Wingdings 3" charset="2"/>
+              <a:buNone/>
+              <a:defRPr sz="1400" b="0" i="0" kern="1200">
+                <a:solidFill>
+                  <a:schemeClr val="tx1">
+                    <a:tint val="75000"/>
+                  </a:schemeClr>
+                </a:solidFill>
+                <a:latin typeface="+mj-lt"/>
+                <a:ea typeface="+mj-ea"/>
+                <a:cs typeface="+mj-cs"/>
+              </a:defRPr>
+            </a:lvl8pPr>
+            <a:lvl9pPr marL="3657600" indent="0" algn="l" defTabSz="457200" rtl="0" eaLnBrk="1" latinLnBrk="0" hangingPunct="1">
+              <a:spcBef>
+                <a:spcPts val="1000"/>
+              </a:spcBef>
+              <a:spcAft>
+                <a:spcPts val="0"/>
+              </a:spcAft>
+              <a:buClr>
+                <a:schemeClr val="bg2">
+                  <a:lumMod val="40000"/>
+                  <a:lumOff val="60000"/>
+                </a:schemeClr>
+              </a:buClr>
+              <a:buSzPct val="80000"/>
+              <a:buFont typeface="Wingdings 3" charset="2"/>
+              <a:buNone/>
+              <a:defRPr sz="1400" b="0" i="0" kern="1200">
+                <a:solidFill>
+                  <a:schemeClr val="tx1">
+                    <a:tint val="75000"/>
+                  </a:schemeClr>
+                </a:solidFill>
+                <a:latin typeface="+mj-lt"/>
+                <a:ea typeface="+mj-ea"/>
+                <a:cs typeface="+mj-cs"/>
+              </a:defRPr>
+            </a:lvl9pPr>
+          </a:lstStyle>
+          <a:p>
+            <a:r>
+              <a:rPr lang="en-US" b="1" dirty="0">
+                <a:solidFill>
+                  <a:schemeClr val="tx1"/>
+                </a:solidFill>
+              </a:rPr>
+              <a:t>Selecting specific Customer from Database:</a:t>
+            </a:r>
+          </a:p>
+          <a:p>
+            <a:endParaRPr lang="en-US" b="1" dirty="0">
+              <a:solidFill>
+                <a:schemeClr val="tx1"/>
+              </a:solidFill>
+            </a:endParaRPr>
+          </a:p>
+          <a:p>
+            <a:r>
+              <a:rPr lang="en-US" u="sng" dirty="0">
+                <a:solidFill>
+                  <a:schemeClr val="tx1"/>
+                </a:solidFill>
+                <a:hlinkClick r:id="rId2"/>
+              </a:rPr>
+              <a:t>SELECT</a:t>
+            </a:r>
+            <a:r>
+              <a:rPr lang="en-US" dirty="0">
+                <a:solidFill>
+                  <a:schemeClr val="tx1"/>
+                </a:solidFill>
+              </a:rPr>
+              <a:t> </a:t>
+            </a:r>
+            <a:r>
+              <a:rPr lang="en-US" dirty="0" err="1">
+                <a:solidFill>
+                  <a:schemeClr val="tx1"/>
+                </a:solidFill>
+              </a:rPr>
+              <a:t>Fname</a:t>
+            </a:r>
+            <a:r>
+              <a:rPr lang="en-US" dirty="0">
+                <a:solidFill>
+                  <a:schemeClr val="tx1"/>
+                </a:solidFill>
+              </a:rPr>
+              <a:t>, </a:t>
+            </a:r>
+            <a:r>
+              <a:rPr lang="en-US" dirty="0" err="1">
+                <a:solidFill>
+                  <a:schemeClr val="tx1"/>
+                </a:solidFill>
+              </a:rPr>
+              <a:t>Lname,CellNum,Email</a:t>
+            </a:r>
+            <a:r>
+              <a:rPr lang="en-US" dirty="0">
+                <a:solidFill>
+                  <a:schemeClr val="tx1"/>
+                </a:solidFill>
+              </a:rPr>
+              <a:t>, </a:t>
+            </a:r>
+            <a:r>
+              <a:rPr lang="en-US" dirty="0" err="1">
+                <a:solidFill>
+                  <a:schemeClr val="tx1"/>
+                </a:solidFill>
+              </a:rPr>
+              <a:t>ReasonForVisit</a:t>
+            </a:r>
+            <a:r>
+              <a:rPr lang="en-US" dirty="0">
+                <a:solidFill>
+                  <a:schemeClr val="tx1"/>
+                </a:solidFill>
+              </a:rPr>
+              <a:t>, </a:t>
+            </a:r>
+            <a:r>
+              <a:rPr lang="en-US" dirty="0" err="1">
+                <a:solidFill>
+                  <a:schemeClr val="tx1"/>
+                </a:solidFill>
+              </a:rPr>
+              <a:t>TicketID</a:t>
+            </a:r>
+            <a:r>
+              <a:rPr lang="en-US" dirty="0">
+                <a:solidFill>
+                  <a:schemeClr val="tx1"/>
+                </a:solidFill>
+              </a:rPr>
+              <a:t> FROM customer;</a:t>
+            </a:r>
           </a:p>
         </p:txBody>
       </p:sp>
     </p:spTree>
     <p:extLst>
       <p:ext uri="{BB962C8B-B14F-4D97-AF65-F5344CB8AC3E}">
-        <p14:creationId xmlns:p14="http://schemas.microsoft.com/office/powerpoint/2010/main" val="2146869905"/>
+        <p14:creationId xmlns:p14="http://schemas.microsoft.com/office/powerpoint/2010/main" val="1877137906"/>
       </p:ext>
     </p:extLst>
   </p:cSld>
@@ -6197,41 +6522,1744 @@
       </p:grpSpPr>
       <p:sp>
         <p:nvSpPr>
-          <p:cNvPr id="2" name="Title 1">
+          <p:cNvPr id="5" name="Content Placeholder 2">
             <a:extLst>
               <a:ext uri="{FF2B5EF4-FFF2-40B4-BE49-F238E27FC236}">
-                <a16:creationId xmlns:a16="http://schemas.microsoft.com/office/drawing/2014/main" id="{6BF6E7D9-FC10-4A65-ADE5-25E3F943B3F0}"/>
+                <a16:creationId xmlns:a16="http://schemas.microsoft.com/office/drawing/2014/main" id="{05CFF522-5AD6-462A-B38C-FCBC0AC012CC}"/>
               </a:ext>
             </a:extLst>
           </p:cNvPr>
-          <p:cNvSpPr>
-            <a:spLocks noGrp="1"/>
-          </p:cNvSpPr>
-          <p:nvPr>
-            <p:ph type="title"/>
-          </p:nvPr>
+          <p:cNvSpPr txBox="1">
+            <a:spLocks/>
+          </p:cNvSpPr>
+          <p:nvPr/>
         </p:nvSpPr>
         <p:spPr>
           <a:xfrm>
-            <a:off x="3346078" y="2614020"/>
-            <a:ext cx="5499844" cy="814980"/>
+            <a:off x="818600" y="5277766"/>
+            <a:ext cx="10554799" cy="2481934"/>
           </a:xfrm>
+          <a:prstGeom prst="rect">
+            <a:avLst/>
+          </a:prstGeom>
         </p:spPr>
         <p:txBody>
-          <a:bodyPr/>
-          <a:lstStyle/>
-          <a:p>
-            <a:r>
-              <a:rPr lang="en-US" b="1" dirty="0"/>
-              <a:t>Webpages + Queries</a:t>
-            </a:r>
+          <a:bodyPr vert="horz" lIns="91440" tIns="45720" rIns="91440" bIns="45720" rtlCol="0" anchor="t">
+            <a:normAutofit fontScale="62500" lnSpcReduction="20000"/>
+          </a:bodyPr>
+          <a:lstStyle>
+            <a:lvl1pPr marL="0" indent="0" algn="l" defTabSz="457200" rtl="0" eaLnBrk="1" latinLnBrk="0" hangingPunct="1">
+              <a:spcBef>
+                <a:spcPts val="1000"/>
+              </a:spcBef>
+              <a:spcAft>
+                <a:spcPts val="0"/>
+              </a:spcAft>
+              <a:buClr>
+                <a:schemeClr val="bg2">
+                  <a:lumMod val="40000"/>
+                  <a:lumOff val="60000"/>
+                </a:schemeClr>
+              </a:buClr>
+              <a:buSzPct val="80000"/>
+              <a:buFont typeface="Wingdings 3" charset="2"/>
+              <a:buNone/>
+              <a:defRPr sz="2000" b="0" i="0" kern="1200" cap="all">
+                <a:solidFill>
+                  <a:schemeClr val="bg2">
+                    <a:lumMod val="40000"/>
+                    <a:lumOff val="60000"/>
+                  </a:schemeClr>
+                </a:solidFill>
+                <a:latin typeface="+mj-lt"/>
+                <a:ea typeface="+mj-ea"/>
+                <a:cs typeface="+mj-cs"/>
+              </a:defRPr>
+            </a:lvl1pPr>
+            <a:lvl2pPr marL="457200" indent="0" algn="l" defTabSz="457200" rtl="0" eaLnBrk="1" latinLnBrk="0" hangingPunct="1">
+              <a:spcBef>
+                <a:spcPts val="1000"/>
+              </a:spcBef>
+              <a:spcAft>
+                <a:spcPts val="0"/>
+              </a:spcAft>
+              <a:buClr>
+                <a:schemeClr val="bg2">
+                  <a:lumMod val="40000"/>
+                  <a:lumOff val="60000"/>
+                </a:schemeClr>
+              </a:buClr>
+              <a:buSzPct val="80000"/>
+              <a:buFont typeface="Wingdings 3" charset="2"/>
+              <a:buNone/>
+              <a:defRPr sz="1800" b="0" i="0" kern="1200">
+                <a:solidFill>
+                  <a:schemeClr val="tx1">
+                    <a:tint val="75000"/>
+                  </a:schemeClr>
+                </a:solidFill>
+                <a:latin typeface="+mj-lt"/>
+                <a:ea typeface="+mj-ea"/>
+                <a:cs typeface="+mj-cs"/>
+              </a:defRPr>
+            </a:lvl2pPr>
+            <a:lvl3pPr marL="914400" indent="0" algn="l" defTabSz="457200" rtl="0" eaLnBrk="1" latinLnBrk="0" hangingPunct="1">
+              <a:spcBef>
+                <a:spcPts val="1000"/>
+              </a:spcBef>
+              <a:spcAft>
+                <a:spcPts val="0"/>
+              </a:spcAft>
+              <a:buClr>
+                <a:schemeClr val="bg2">
+                  <a:lumMod val="40000"/>
+                  <a:lumOff val="60000"/>
+                </a:schemeClr>
+              </a:buClr>
+              <a:buSzPct val="80000"/>
+              <a:buFont typeface="Wingdings 3" charset="2"/>
+              <a:buNone/>
+              <a:defRPr sz="1600" b="0" i="0" kern="1200">
+                <a:solidFill>
+                  <a:schemeClr val="tx1">
+                    <a:tint val="75000"/>
+                  </a:schemeClr>
+                </a:solidFill>
+                <a:latin typeface="+mj-lt"/>
+                <a:ea typeface="+mj-ea"/>
+                <a:cs typeface="+mj-cs"/>
+              </a:defRPr>
+            </a:lvl3pPr>
+            <a:lvl4pPr marL="1371600" indent="0" algn="l" defTabSz="457200" rtl="0" eaLnBrk="1" latinLnBrk="0" hangingPunct="1">
+              <a:spcBef>
+                <a:spcPts val="1000"/>
+              </a:spcBef>
+              <a:spcAft>
+                <a:spcPts val="0"/>
+              </a:spcAft>
+              <a:buClr>
+                <a:schemeClr val="bg2">
+                  <a:lumMod val="40000"/>
+                  <a:lumOff val="60000"/>
+                </a:schemeClr>
+              </a:buClr>
+              <a:buSzPct val="80000"/>
+              <a:buFont typeface="Wingdings 3" charset="2"/>
+              <a:buNone/>
+              <a:defRPr sz="1400" b="0" i="0" kern="1200">
+                <a:solidFill>
+                  <a:schemeClr val="tx1">
+                    <a:tint val="75000"/>
+                  </a:schemeClr>
+                </a:solidFill>
+                <a:latin typeface="+mj-lt"/>
+                <a:ea typeface="+mj-ea"/>
+                <a:cs typeface="+mj-cs"/>
+              </a:defRPr>
+            </a:lvl4pPr>
+            <a:lvl5pPr marL="1828800" indent="0" algn="l" defTabSz="457200" rtl="0" eaLnBrk="1" latinLnBrk="0" hangingPunct="1">
+              <a:spcBef>
+                <a:spcPts val="1000"/>
+              </a:spcBef>
+              <a:spcAft>
+                <a:spcPts val="0"/>
+              </a:spcAft>
+              <a:buClr>
+                <a:schemeClr val="bg2">
+                  <a:lumMod val="40000"/>
+                  <a:lumOff val="60000"/>
+                </a:schemeClr>
+              </a:buClr>
+              <a:buSzPct val="80000"/>
+              <a:buFont typeface="Wingdings 3" charset="2"/>
+              <a:buNone/>
+              <a:defRPr sz="1400" b="0" i="0" kern="1200">
+                <a:solidFill>
+                  <a:schemeClr val="tx1">
+                    <a:tint val="75000"/>
+                  </a:schemeClr>
+                </a:solidFill>
+                <a:latin typeface="+mj-lt"/>
+                <a:ea typeface="+mj-ea"/>
+                <a:cs typeface="+mj-cs"/>
+              </a:defRPr>
+            </a:lvl5pPr>
+            <a:lvl6pPr marL="2286000" indent="0" algn="l" defTabSz="457200" rtl="0" eaLnBrk="1" latinLnBrk="0" hangingPunct="1">
+              <a:spcBef>
+                <a:spcPts val="1000"/>
+              </a:spcBef>
+              <a:spcAft>
+                <a:spcPts val="0"/>
+              </a:spcAft>
+              <a:buClr>
+                <a:schemeClr val="bg2">
+                  <a:lumMod val="40000"/>
+                  <a:lumOff val="60000"/>
+                </a:schemeClr>
+              </a:buClr>
+              <a:buSzPct val="80000"/>
+              <a:buFont typeface="Wingdings 3" charset="2"/>
+              <a:buNone/>
+              <a:defRPr sz="1400" b="0" i="0" kern="1200">
+                <a:solidFill>
+                  <a:schemeClr val="tx1">
+                    <a:tint val="75000"/>
+                  </a:schemeClr>
+                </a:solidFill>
+                <a:latin typeface="+mj-lt"/>
+                <a:ea typeface="+mj-ea"/>
+                <a:cs typeface="+mj-cs"/>
+              </a:defRPr>
+            </a:lvl6pPr>
+            <a:lvl7pPr marL="2743200" indent="0" algn="l" defTabSz="457200" rtl="0" eaLnBrk="1" latinLnBrk="0" hangingPunct="1">
+              <a:spcBef>
+                <a:spcPts val="1000"/>
+              </a:spcBef>
+              <a:spcAft>
+                <a:spcPts val="0"/>
+              </a:spcAft>
+              <a:buClr>
+                <a:schemeClr val="bg2">
+                  <a:lumMod val="40000"/>
+                  <a:lumOff val="60000"/>
+                </a:schemeClr>
+              </a:buClr>
+              <a:buSzPct val="80000"/>
+              <a:buFont typeface="Wingdings 3" charset="2"/>
+              <a:buNone/>
+              <a:defRPr sz="1400" b="0" i="0" kern="1200">
+                <a:solidFill>
+                  <a:schemeClr val="tx1">
+                    <a:tint val="75000"/>
+                  </a:schemeClr>
+                </a:solidFill>
+                <a:latin typeface="+mj-lt"/>
+                <a:ea typeface="+mj-ea"/>
+                <a:cs typeface="+mj-cs"/>
+              </a:defRPr>
+            </a:lvl7pPr>
+            <a:lvl8pPr marL="3200400" indent="0" algn="l" defTabSz="457200" rtl="0" eaLnBrk="1" latinLnBrk="0" hangingPunct="1">
+              <a:spcBef>
+                <a:spcPts val="1000"/>
+              </a:spcBef>
+              <a:spcAft>
+                <a:spcPts val="0"/>
+              </a:spcAft>
+              <a:buClr>
+                <a:schemeClr val="bg2">
+                  <a:lumMod val="40000"/>
+                  <a:lumOff val="60000"/>
+                </a:schemeClr>
+              </a:buClr>
+              <a:buSzPct val="80000"/>
+              <a:buFont typeface="Wingdings 3" charset="2"/>
+              <a:buNone/>
+              <a:defRPr sz="1400" b="0" i="0" kern="1200">
+                <a:solidFill>
+                  <a:schemeClr val="tx1">
+                    <a:tint val="75000"/>
+                  </a:schemeClr>
+                </a:solidFill>
+                <a:latin typeface="+mj-lt"/>
+                <a:ea typeface="+mj-ea"/>
+                <a:cs typeface="+mj-cs"/>
+              </a:defRPr>
+            </a:lvl8pPr>
+            <a:lvl9pPr marL="3657600" indent="0" algn="l" defTabSz="457200" rtl="0" eaLnBrk="1" latinLnBrk="0" hangingPunct="1">
+              <a:spcBef>
+                <a:spcPts val="1000"/>
+              </a:spcBef>
+              <a:spcAft>
+                <a:spcPts val="0"/>
+              </a:spcAft>
+              <a:buClr>
+                <a:schemeClr val="bg2">
+                  <a:lumMod val="40000"/>
+                  <a:lumOff val="60000"/>
+                </a:schemeClr>
+              </a:buClr>
+              <a:buSzPct val="80000"/>
+              <a:buFont typeface="Wingdings 3" charset="2"/>
+              <a:buNone/>
+              <a:defRPr sz="1400" b="0" i="0" kern="1200">
+                <a:solidFill>
+                  <a:schemeClr val="tx1">
+                    <a:tint val="75000"/>
+                  </a:schemeClr>
+                </a:solidFill>
+                <a:latin typeface="+mj-lt"/>
+                <a:ea typeface="+mj-ea"/>
+                <a:cs typeface="+mj-cs"/>
+              </a:defRPr>
+            </a:lvl9pPr>
+          </a:lstStyle>
+          <a:p>
+            <a:r>
+              <a:rPr lang="en-US" sz="2800" b="1" dirty="0">
+                <a:solidFill>
+                  <a:schemeClr val="tx1"/>
+                </a:solidFill>
+              </a:rPr>
+              <a:t>Selecting the number of tickets that an employee has assigned themselves to (how many customers are they interacting with):</a:t>
+            </a:r>
+          </a:p>
+          <a:p>
+            <a:endParaRPr lang="en-US" sz="2800" b="1" dirty="0">
+              <a:solidFill>
+                <a:schemeClr val="tx1"/>
+              </a:solidFill>
+            </a:endParaRPr>
+          </a:p>
+          <a:p>
+            <a:r>
+              <a:rPr lang="en-US" sz="2800" u="sng" dirty="0">
+                <a:solidFill>
+                  <a:schemeClr val="tx1"/>
+                </a:solidFill>
+                <a:hlinkClick r:id="rId2"/>
+              </a:rPr>
+              <a:t>SELECT</a:t>
+            </a:r>
+            <a:r>
+              <a:rPr lang="en-US" sz="2800" dirty="0">
+                <a:solidFill>
+                  <a:schemeClr val="tx1"/>
+                </a:solidFill>
+              </a:rPr>
+              <a:t> </a:t>
+            </a:r>
+            <a:r>
+              <a:rPr lang="en-US" sz="2800" u="sng" dirty="0">
+                <a:solidFill>
+                  <a:schemeClr val="tx1"/>
+                </a:solidFill>
+                <a:hlinkClick r:id="rId3"/>
+              </a:rPr>
+              <a:t>COUNT</a:t>
+            </a:r>
+            <a:r>
+              <a:rPr lang="en-US" sz="2800" dirty="0">
+                <a:solidFill>
+                  <a:schemeClr val="tx1"/>
+                </a:solidFill>
+              </a:rPr>
+              <a:t>(EMPID), </a:t>
+            </a:r>
+            <a:r>
+              <a:rPr lang="en-US" sz="2800" dirty="0" err="1">
+                <a:solidFill>
+                  <a:schemeClr val="tx1"/>
+                </a:solidFill>
+              </a:rPr>
+              <a:t>ticket_assigned</a:t>
+            </a:r>
+            <a:r>
+              <a:rPr lang="en-US" sz="2800" dirty="0">
+                <a:solidFill>
+                  <a:schemeClr val="tx1"/>
+                </a:solidFill>
+              </a:rPr>
+              <a:t> FROM employee GROUP </a:t>
+            </a:r>
+            <a:r>
+              <a:rPr lang="en-US" sz="2800" dirty="0" err="1">
+                <a:solidFill>
+                  <a:schemeClr val="tx1"/>
+                </a:solidFill>
+              </a:rPr>
+              <a:t>BYticket_assigned</a:t>
+            </a:r>
+            <a:r>
+              <a:rPr lang="en-US" sz="2800" dirty="0">
+                <a:solidFill>
+                  <a:schemeClr val="tx1"/>
+                </a:solidFill>
+              </a:rPr>
+              <a:t>;</a:t>
+            </a:r>
+          </a:p>
+          <a:p>
+            <a:r>
+              <a:rPr lang="en-US" sz="2800" dirty="0">
+                <a:solidFill>
+                  <a:schemeClr val="tx1"/>
+                </a:solidFill>
+              </a:rPr>
+              <a:t> </a:t>
+            </a:r>
+          </a:p>
+          <a:p>
+            <a:r>
+              <a:rPr lang="en-US" dirty="0">
+                <a:solidFill>
+                  <a:schemeClr val="tx1"/>
+                </a:solidFill>
+              </a:rPr>
+              <a:t> </a:t>
+            </a:r>
+          </a:p>
+          <a:p>
+            <a:r>
+              <a:rPr lang="en-US" dirty="0">
+                <a:solidFill>
+                  <a:schemeClr val="tx1"/>
+                </a:solidFill>
+              </a:rPr>
+              <a:t> </a:t>
+            </a:r>
+          </a:p>
+          <a:p>
+            <a:endParaRPr lang="en-US" dirty="0"/>
           </a:p>
         </p:txBody>
       </p:sp>
     </p:spTree>
     <p:extLst>
       <p:ext uri="{BB962C8B-B14F-4D97-AF65-F5344CB8AC3E}">
-        <p14:creationId xmlns:p14="http://schemas.microsoft.com/office/powerpoint/2010/main" val="1941153022"/>
+        <p14:creationId xmlns:p14="http://schemas.microsoft.com/office/powerpoint/2010/main" val="1721690073"/>
+      </p:ext>
+    </p:extLst>
+  </p:cSld>
+  <p:clrMapOvr>
+    <a:masterClrMapping/>
+  </p:clrMapOvr>
+</p:sld>
+</file>
+
+<file path=ppt/slides/slide12.xml><?xml version="1.0" encoding="utf-8"?>
+<p:sld xmlns:a="http://schemas.openxmlformats.org/drawingml/2006/main" xmlns:r="http://schemas.openxmlformats.org/officeDocument/2006/relationships" xmlns:p="http://schemas.openxmlformats.org/presentationml/2006/main">
+  <p:cSld>
+    <p:spTree>
+      <p:nvGrpSpPr>
+        <p:cNvPr id="1" name=""/>
+        <p:cNvGrpSpPr/>
+        <p:nvPr/>
+      </p:nvGrpSpPr>
+      <p:grpSpPr>
+        <a:xfrm>
+          <a:off x="0" y="0"/>
+          <a:ext cx="0" cy="0"/>
+          <a:chOff x="0" y="0"/>
+          <a:chExt cx="0" cy="0"/>
+        </a:xfrm>
+      </p:grpSpPr>
+      <p:sp>
+        <p:nvSpPr>
+          <p:cNvPr id="4" name="Content Placeholder 2">
+            <a:extLst>
+              <a:ext uri="{FF2B5EF4-FFF2-40B4-BE49-F238E27FC236}">
+                <a16:creationId xmlns:a16="http://schemas.microsoft.com/office/drawing/2014/main" id="{5EFFA28E-55AF-48A9-A303-7569CEE02E08}"/>
+              </a:ext>
+            </a:extLst>
+          </p:cNvPr>
+          <p:cNvSpPr txBox="1">
+            <a:spLocks/>
+          </p:cNvSpPr>
+          <p:nvPr/>
+        </p:nvSpPr>
+        <p:spPr>
+          <a:xfrm>
+            <a:off x="1218406" y="4480859"/>
+            <a:ext cx="9755188" cy="2745441"/>
+          </a:xfrm>
+          <a:prstGeom prst="rect">
+            <a:avLst/>
+          </a:prstGeom>
+        </p:spPr>
+        <p:txBody>
+          <a:bodyPr vert="horz" lIns="91440" tIns="45720" rIns="91440" bIns="45720" rtlCol="0" anchor="t">
+            <a:normAutofit/>
+          </a:bodyPr>
+          <a:lstStyle>
+            <a:lvl1pPr marL="0" indent="0" algn="l" defTabSz="457200" rtl="0" eaLnBrk="1" latinLnBrk="0" hangingPunct="1">
+              <a:spcBef>
+                <a:spcPts val="1000"/>
+              </a:spcBef>
+              <a:spcAft>
+                <a:spcPts val="0"/>
+              </a:spcAft>
+              <a:buClr>
+                <a:schemeClr val="bg2">
+                  <a:lumMod val="40000"/>
+                  <a:lumOff val="60000"/>
+                </a:schemeClr>
+              </a:buClr>
+              <a:buSzPct val="80000"/>
+              <a:buFont typeface="Wingdings 3" charset="2"/>
+              <a:buNone/>
+              <a:defRPr sz="2000" b="0" i="0" kern="1200" cap="all">
+                <a:solidFill>
+                  <a:schemeClr val="bg2">
+                    <a:lumMod val="40000"/>
+                    <a:lumOff val="60000"/>
+                  </a:schemeClr>
+                </a:solidFill>
+                <a:latin typeface="+mj-lt"/>
+                <a:ea typeface="+mj-ea"/>
+                <a:cs typeface="+mj-cs"/>
+              </a:defRPr>
+            </a:lvl1pPr>
+            <a:lvl2pPr marL="457200" indent="0" algn="l" defTabSz="457200" rtl="0" eaLnBrk="1" latinLnBrk="0" hangingPunct="1">
+              <a:spcBef>
+                <a:spcPts val="1000"/>
+              </a:spcBef>
+              <a:spcAft>
+                <a:spcPts val="0"/>
+              </a:spcAft>
+              <a:buClr>
+                <a:schemeClr val="bg2">
+                  <a:lumMod val="40000"/>
+                  <a:lumOff val="60000"/>
+                </a:schemeClr>
+              </a:buClr>
+              <a:buSzPct val="80000"/>
+              <a:buFont typeface="Wingdings 3" charset="2"/>
+              <a:buNone/>
+              <a:defRPr sz="1800" b="0" i="0" kern="1200">
+                <a:solidFill>
+                  <a:schemeClr val="tx1">
+                    <a:tint val="75000"/>
+                  </a:schemeClr>
+                </a:solidFill>
+                <a:latin typeface="+mj-lt"/>
+                <a:ea typeface="+mj-ea"/>
+                <a:cs typeface="+mj-cs"/>
+              </a:defRPr>
+            </a:lvl2pPr>
+            <a:lvl3pPr marL="914400" indent="0" algn="l" defTabSz="457200" rtl="0" eaLnBrk="1" latinLnBrk="0" hangingPunct="1">
+              <a:spcBef>
+                <a:spcPts val="1000"/>
+              </a:spcBef>
+              <a:spcAft>
+                <a:spcPts val="0"/>
+              </a:spcAft>
+              <a:buClr>
+                <a:schemeClr val="bg2">
+                  <a:lumMod val="40000"/>
+                  <a:lumOff val="60000"/>
+                </a:schemeClr>
+              </a:buClr>
+              <a:buSzPct val="80000"/>
+              <a:buFont typeface="Wingdings 3" charset="2"/>
+              <a:buNone/>
+              <a:defRPr sz="1600" b="0" i="0" kern="1200">
+                <a:solidFill>
+                  <a:schemeClr val="tx1">
+                    <a:tint val="75000"/>
+                  </a:schemeClr>
+                </a:solidFill>
+                <a:latin typeface="+mj-lt"/>
+                <a:ea typeface="+mj-ea"/>
+                <a:cs typeface="+mj-cs"/>
+              </a:defRPr>
+            </a:lvl3pPr>
+            <a:lvl4pPr marL="1371600" indent="0" algn="l" defTabSz="457200" rtl="0" eaLnBrk="1" latinLnBrk="0" hangingPunct="1">
+              <a:spcBef>
+                <a:spcPts val="1000"/>
+              </a:spcBef>
+              <a:spcAft>
+                <a:spcPts val="0"/>
+              </a:spcAft>
+              <a:buClr>
+                <a:schemeClr val="bg2">
+                  <a:lumMod val="40000"/>
+                  <a:lumOff val="60000"/>
+                </a:schemeClr>
+              </a:buClr>
+              <a:buSzPct val="80000"/>
+              <a:buFont typeface="Wingdings 3" charset="2"/>
+              <a:buNone/>
+              <a:defRPr sz="1400" b="0" i="0" kern="1200">
+                <a:solidFill>
+                  <a:schemeClr val="tx1">
+                    <a:tint val="75000"/>
+                  </a:schemeClr>
+                </a:solidFill>
+                <a:latin typeface="+mj-lt"/>
+                <a:ea typeface="+mj-ea"/>
+                <a:cs typeface="+mj-cs"/>
+              </a:defRPr>
+            </a:lvl4pPr>
+            <a:lvl5pPr marL="1828800" indent="0" algn="l" defTabSz="457200" rtl="0" eaLnBrk="1" latinLnBrk="0" hangingPunct="1">
+              <a:spcBef>
+                <a:spcPts val="1000"/>
+              </a:spcBef>
+              <a:spcAft>
+                <a:spcPts val="0"/>
+              </a:spcAft>
+              <a:buClr>
+                <a:schemeClr val="bg2">
+                  <a:lumMod val="40000"/>
+                  <a:lumOff val="60000"/>
+                </a:schemeClr>
+              </a:buClr>
+              <a:buSzPct val="80000"/>
+              <a:buFont typeface="Wingdings 3" charset="2"/>
+              <a:buNone/>
+              <a:defRPr sz="1400" b="0" i="0" kern="1200">
+                <a:solidFill>
+                  <a:schemeClr val="tx1">
+                    <a:tint val="75000"/>
+                  </a:schemeClr>
+                </a:solidFill>
+                <a:latin typeface="+mj-lt"/>
+                <a:ea typeface="+mj-ea"/>
+                <a:cs typeface="+mj-cs"/>
+              </a:defRPr>
+            </a:lvl5pPr>
+            <a:lvl6pPr marL="2286000" indent="0" algn="l" defTabSz="457200" rtl="0" eaLnBrk="1" latinLnBrk="0" hangingPunct="1">
+              <a:spcBef>
+                <a:spcPts val="1000"/>
+              </a:spcBef>
+              <a:spcAft>
+                <a:spcPts val="0"/>
+              </a:spcAft>
+              <a:buClr>
+                <a:schemeClr val="bg2">
+                  <a:lumMod val="40000"/>
+                  <a:lumOff val="60000"/>
+                </a:schemeClr>
+              </a:buClr>
+              <a:buSzPct val="80000"/>
+              <a:buFont typeface="Wingdings 3" charset="2"/>
+              <a:buNone/>
+              <a:defRPr sz="1400" b="0" i="0" kern="1200">
+                <a:solidFill>
+                  <a:schemeClr val="tx1">
+                    <a:tint val="75000"/>
+                  </a:schemeClr>
+                </a:solidFill>
+                <a:latin typeface="+mj-lt"/>
+                <a:ea typeface="+mj-ea"/>
+                <a:cs typeface="+mj-cs"/>
+              </a:defRPr>
+            </a:lvl6pPr>
+            <a:lvl7pPr marL="2743200" indent="0" algn="l" defTabSz="457200" rtl="0" eaLnBrk="1" latinLnBrk="0" hangingPunct="1">
+              <a:spcBef>
+                <a:spcPts val="1000"/>
+              </a:spcBef>
+              <a:spcAft>
+                <a:spcPts val="0"/>
+              </a:spcAft>
+              <a:buClr>
+                <a:schemeClr val="bg2">
+                  <a:lumMod val="40000"/>
+                  <a:lumOff val="60000"/>
+                </a:schemeClr>
+              </a:buClr>
+              <a:buSzPct val="80000"/>
+              <a:buFont typeface="Wingdings 3" charset="2"/>
+              <a:buNone/>
+              <a:defRPr sz="1400" b="0" i="0" kern="1200">
+                <a:solidFill>
+                  <a:schemeClr val="tx1">
+                    <a:tint val="75000"/>
+                  </a:schemeClr>
+                </a:solidFill>
+                <a:latin typeface="+mj-lt"/>
+                <a:ea typeface="+mj-ea"/>
+                <a:cs typeface="+mj-cs"/>
+              </a:defRPr>
+            </a:lvl7pPr>
+            <a:lvl8pPr marL="3200400" indent="0" algn="l" defTabSz="457200" rtl="0" eaLnBrk="1" latinLnBrk="0" hangingPunct="1">
+              <a:spcBef>
+                <a:spcPts val="1000"/>
+              </a:spcBef>
+              <a:spcAft>
+                <a:spcPts val="0"/>
+              </a:spcAft>
+              <a:buClr>
+                <a:schemeClr val="bg2">
+                  <a:lumMod val="40000"/>
+                  <a:lumOff val="60000"/>
+                </a:schemeClr>
+              </a:buClr>
+              <a:buSzPct val="80000"/>
+              <a:buFont typeface="Wingdings 3" charset="2"/>
+              <a:buNone/>
+              <a:defRPr sz="1400" b="0" i="0" kern="1200">
+                <a:solidFill>
+                  <a:schemeClr val="tx1">
+                    <a:tint val="75000"/>
+                  </a:schemeClr>
+                </a:solidFill>
+                <a:latin typeface="+mj-lt"/>
+                <a:ea typeface="+mj-ea"/>
+                <a:cs typeface="+mj-cs"/>
+              </a:defRPr>
+            </a:lvl8pPr>
+            <a:lvl9pPr marL="3657600" indent="0" algn="l" defTabSz="457200" rtl="0" eaLnBrk="1" latinLnBrk="0" hangingPunct="1">
+              <a:spcBef>
+                <a:spcPts val="1000"/>
+              </a:spcBef>
+              <a:spcAft>
+                <a:spcPts val="0"/>
+              </a:spcAft>
+              <a:buClr>
+                <a:schemeClr val="bg2">
+                  <a:lumMod val="40000"/>
+                  <a:lumOff val="60000"/>
+                </a:schemeClr>
+              </a:buClr>
+              <a:buSzPct val="80000"/>
+              <a:buFont typeface="Wingdings 3" charset="2"/>
+              <a:buNone/>
+              <a:defRPr sz="1400" b="0" i="0" kern="1200">
+                <a:solidFill>
+                  <a:schemeClr val="tx1">
+                    <a:tint val="75000"/>
+                  </a:schemeClr>
+                </a:solidFill>
+                <a:latin typeface="+mj-lt"/>
+                <a:ea typeface="+mj-ea"/>
+                <a:cs typeface="+mj-cs"/>
+              </a:defRPr>
+            </a:lvl9pPr>
+          </a:lstStyle>
+          <a:p>
+            <a:r>
+              <a:rPr lang="en-US" b="1" dirty="0">
+                <a:solidFill>
+                  <a:schemeClr val="tx1"/>
+                </a:solidFill>
+              </a:rPr>
+              <a:t>Retrieving which employee assisted which customer based on specific </a:t>
+            </a:r>
+            <a:r>
+              <a:rPr lang="en-US" b="1" dirty="0" err="1">
+                <a:solidFill>
+                  <a:schemeClr val="tx1"/>
+                </a:solidFill>
+              </a:rPr>
+              <a:t>ticketID</a:t>
+            </a:r>
+            <a:r>
+              <a:rPr lang="en-US" b="1" dirty="0">
+                <a:solidFill>
+                  <a:schemeClr val="tx1"/>
+                </a:solidFill>
+              </a:rPr>
+              <a:t> :</a:t>
+            </a:r>
+          </a:p>
+          <a:p>
+            <a:endParaRPr lang="en-US" b="1" dirty="0">
+              <a:solidFill>
+                <a:schemeClr val="tx1"/>
+              </a:solidFill>
+            </a:endParaRPr>
+          </a:p>
+          <a:p>
+            <a:r>
+              <a:rPr lang="en-US" u="sng" dirty="0">
+                <a:solidFill>
+                  <a:schemeClr val="tx1"/>
+                </a:solidFill>
+                <a:hlinkClick r:id="rId2"/>
+              </a:rPr>
+              <a:t>SELECT</a:t>
+            </a:r>
+            <a:r>
+              <a:rPr lang="en-US" dirty="0">
+                <a:solidFill>
+                  <a:schemeClr val="tx1"/>
+                </a:solidFill>
+              </a:rPr>
+              <a:t> </a:t>
+            </a:r>
+            <a:r>
+              <a:rPr lang="en-US" dirty="0" err="1">
+                <a:solidFill>
+                  <a:schemeClr val="tx1"/>
+                </a:solidFill>
+              </a:rPr>
+              <a:t>c.CellNum</a:t>
+            </a:r>
+            <a:r>
+              <a:rPr lang="en-US" dirty="0">
+                <a:solidFill>
+                  <a:schemeClr val="tx1"/>
+                </a:solidFill>
+              </a:rPr>
+              <a:t>, </a:t>
+            </a:r>
+            <a:r>
+              <a:rPr lang="en-US" dirty="0" err="1">
+                <a:solidFill>
+                  <a:schemeClr val="tx1"/>
+                </a:solidFill>
+              </a:rPr>
+              <a:t>c.TicketID</a:t>
+            </a:r>
+            <a:r>
+              <a:rPr lang="en-US" dirty="0">
+                <a:solidFill>
+                  <a:schemeClr val="tx1"/>
+                </a:solidFill>
+              </a:rPr>
+              <a:t>, </a:t>
+            </a:r>
+            <a:r>
+              <a:rPr lang="en-US" dirty="0" err="1">
+                <a:solidFill>
+                  <a:schemeClr val="tx1"/>
+                </a:solidFill>
+              </a:rPr>
+              <a:t>e.EMPID</a:t>
+            </a:r>
+            <a:r>
+              <a:rPr lang="en-US" dirty="0">
+                <a:solidFill>
+                  <a:schemeClr val="tx1"/>
+                </a:solidFill>
+              </a:rPr>
+              <a:t> FROM customer </a:t>
+            </a:r>
+            <a:r>
+              <a:rPr lang="en-US" dirty="0" err="1">
+                <a:solidFill>
+                  <a:schemeClr val="tx1"/>
+                </a:solidFill>
+              </a:rPr>
+              <a:t>c,employee</a:t>
+            </a:r>
+            <a:r>
+              <a:rPr lang="en-US" dirty="0">
+                <a:solidFill>
+                  <a:schemeClr val="tx1"/>
+                </a:solidFill>
+              </a:rPr>
+              <a:t> e WHERE </a:t>
+            </a:r>
+            <a:r>
+              <a:rPr lang="en-US" dirty="0" err="1">
+                <a:solidFill>
+                  <a:schemeClr val="tx1"/>
+                </a:solidFill>
+              </a:rPr>
+              <a:t>c.TicketID</a:t>
+            </a:r>
+            <a:r>
+              <a:rPr lang="en-US" dirty="0">
+                <a:solidFill>
+                  <a:schemeClr val="tx1"/>
+                </a:solidFill>
+              </a:rPr>
+              <a:t>=</a:t>
+            </a:r>
+            <a:r>
+              <a:rPr lang="en-US" dirty="0" err="1">
+                <a:solidFill>
+                  <a:schemeClr val="tx1"/>
+                </a:solidFill>
+              </a:rPr>
+              <a:t>e.ticket_assigned</a:t>
+            </a:r>
+            <a:r>
+              <a:rPr lang="en-US" dirty="0">
+                <a:solidFill>
+                  <a:schemeClr val="tx1"/>
+                </a:solidFill>
+              </a:rPr>
+              <a:t> </a:t>
+            </a:r>
+            <a:r>
+              <a:rPr lang="en-US" u="sng" dirty="0">
+                <a:solidFill>
+                  <a:schemeClr val="tx1"/>
+                </a:solidFill>
+                <a:hlinkClick r:id="rId3"/>
+              </a:rPr>
+              <a:t>AND</a:t>
+            </a:r>
+            <a:r>
+              <a:rPr lang="en-US" dirty="0">
+                <a:solidFill>
+                  <a:schemeClr val="tx1"/>
+                </a:solidFill>
+              </a:rPr>
+              <a:t> </a:t>
+            </a:r>
+            <a:r>
+              <a:rPr lang="en-US" dirty="0" err="1">
+                <a:solidFill>
+                  <a:schemeClr val="tx1"/>
+                </a:solidFill>
+              </a:rPr>
+              <a:t>e.EMPID</a:t>
+            </a:r>
+            <a:r>
+              <a:rPr lang="en-US" dirty="0">
+                <a:solidFill>
+                  <a:schemeClr val="tx1"/>
+                </a:solidFill>
+              </a:rPr>
+              <a:t> &gt;(</a:t>
+            </a:r>
+            <a:r>
+              <a:rPr lang="en-US" u="sng" dirty="0">
+                <a:solidFill>
+                  <a:schemeClr val="tx1"/>
+                </a:solidFill>
+                <a:hlinkClick r:id="rId2"/>
+              </a:rPr>
+              <a:t>SELECT</a:t>
+            </a:r>
+            <a:r>
+              <a:rPr lang="en-US" dirty="0">
+                <a:solidFill>
+                  <a:schemeClr val="tx1"/>
+                </a:solidFill>
+              </a:rPr>
+              <a:t> EMPID FROM employee WHERE </a:t>
+            </a:r>
+            <a:r>
+              <a:rPr lang="en-US" dirty="0" err="1">
+                <a:solidFill>
+                  <a:schemeClr val="tx1"/>
+                </a:solidFill>
+              </a:rPr>
+              <a:t>ticket_assigned</a:t>
+            </a:r>
+            <a:r>
+              <a:rPr lang="en-US" dirty="0">
+                <a:solidFill>
+                  <a:schemeClr val="tx1"/>
+                </a:solidFill>
+              </a:rPr>
+              <a:t> ='A123456789');</a:t>
+            </a:r>
+          </a:p>
+          <a:p>
+            <a:r>
+              <a:rPr lang="en-US" dirty="0">
+                <a:solidFill>
+                  <a:schemeClr val="tx1"/>
+                </a:solidFill>
+              </a:rPr>
+              <a:t> </a:t>
+            </a:r>
+          </a:p>
+          <a:p>
+            <a:endParaRPr lang="en-US" dirty="0"/>
+          </a:p>
+        </p:txBody>
+      </p:sp>
+    </p:spTree>
+    <p:extLst>
+      <p:ext uri="{BB962C8B-B14F-4D97-AF65-F5344CB8AC3E}">
+        <p14:creationId xmlns:p14="http://schemas.microsoft.com/office/powerpoint/2010/main" val="2173686961"/>
+      </p:ext>
+    </p:extLst>
+  </p:cSld>
+  <p:clrMapOvr>
+    <a:masterClrMapping/>
+  </p:clrMapOvr>
+</p:sld>
+</file>
+
+<file path=ppt/slides/slide13.xml><?xml version="1.0" encoding="utf-8"?>
+<p:sld xmlns:a="http://schemas.openxmlformats.org/drawingml/2006/main" xmlns:r="http://schemas.openxmlformats.org/officeDocument/2006/relationships" xmlns:p="http://schemas.openxmlformats.org/presentationml/2006/main">
+  <p:cSld>
+    <p:spTree>
+      <p:nvGrpSpPr>
+        <p:cNvPr id="1" name=""/>
+        <p:cNvGrpSpPr/>
+        <p:nvPr/>
+      </p:nvGrpSpPr>
+      <p:grpSpPr>
+        <a:xfrm>
+          <a:off x="0" y="0"/>
+          <a:ext cx="0" cy="0"/>
+          <a:chOff x="0" y="0"/>
+          <a:chExt cx="0" cy="0"/>
+        </a:xfrm>
+      </p:grpSpPr>
+      <p:sp>
+        <p:nvSpPr>
+          <p:cNvPr id="4" name="Content Placeholder 2">
+            <a:extLst>
+              <a:ext uri="{FF2B5EF4-FFF2-40B4-BE49-F238E27FC236}">
+                <a16:creationId xmlns:a16="http://schemas.microsoft.com/office/drawing/2014/main" id="{B6403606-01B7-45D1-81EE-F802CA04897B}"/>
+              </a:ext>
+            </a:extLst>
+          </p:cNvPr>
+          <p:cNvSpPr txBox="1">
+            <a:spLocks/>
+          </p:cNvSpPr>
+          <p:nvPr/>
+        </p:nvSpPr>
+        <p:spPr>
+          <a:xfrm>
+            <a:off x="1218406" y="5268259"/>
+            <a:ext cx="9755188" cy="1856441"/>
+          </a:xfrm>
+          <a:prstGeom prst="rect">
+            <a:avLst/>
+          </a:prstGeom>
+        </p:spPr>
+        <p:txBody>
+          <a:bodyPr vert="horz" lIns="91440" tIns="45720" rIns="91440" bIns="45720" rtlCol="0" anchor="t">
+            <a:normAutofit/>
+          </a:bodyPr>
+          <a:lstStyle>
+            <a:lvl1pPr marL="0" indent="0" algn="l" defTabSz="457200" rtl="0" eaLnBrk="1" latinLnBrk="0" hangingPunct="1">
+              <a:spcBef>
+                <a:spcPts val="1000"/>
+              </a:spcBef>
+              <a:spcAft>
+                <a:spcPts val="0"/>
+              </a:spcAft>
+              <a:buClr>
+                <a:schemeClr val="bg2">
+                  <a:lumMod val="40000"/>
+                  <a:lumOff val="60000"/>
+                </a:schemeClr>
+              </a:buClr>
+              <a:buSzPct val="80000"/>
+              <a:buFont typeface="Wingdings 3" charset="2"/>
+              <a:buNone/>
+              <a:defRPr sz="2000" b="0" i="0" kern="1200" cap="all">
+                <a:solidFill>
+                  <a:schemeClr val="bg2">
+                    <a:lumMod val="40000"/>
+                    <a:lumOff val="60000"/>
+                  </a:schemeClr>
+                </a:solidFill>
+                <a:latin typeface="+mj-lt"/>
+                <a:ea typeface="+mj-ea"/>
+                <a:cs typeface="+mj-cs"/>
+              </a:defRPr>
+            </a:lvl1pPr>
+            <a:lvl2pPr marL="457200" indent="0" algn="l" defTabSz="457200" rtl="0" eaLnBrk="1" latinLnBrk="0" hangingPunct="1">
+              <a:spcBef>
+                <a:spcPts val="1000"/>
+              </a:spcBef>
+              <a:spcAft>
+                <a:spcPts val="0"/>
+              </a:spcAft>
+              <a:buClr>
+                <a:schemeClr val="bg2">
+                  <a:lumMod val="40000"/>
+                  <a:lumOff val="60000"/>
+                </a:schemeClr>
+              </a:buClr>
+              <a:buSzPct val="80000"/>
+              <a:buFont typeface="Wingdings 3" charset="2"/>
+              <a:buNone/>
+              <a:defRPr sz="1800" b="0" i="0" kern="1200">
+                <a:solidFill>
+                  <a:schemeClr val="tx1">
+                    <a:tint val="75000"/>
+                  </a:schemeClr>
+                </a:solidFill>
+                <a:latin typeface="+mj-lt"/>
+                <a:ea typeface="+mj-ea"/>
+                <a:cs typeface="+mj-cs"/>
+              </a:defRPr>
+            </a:lvl2pPr>
+            <a:lvl3pPr marL="914400" indent="0" algn="l" defTabSz="457200" rtl="0" eaLnBrk="1" latinLnBrk="0" hangingPunct="1">
+              <a:spcBef>
+                <a:spcPts val="1000"/>
+              </a:spcBef>
+              <a:spcAft>
+                <a:spcPts val="0"/>
+              </a:spcAft>
+              <a:buClr>
+                <a:schemeClr val="bg2">
+                  <a:lumMod val="40000"/>
+                  <a:lumOff val="60000"/>
+                </a:schemeClr>
+              </a:buClr>
+              <a:buSzPct val="80000"/>
+              <a:buFont typeface="Wingdings 3" charset="2"/>
+              <a:buNone/>
+              <a:defRPr sz="1600" b="0" i="0" kern="1200">
+                <a:solidFill>
+                  <a:schemeClr val="tx1">
+                    <a:tint val="75000"/>
+                  </a:schemeClr>
+                </a:solidFill>
+                <a:latin typeface="+mj-lt"/>
+                <a:ea typeface="+mj-ea"/>
+                <a:cs typeface="+mj-cs"/>
+              </a:defRPr>
+            </a:lvl3pPr>
+            <a:lvl4pPr marL="1371600" indent="0" algn="l" defTabSz="457200" rtl="0" eaLnBrk="1" latinLnBrk="0" hangingPunct="1">
+              <a:spcBef>
+                <a:spcPts val="1000"/>
+              </a:spcBef>
+              <a:spcAft>
+                <a:spcPts val="0"/>
+              </a:spcAft>
+              <a:buClr>
+                <a:schemeClr val="bg2">
+                  <a:lumMod val="40000"/>
+                  <a:lumOff val="60000"/>
+                </a:schemeClr>
+              </a:buClr>
+              <a:buSzPct val="80000"/>
+              <a:buFont typeface="Wingdings 3" charset="2"/>
+              <a:buNone/>
+              <a:defRPr sz="1400" b="0" i="0" kern="1200">
+                <a:solidFill>
+                  <a:schemeClr val="tx1">
+                    <a:tint val="75000"/>
+                  </a:schemeClr>
+                </a:solidFill>
+                <a:latin typeface="+mj-lt"/>
+                <a:ea typeface="+mj-ea"/>
+                <a:cs typeface="+mj-cs"/>
+              </a:defRPr>
+            </a:lvl4pPr>
+            <a:lvl5pPr marL="1828800" indent="0" algn="l" defTabSz="457200" rtl="0" eaLnBrk="1" latinLnBrk="0" hangingPunct="1">
+              <a:spcBef>
+                <a:spcPts val="1000"/>
+              </a:spcBef>
+              <a:spcAft>
+                <a:spcPts val="0"/>
+              </a:spcAft>
+              <a:buClr>
+                <a:schemeClr val="bg2">
+                  <a:lumMod val="40000"/>
+                  <a:lumOff val="60000"/>
+                </a:schemeClr>
+              </a:buClr>
+              <a:buSzPct val="80000"/>
+              <a:buFont typeface="Wingdings 3" charset="2"/>
+              <a:buNone/>
+              <a:defRPr sz="1400" b="0" i="0" kern="1200">
+                <a:solidFill>
+                  <a:schemeClr val="tx1">
+                    <a:tint val="75000"/>
+                  </a:schemeClr>
+                </a:solidFill>
+                <a:latin typeface="+mj-lt"/>
+                <a:ea typeface="+mj-ea"/>
+                <a:cs typeface="+mj-cs"/>
+              </a:defRPr>
+            </a:lvl5pPr>
+            <a:lvl6pPr marL="2286000" indent="0" algn="l" defTabSz="457200" rtl="0" eaLnBrk="1" latinLnBrk="0" hangingPunct="1">
+              <a:spcBef>
+                <a:spcPts val="1000"/>
+              </a:spcBef>
+              <a:spcAft>
+                <a:spcPts val="0"/>
+              </a:spcAft>
+              <a:buClr>
+                <a:schemeClr val="bg2">
+                  <a:lumMod val="40000"/>
+                  <a:lumOff val="60000"/>
+                </a:schemeClr>
+              </a:buClr>
+              <a:buSzPct val="80000"/>
+              <a:buFont typeface="Wingdings 3" charset="2"/>
+              <a:buNone/>
+              <a:defRPr sz="1400" b="0" i="0" kern="1200">
+                <a:solidFill>
+                  <a:schemeClr val="tx1">
+                    <a:tint val="75000"/>
+                  </a:schemeClr>
+                </a:solidFill>
+                <a:latin typeface="+mj-lt"/>
+                <a:ea typeface="+mj-ea"/>
+                <a:cs typeface="+mj-cs"/>
+              </a:defRPr>
+            </a:lvl6pPr>
+            <a:lvl7pPr marL="2743200" indent="0" algn="l" defTabSz="457200" rtl="0" eaLnBrk="1" latinLnBrk="0" hangingPunct="1">
+              <a:spcBef>
+                <a:spcPts val="1000"/>
+              </a:spcBef>
+              <a:spcAft>
+                <a:spcPts val="0"/>
+              </a:spcAft>
+              <a:buClr>
+                <a:schemeClr val="bg2">
+                  <a:lumMod val="40000"/>
+                  <a:lumOff val="60000"/>
+                </a:schemeClr>
+              </a:buClr>
+              <a:buSzPct val="80000"/>
+              <a:buFont typeface="Wingdings 3" charset="2"/>
+              <a:buNone/>
+              <a:defRPr sz="1400" b="0" i="0" kern="1200">
+                <a:solidFill>
+                  <a:schemeClr val="tx1">
+                    <a:tint val="75000"/>
+                  </a:schemeClr>
+                </a:solidFill>
+                <a:latin typeface="+mj-lt"/>
+                <a:ea typeface="+mj-ea"/>
+                <a:cs typeface="+mj-cs"/>
+              </a:defRPr>
+            </a:lvl7pPr>
+            <a:lvl8pPr marL="3200400" indent="0" algn="l" defTabSz="457200" rtl="0" eaLnBrk="1" latinLnBrk="0" hangingPunct="1">
+              <a:spcBef>
+                <a:spcPts val="1000"/>
+              </a:spcBef>
+              <a:spcAft>
+                <a:spcPts val="0"/>
+              </a:spcAft>
+              <a:buClr>
+                <a:schemeClr val="bg2">
+                  <a:lumMod val="40000"/>
+                  <a:lumOff val="60000"/>
+                </a:schemeClr>
+              </a:buClr>
+              <a:buSzPct val="80000"/>
+              <a:buFont typeface="Wingdings 3" charset="2"/>
+              <a:buNone/>
+              <a:defRPr sz="1400" b="0" i="0" kern="1200">
+                <a:solidFill>
+                  <a:schemeClr val="tx1">
+                    <a:tint val="75000"/>
+                  </a:schemeClr>
+                </a:solidFill>
+                <a:latin typeface="+mj-lt"/>
+                <a:ea typeface="+mj-ea"/>
+                <a:cs typeface="+mj-cs"/>
+              </a:defRPr>
+            </a:lvl8pPr>
+            <a:lvl9pPr marL="3657600" indent="0" algn="l" defTabSz="457200" rtl="0" eaLnBrk="1" latinLnBrk="0" hangingPunct="1">
+              <a:spcBef>
+                <a:spcPts val="1000"/>
+              </a:spcBef>
+              <a:spcAft>
+                <a:spcPts val="0"/>
+              </a:spcAft>
+              <a:buClr>
+                <a:schemeClr val="bg2">
+                  <a:lumMod val="40000"/>
+                  <a:lumOff val="60000"/>
+                </a:schemeClr>
+              </a:buClr>
+              <a:buSzPct val="80000"/>
+              <a:buFont typeface="Wingdings 3" charset="2"/>
+              <a:buNone/>
+              <a:defRPr sz="1400" b="0" i="0" kern="1200">
+                <a:solidFill>
+                  <a:schemeClr val="tx1">
+                    <a:tint val="75000"/>
+                  </a:schemeClr>
+                </a:solidFill>
+                <a:latin typeface="+mj-lt"/>
+                <a:ea typeface="+mj-ea"/>
+                <a:cs typeface="+mj-cs"/>
+              </a:defRPr>
+            </a:lvl9pPr>
+          </a:lstStyle>
+          <a:p>
+            <a:r>
+              <a:rPr lang="en-US" b="1" dirty="0">
+                <a:solidFill>
+                  <a:schemeClr val="tx1"/>
+                </a:solidFill>
+              </a:rPr>
+              <a:t>Retrieving the average amount of customers an employee assists:</a:t>
+            </a:r>
+          </a:p>
+          <a:p>
+            <a:endParaRPr lang="en-US" b="1" dirty="0">
+              <a:solidFill>
+                <a:schemeClr val="tx1"/>
+              </a:solidFill>
+            </a:endParaRPr>
+          </a:p>
+          <a:p>
+            <a:r>
+              <a:rPr lang="en-US" u="sng" dirty="0">
+                <a:solidFill>
+                  <a:schemeClr val="tx1"/>
+                </a:solidFill>
+                <a:hlinkClick r:id="rId2"/>
+              </a:rPr>
+              <a:t>SELECT</a:t>
+            </a:r>
+            <a:r>
+              <a:rPr lang="en-US" dirty="0">
+                <a:solidFill>
+                  <a:schemeClr val="tx1"/>
+                </a:solidFill>
+              </a:rPr>
+              <a:t> EMPID, </a:t>
+            </a:r>
+            <a:r>
+              <a:rPr lang="en-US" u="sng" dirty="0">
+                <a:solidFill>
+                  <a:schemeClr val="tx1"/>
+                </a:solidFill>
+                <a:hlinkClick r:id="rId3"/>
+              </a:rPr>
+              <a:t>AVG</a:t>
+            </a:r>
+            <a:r>
+              <a:rPr lang="en-US" dirty="0">
+                <a:solidFill>
+                  <a:schemeClr val="tx1"/>
+                </a:solidFill>
+              </a:rPr>
+              <a:t>(</a:t>
+            </a:r>
+            <a:r>
+              <a:rPr lang="en-US" dirty="0" err="1">
+                <a:solidFill>
+                  <a:schemeClr val="tx1"/>
+                </a:solidFill>
+              </a:rPr>
+              <a:t>ticket_assigned</a:t>
+            </a:r>
+            <a:r>
+              <a:rPr lang="en-US" dirty="0">
+                <a:solidFill>
+                  <a:schemeClr val="tx1"/>
+                </a:solidFill>
+              </a:rPr>
+              <a:t>) FROM employee GROUP BYEMPID</a:t>
+            </a:r>
+          </a:p>
+          <a:p>
+            <a:endParaRPr lang="en-US" dirty="0">
+              <a:solidFill>
+                <a:schemeClr val="tx1"/>
+              </a:solidFill>
+            </a:endParaRPr>
+          </a:p>
+        </p:txBody>
+      </p:sp>
+    </p:spTree>
+    <p:extLst>
+      <p:ext uri="{BB962C8B-B14F-4D97-AF65-F5344CB8AC3E}">
+        <p14:creationId xmlns:p14="http://schemas.microsoft.com/office/powerpoint/2010/main" val="2174073728"/>
+      </p:ext>
+    </p:extLst>
+  </p:cSld>
+  <p:clrMapOvr>
+    <a:masterClrMapping/>
+  </p:clrMapOvr>
+</p:sld>
+</file>
+
+<file path=ppt/slides/slide14.xml><?xml version="1.0" encoding="utf-8"?>
+<p:sld xmlns:a="http://schemas.openxmlformats.org/drawingml/2006/main" xmlns:r="http://schemas.openxmlformats.org/officeDocument/2006/relationships" xmlns:p="http://schemas.openxmlformats.org/presentationml/2006/main">
+  <p:cSld>
+    <p:spTree>
+      <p:nvGrpSpPr>
+        <p:cNvPr id="1" name=""/>
+        <p:cNvGrpSpPr/>
+        <p:nvPr/>
+      </p:nvGrpSpPr>
+      <p:grpSpPr>
+        <a:xfrm>
+          <a:off x="0" y="0"/>
+          <a:ext cx="0" cy="0"/>
+          <a:chOff x="0" y="0"/>
+          <a:chExt cx="0" cy="0"/>
+        </a:xfrm>
+      </p:grpSpPr>
+      <p:sp>
+        <p:nvSpPr>
+          <p:cNvPr id="4" name="Content Placeholder 2">
+            <a:extLst>
+              <a:ext uri="{FF2B5EF4-FFF2-40B4-BE49-F238E27FC236}">
+                <a16:creationId xmlns:a16="http://schemas.microsoft.com/office/drawing/2014/main" id="{2910983C-776A-4B8D-A86F-8E751890271C}"/>
+              </a:ext>
+            </a:extLst>
+          </p:cNvPr>
+          <p:cNvSpPr txBox="1">
+            <a:spLocks/>
+          </p:cNvSpPr>
+          <p:nvPr/>
+        </p:nvSpPr>
+        <p:spPr>
+          <a:xfrm>
+            <a:off x="1218406" y="4823759"/>
+            <a:ext cx="9755188" cy="2199341"/>
+          </a:xfrm>
+          <a:prstGeom prst="rect">
+            <a:avLst/>
+          </a:prstGeom>
+        </p:spPr>
+        <p:txBody>
+          <a:bodyPr vert="horz" lIns="91440" tIns="45720" rIns="91440" bIns="45720" rtlCol="0" anchor="t">
+            <a:normAutofit/>
+          </a:bodyPr>
+          <a:lstStyle>
+            <a:lvl1pPr marL="0" indent="0" algn="l" defTabSz="457200" rtl="0" eaLnBrk="1" latinLnBrk="0" hangingPunct="1">
+              <a:spcBef>
+                <a:spcPts val="1000"/>
+              </a:spcBef>
+              <a:spcAft>
+                <a:spcPts val="0"/>
+              </a:spcAft>
+              <a:buClr>
+                <a:schemeClr val="bg2">
+                  <a:lumMod val="40000"/>
+                  <a:lumOff val="60000"/>
+                </a:schemeClr>
+              </a:buClr>
+              <a:buSzPct val="80000"/>
+              <a:buFont typeface="Wingdings 3" charset="2"/>
+              <a:buNone/>
+              <a:defRPr sz="2000" b="0" i="0" kern="1200" cap="all">
+                <a:solidFill>
+                  <a:schemeClr val="bg2">
+                    <a:lumMod val="40000"/>
+                    <a:lumOff val="60000"/>
+                  </a:schemeClr>
+                </a:solidFill>
+                <a:latin typeface="+mj-lt"/>
+                <a:ea typeface="+mj-ea"/>
+                <a:cs typeface="+mj-cs"/>
+              </a:defRPr>
+            </a:lvl1pPr>
+            <a:lvl2pPr marL="457200" indent="0" algn="l" defTabSz="457200" rtl="0" eaLnBrk="1" latinLnBrk="0" hangingPunct="1">
+              <a:spcBef>
+                <a:spcPts val="1000"/>
+              </a:spcBef>
+              <a:spcAft>
+                <a:spcPts val="0"/>
+              </a:spcAft>
+              <a:buClr>
+                <a:schemeClr val="bg2">
+                  <a:lumMod val="40000"/>
+                  <a:lumOff val="60000"/>
+                </a:schemeClr>
+              </a:buClr>
+              <a:buSzPct val="80000"/>
+              <a:buFont typeface="Wingdings 3" charset="2"/>
+              <a:buNone/>
+              <a:defRPr sz="1800" b="0" i="0" kern="1200">
+                <a:solidFill>
+                  <a:schemeClr val="tx1">
+                    <a:tint val="75000"/>
+                  </a:schemeClr>
+                </a:solidFill>
+                <a:latin typeface="+mj-lt"/>
+                <a:ea typeface="+mj-ea"/>
+                <a:cs typeface="+mj-cs"/>
+              </a:defRPr>
+            </a:lvl2pPr>
+            <a:lvl3pPr marL="914400" indent="0" algn="l" defTabSz="457200" rtl="0" eaLnBrk="1" latinLnBrk="0" hangingPunct="1">
+              <a:spcBef>
+                <a:spcPts val="1000"/>
+              </a:spcBef>
+              <a:spcAft>
+                <a:spcPts val="0"/>
+              </a:spcAft>
+              <a:buClr>
+                <a:schemeClr val="bg2">
+                  <a:lumMod val="40000"/>
+                  <a:lumOff val="60000"/>
+                </a:schemeClr>
+              </a:buClr>
+              <a:buSzPct val="80000"/>
+              <a:buFont typeface="Wingdings 3" charset="2"/>
+              <a:buNone/>
+              <a:defRPr sz="1600" b="0" i="0" kern="1200">
+                <a:solidFill>
+                  <a:schemeClr val="tx1">
+                    <a:tint val="75000"/>
+                  </a:schemeClr>
+                </a:solidFill>
+                <a:latin typeface="+mj-lt"/>
+                <a:ea typeface="+mj-ea"/>
+                <a:cs typeface="+mj-cs"/>
+              </a:defRPr>
+            </a:lvl3pPr>
+            <a:lvl4pPr marL="1371600" indent="0" algn="l" defTabSz="457200" rtl="0" eaLnBrk="1" latinLnBrk="0" hangingPunct="1">
+              <a:spcBef>
+                <a:spcPts val="1000"/>
+              </a:spcBef>
+              <a:spcAft>
+                <a:spcPts val="0"/>
+              </a:spcAft>
+              <a:buClr>
+                <a:schemeClr val="bg2">
+                  <a:lumMod val="40000"/>
+                  <a:lumOff val="60000"/>
+                </a:schemeClr>
+              </a:buClr>
+              <a:buSzPct val="80000"/>
+              <a:buFont typeface="Wingdings 3" charset="2"/>
+              <a:buNone/>
+              <a:defRPr sz="1400" b="0" i="0" kern="1200">
+                <a:solidFill>
+                  <a:schemeClr val="tx1">
+                    <a:tint val="75000"/>
+                  </a:schemeClr>
+                </a:solidFill>
+                <a:latin typeface="+mj-lt"/>
+                <a:ea typeface="+mj-ea"/>
+                <a:cs typeface="+mj-cs"/>
+              </a:defRPr>
+            </a:lvl4pPr>
+            <a:lvl5pPr marL="1828800" indent="0" algn="l" defTabSz="457200" rtl="0" eaLnBrk="1" latinLnBrk="0" hangingPunct="1">
+              <a:spcBef>
+                <a:spcPts val="1000"/>
+              </a:spcBef>
+              <a:spcAft>
+                <a:spcPts val="0"/>
+              </a:spcAft>
+              <a:buClr>
+                <a:schemeClr val="bg2">
+                  <a:lumMod val="40000"/>
+                  <a:lumOff val="60000"/>
+                </a:schemeClr>
+              </a:buClr>
+              <a:buSzPct val="80000"/>
+              <a:buFont typeface="Wingdings 3" charset="2"/>
+              <a:buNone/>
+              <a:defRPr sz="1400" b="0" i="0" kern="1200">
+                <a:solidFill>
+                  <a:schemeClr val="tx1">
+                    <a:tint val="75000"/>
+                  </a:schemeClr>
+                </a:solidFill>
+                <a:latin typeface="+mj-lt"/>
+                <a:ea typeface="+mj-ea"/>
+                <a:cs typeface="+mj-cs"/>
+              </a:defRPr>
+            </a:lvl5pPr>
+            <a:lvl6pPr marL="2286000" indent="0" algn="l" defTabSz="457200" rtl="0" eaLnBrk="1" latinLnBrk="0" hangingPunct="1">
+              <a:spcBef>
+                <a:spcPts val="1000"/>
+              </a:spcBef>
+              <a:spcAft>
+                <a:spcPts val="0"/>
+              </a:spcAft>
+              <a:buClr>
+                <a:schemeClr val="bg2">
+                  <a:lumMod val="40000"/>
+                  <a:lumOff val="60000"/>
+                </a:schemeClr>
+              </a:buClr>
+              <a:buSzPct val="80000"/>
+              <a:buFont typeface="Wingdings 3" charset="2"/>
+              <a:buNone/>
+              <a:defRPr sz="1400" b="0" i="0" kern="1200">
+                <a:solidFill>
+                  <a:schemeClr val="tx1">
+                    <a:tint val="75000"/>
+                  </a:schemeClr>
+                </a:solidFill>
+                <a:latin typeface="+mj-lt"/>
+                <a:ea typeface="+mj-ea"/>
+                <a:cs typeface="+mj-cs"/>
+              </a:defRPr>
+            </a:lvl6pPr>
+            <a:lvl7pPr marL="2743200" indent="0" algn="l" defTabSz="457200" rtl="0" eaLnBrk="1" latinLnBrk="0" hangingPunct="1">
+              <a:spcBef>
+                <a:spcPts val="1000"/>
+              </a:spcBef>
+              <a:spcAft>
+                <a:spcPts val="0"/>
+              </a:spcAft>
+              <a:buClr>
+                <a:schemeClr val="bg2">
+                  <a:lumMod val="40000"/>
+                  <a:lumOff val="60000"/>
+                </a:schemeClr>
+              </a:buClr>
+              <a:buSzPct val="80000"/>
+              <a:buFont typeface="Wingdings 3" charset="2"/>
+              <a:buNone/>
+              <a:defRPr sz="1400" b="0" i="0" kern="1200">
+                <a:solidFill>
+                  <a:schemeClr val="tx1">
+                    <a:tint val="75000"/>
+                  </a:schemeClr>
+                </a:solidFill>
+                <a:latin typeface="+mj-lt"/>
+                <a:ea typeface="+mj-ea"/>
+                <a:cs typeface="+mj-cs"/>
+              </a:defRPr>
+            </a:lvl7pPr>
+            <a:lvl8pPr marL="3200400" indent="0" algn="l" defTabSz="457200" rtl="0" eaLnBrk="1" latinLnBrk="0" hangingPunct="1">
+              <a:spcBef>
+                <a:spcPts val="1000"/>
+              </a:spcBef>
+              <a:spcAft>
+                <a:spcPts val="0"/>
+              </a:spcAft>
+              <a:buClr>
+                <a:schemeClr val="bg2">
+                  <a:lumMod val="40000"/>
+                  <a:lumOff val="60000"/>
+                </a:schemeClr>
+              </a:buClr>
+              <a:buSzPct val="80000"/>
+              <a:buFont typeface="Wingdings 3" charset="2"/>
+              <a:buNone/>
+              <a:defRPr sz="1400" b="0" i="0" kern="1200">
+                <a:solidFill>
+                  <a:schemeClr val="tx1">
+                    <a:tint val="75000"/>
+                  </a:schemeClr>
+                </a:solidFill>
+                <a:latin typeface="+mj-lt"/>
+                <a:ea typeface="+mj-ea"/>
+                <a:cs typeface="+mj-cs"/>
+              </a:defRPr>
+            </a:lvl8pPr>
+            <a:lvl9pPr marL="3657600" indent="0" algn="l" defTabSz="457200" rtl="0" eaLnBrk="1" latinLnBrk="0" hangingPunct="1">
+              <a:spcBef>
+                <a:spcPts val="1000"/>
+              </a:spcBef>
+              <a:spcAft>
+                <a:spcPts val="0"/>
+              </a:spcAft>
+              <a:buClr>
+                <a:schemeClr val="bg2">
+                  <a:lumMod val="40000"/>
+                  <a:lumOff val="60000"/>
+                </a:schemeClr>
+              </a:buClr>
+              <a:buSzPct val="80000"/>
+              <a:buFont typeface="Wingdings 3" charset="2"/>
+              <a:buNone/>
+              <a:defRPr sz="1400" b="0" i="0" kern="1200">
+                <a:solidFill>
+                  <a:schemeClr val="tx1">
+                    <a:tint val="75000"/>
+                  </a:schemeClr>
+                </a:solidFill>
+                <a:latin typeface="+mj-lt"/>
+                <a:ea typeface="+mj-ea"/>
+                <a:cs typeface="+mj-cs"/>
+              </a:defRPr>
+            </a:lvl9pPr>
+          </a:lstStyle>
+          <a:p>
+            <a:r>
+              <a:rPr lang="en-US" b="1" dirty="0">
+                <a:solidFill>
+                  <a:schemeClr val="tx1"/>
+                </a:solidFill>
+              </a:rPr>
+              <a:t>Retrieving the amount of times a customer comes in and gets assisted by employee based on the amount of </a:t>
+            </a:r>
+            <a:r>
+              <a:rPr lang="en-US" b="1" dirty="0" err="1">
+                <a:solidFill>
+                  <a:schemeClr val="tx1"/>
+                </a:solidFill>
+              </a:rPr>
+              <a:t>ticketIDs</a:t>
+            </a:r>
+            <a:r>
+              <a:rPr lang="en-US" b="1" dirty="0">
+                <a:solidFill>
+                  <a:schemeClr val="tx1"/>
+                </a:solidFill>
+              </a:rPr>
+              <a:t> the that are associated with a customer’s cell number:</a:t>
+            </a:r>
+          </a:p>
+          <a:p>
+            <a:endParaRPr lang="en-US" b="1" dirty="0">
+              <a:solidFill>
+                <a:schemeClr val="tx1"/>
+              </a:solidFill>
+            </a:endParaRPr>
+          </a:p>
+          <a:p>
+            <a:r>
+              <a:rPr lang="en-US" u="sng" dirty="0">
+                <a:solidFill>
+                  <a:schemeClr val="tx1"/>
+                </a:solidFill>
+                <a:hlinkClick r:id="rId2"/>
+              </a:rPr>
+              <a:t>SELECT</a:t>
+            </a:r>
+            <a:r>
+              <a:rPr lang="en-US" dirty="0">
+                <a:solidFill>
+                  <a:schemeClr val="tx1"/>
+                </a:solidFill>
+              </a:rPr>
+              <a:t> </a:t>
+            </a:r>
+            <a:r>
+              <a:rPr lang="en-US" dirty="0" err="1">
+                <a:solidFill>
+                  <a:schemeClr val="tx1"/>
+                </a:solidFill>
+              </a:rPr>
+              <a:t>CellNum</a:t>
+            </a:r>
+            <a:r>
+              <a:rPr lang="en-US" dirty="0">
+                <a:solidFill>
+                  <a:schemeClr val="tx1"/>
+                </a:solidFill>
+              </a:rPr>
+              <a:t>, </a:t>
+            </a:r>
+            <a:r>
+              <a:rPr lang="en-US" u="sng" dirty="0">
+                <a:solidFill>
+                  <a:schemeClr val="tx1"/>
+                </a:solidFill>
+                <a:hlinkClick r:id="rId3"/>
+              </a:rPr>
+              <a:t>COUNT</a:t>
+            </a:r>
+            <a:r>
+              <a:rPr lang="en-US" u="sng" dirty="0">
+                <a:solidFill>
+                  <a:schemeClr val="tx1"/>
+                </a:solidFill>
+              </a:rPr>
+              <a:t> </a:t>
+            </a:r>
+            <a:r>
+              <a:rPr lang="en-US" dirty="0">
+                <a:solidFill>
+                  <a:schemeClr val="tx1"/>
+                </a:solidFill>
+              </a:rPr>
+              <a:t>(</a:t>
+            </a:r>
+            <a:r>
+              <a:rPr lang="en-US" dirty="0" err="1">
+                <a:solidFill>
+                  <a:schemeClr val="tx1"/>
+                </a:solidFill>
+              </a:rPr>
+              <a:t>TicketID</a:t>
+            </a:r>
+            <a:r>
+              <a:rPr lang="en-US" dirty="0">
+                <a:solidFill>
+                  <a:schemeClr val="tx1"/>
+                </a:solidFill>
+              </a:rPr>
+              <a:t>) FROM customer GROUP BY </a:t>
+            </a:r>
+            <a:r>
+              <a:rPr lang="en-US" dirty="0" err="1">
+                <a:solidFill>
+                  <a:schemeClr val="tx1"/>
+                </a:solidFill>
+              </a:rPr>
+              <a:t>CellNum</a:t>
+            </a:r>
+            <a:endParaRPr lang="en-US" dirty="0">
+              <a:solidFill>
+                <a:schemeClr val="tx1"/>
+              </a:solidFill>
+            </a:endParaRPr>
+          </a:p>
+          <a:p>
+            <a:endParaRPr lang="en-US" dirty="0"/>
+          </a:p>
+        </p:txBody>
+      </p:sp>
+    </p:spTree>
+    <p:extLst>
+      <p:ext uri="{BB962C8B-B14F-4D97-AF65-F5344CB8AC3E}">
+        <p14:creationId xmlns:p14="http://schemas.microsoft.com/office/powerpoint/2010/main" val="1315464262"/>
       </p:ext>
     </p:extLst>
   </p:cSld>
@@ -7120,7 +9148,7 @@
           <p:cNvPr id="2" name="Title 1">
             <a:extLst>
               <a:ext uri="{FF2B5EF4-FFF2-40B4-BE49-F238E27FC236}">
-                <a16:creationId xmlns:a16="http://schemas.microsoft.com/office/drawing/2014/main" id="{B0F66E87-72BB-48BC-ADB7-B09748400529}"/>
+                <a16:creationId xmlns:a16="http://schemas.microsoft.com/office/drawing/2014/main" id="{2C195901-8E73-4C81-9A6C-E7E7AE9C3D44}"/>
               </a:ext>
             </a:extLst>
           </p:cNvPr>
@@ -7138,7 +9166,7 @@
           <a:p>
             <a:r>
               <a:rPr lang="en-US" b="1" dirty="0"/>
-              <a:t>Queries</a:t>
+              <a:t>Normal Forms</a:t>
             </a:r>
           </a:p>
         </p:txBody>
@@ -7148,7 +9176,7 @@
           <p:cNvPr id="3" name="Content Placeholder 2">
             <a:extLst>
               <a:ext uri="{FF2B5EF4-FFF2-40B4-BE49-F238E27FC236}">
-                <a16:creationId xmlns:a16="http://schemas.microsoft.com/office/drawing/2014/main" id="{6E7E5A08-6B3F-4759-A793-663C15D69177}"/>
+                <a16:creationId xmlns:a16="http://schemas.microsoft.com/office/drawing/2014/main" id="{F8EE1CF2-99E4-4199-8E1D-9D7B9EC2263B}"/>
               </a:ext>
             </a:extLst>
           </p:cNvPr>
@@ -7159,180 +9187,19 @@
             <p:ph idx="1"/>
           </p:nvPr>
         </p:nvSpPr>
-        <p:spPr>
-          <a:xfrm>
-            <a:off x="991090" y="1853248"/>
-            <a:ext cx="10554799" cy="4552034"/>
-          </a:xfrm>
-        </p:spPr>
-        <p:txBody>
-          <a:bodyPr>
-            <a:normAutofit lnSpcReduction="10000"/>
-          </a:bodyPr>
+        <p:spPr/>
+        <p:txBody>
+          <a:bodyPr/>
           <a:lstStyle/>
           <a:p>
-            <a:pPr marL="0" lvl="0" indent="0">
-              <a:buNone/>
-            </a:pPr>
-            <a:r>
-              <a:rPr lang="en-US" b="1" dirty="0"/>
-              <a:t>Selecting specific Customer from Database:</a:t>
-            </a:r>
-          </a:p>
-          <a:p>
-            <a:pPr marL="0" lvl="0" indent="0">
-              <a:buNone/>
-            </a:pPr>
-            <a:endParaRPr lang="en-US" b="1" dirty="0"/>
-          </a:p>
-          <a:p>
-            <a:pPr marL="0" indent="0">
-              <a:buNone/>
-            </a:pPr>
-            <a:r>
-              <a:rPr lang="en-US" u="sng" dirty="0">
-                <a:hlinkClick r:id="rId2"/>
-              </a:rPr>
-              <a:t>SELECT</a:t>
-            </a:r>
-            <a:r>
-              <a:rPr lang="en-US" dirty="0"/>
-              <a:t> </a:t>
-            </a:r>
-            <a:r>
-              <a:rPr lang="en-US" dirty="0" err="1"/>
-              <a:t>Fname</a:t>
-            </a:r>
-            <a:r>
-              <a:rPr lang="en-US" dirty="0"/>
-              <a:t>, </a:t>
-            </a:r>
-            <a:r>
-              <a:rPr lang="en-US" dirty="0" err="1"/>
-              <a:t>Lname,CellNum,Email</a:t>
-            </a:r>
-            <a:r>
-              <a:rPr lang="en-US" dirty="0"/>
-              <a:t>, </a:t>
-            </a:r>
-            <a:r>
-              <a:rPr lang="en-US" dirty="0" err="1"/>
-              <a:t>ReasonForVisit</a:t>
-            </a:r>
-            <a:r>
-              <a:rPr lang="en-US" dirty="0"/>
-              <a:t>, </a:t>
-            </a:r>
-            <a:r>
-              <a:rPr lang="en-US" dirty="0" err="1"/>
-              <a:t>TicketID</a:t>
-            </a:r>
-            <a:r>
-              <a:rPr lang="en-US" dirty="0"/>
-              <a:t> FROM customer;</a:t>
-            </a:r>
-          </a:p>
-          <a:p>
-            <a:pPr marL="0" indent="0">
-              <a:buNone/>
-            </a:pPr>
-            <a:r>
-              <a:rPr lang="en-US" dirty="0"/>
-              <a:t> </a:t>
-            </a:r>
-          </a:p>
-          <a:p>
-            <a:pPr marL="0" lvl="0" indent="0">
-              <a:buNone/>
-            </a:pPr>
-            <a:r>
-              <a:rPr lang="en-US" b="1" dirty="0"/>
-              <a:t>Selecting the number of tickets that an employee has assigned themselves to (how many customers are they interacting with):</a:t>
-            </a:r>
-          </a:p>
-          <a:p>
-            <a:pPr marL="0" lvl="0" indent="0">
-              <a:buNone/>
-            </a:pPr>
-            <a:endParaRPr lang="en-US" b="1" dirty="0"/>
-          </a:p>
-          <a:p>
-            <a:pPr marL="0" indent="0">
-              <a:buNone/>
-            </a:pPr>
-            <a:r>
-              <a:rPr lang="en-US" u="sng" dirty="0">
-                <a:hlinkClick r:id="rId2"/>
-              </a:rPr>
-              <a:t>SELECT</a:t>
-            </a:r>
-            <a:r>
-              <a:rPr lang="en-US" dirty="0"/>
-              <a:t> </a:t>
-            </a:r>
-            <a:r>
-              <a:rPr lang="en-US" u="sng" dirty="0">
-                <a:hlinkClick r:id="rId3"/>
-              </a:rPr>
-              <a:t>COUNT</a:t>
-            </a:r>
-            <a:r>
-              <a:rPr lang="en-US" dirty="0"/>
-              <a:t>(EMPID), </a:t>
-            </a:r>
-            <a:r>
-              <a:rPr lang="en-US" dirty="0" err="1"/>
-              <a:t>ticket_assigned</a:t>
-            </a:r>
-            <a:r>
-              <a:rPr lang="en-US" dirty="0"/>
-              <a:t> FROM employee GROUP </a:t>
-            </a:r>
-            <a:r>
-              <a:rPr lang="en-US" dirty="0" err="1"/>
-              <a:t>BYticket_assigned</a:t>
-            </a:r>
-            <a:r>
-              <a:rPr lang="en-US" dirty="0"/>
-              <a:t>;</a:t>
-            </a:r>
-          </a:p>
-          <a:p>
-            <a:pPr marL="0" indent="0">
-              <a:buNone/>
-            </a:pPr>
-            <a:r>
-              <a:rPr lang="en-US" dirty="0"/>
-              <a:t> </a:t>
-            </a:r>
-          </a:p>
-          <a:p>
-            <a:pPr marL="0" indent="0">
-              <a:buNone/>
-            </a:pPr>
-            <a:r>
-              <a:rPr lang="en-US" dirty="0"/>
-              <a:t> </a:t>
-            </a:r>
-          </a:p>
-          <a:p>
-            <a:pPr marL="0" indent="0">
-              <a:buNone/>
-            </a:pPr>
-            <a:r>
-              <a:rPr lang="en-US" dirty="0"/>
-              <a:t> </a:t>
-            </a:r>
-          </a:p>
-          <a:p>
-            <a:endParaRPr lang="en-US" dirty="0"/>
+            <a:endParaRPr lang="en-US"/>
           </a:p>
         </p:txBody>
       </p:sp>
     </p:spTree>
     <p:extLst>
       <p:ext uri="{BB962C8B-B14F-4D97-AF65-F5344CB8AC3E}">
-        <p14:creationId xmlns:p14="http://schemas.microsoft.com/office/powerpoint/2010/main" val="310390708"/>
+        <p14:creationId xmlns:p14="http://schemas.microsoft.com/office/powerpoint/2010/main" val="2186844450"/>
       </p:ext>
     </p:extLst>
   </p:cSld>
@@ -7364,7 +9231,7 @@
           <p:cNvPr id="2" name="Title 1">
             <a:extLst>
               <a:ext uri="{FF2B5EF4-FFF2-40B4-BE49-F238E27FC236}">
-                <a16:creationId xmlns:a16="http://schemas.microsoft.com/office/drawing/2014/main" id="{0F5814DD-6E41-4D1E-AA70-61BCF4473AD9}"/>
+                <a16:creationId xmlns:a16="http://schemas.microsoft.com/office/drawing/2014/main" id="{BAE5D6E3-3E7E-4BC7-8CBA-F50D106673B6}"/>
               </a:ext>
             </a:extLst>
           </p:cNvPr>
@@ -7382,7 +9249,7 @@
           <a:p>
             <a:r>
               <a:rPr lang="en-US" b="1" dirty="0"/>
-              <a:t>Queries</a:t>
+              <a:t>Possible Users</a:t>
             </a:r>
           </a:p>
         </p:txBody>
@@ -7392,7 +9259,7 @@
           <p:cNvPr id="3" name="Content Placeholder 2">
             <a:extLst>
               <a:ext uri="{FF2B5EF4-FFF2-40B4-BE49-F238E27FC236}">
-                <a16:creationId xmlns:a16="http://schemas.microsoft.com/office/drawing/2014/main" id="{6FA22188-4661-4B00-B10B-2E466ABBEFDA}"/>
+                <a16:creationId xmlns:a16="http://schemas.microsoft.com/office/drawing/2014/main" id="{2D9412E7-40EA-48F1-B99B-C4887C820B18}"/>
               </a:ext>
             </a:extLst>
           </p:cNvPr>
@@ -7403,282 +9270,32 @@
             <p:ph idx="1"/>
           </p:nvPr>
         </p:nvSpPr>
-        <p:spPr>
-          <a:xfrm>
-            <a:off x="760412" y="1331259"/>
-            <a:ext cx="9755188" cy="5074023"/>
-          </a:xfrm>
-        </p:spPr>
-        <p:txBody>
-          <a:bodyPr>
-            <a:normAutofit fontScale="92500" lnSpcReduction="20000"/>
-          </a:bodyPr>
+        <p:spPr/>
+        <p:txBody>
+          <a:bodyPr/>
           <a:lstStyle/>
           <a:p>
-            <a:pPr marL="0" lvl="0" indent="0">
-              <a:buNone/>
-            </a:pPr>
-            <a:r>
-              <a:rPr lang="en-US" b="1" dirty="0"/>
-              <a:t>Retrieving which employee assisted which customer based on specific </a:t>
-            </a:r>
-            <a:r>
-              <a:rPr lang="en-US" b="1" dirty="0" err="1"/>
-              <a:t>ticketID</a:t>
-            </a:r>
-            <a:r>
-              <a:rPr lang="en-US" b="1" dirty="0"/>
-              <a:t> :</a:t>
-            </a:r>
-          </a:p>
-          <a:p>
-            <a:pPr marL="0" lvl="0" indent="0">
-              <a:buNone/>
-            </a:pPr>
-            <a:endParaRPr lang="en-US" b="1" dirty="0"/>
-          </a:p>
-          <a:p>
-            <a:pPr marL="0" indent="0">
-              <a:buNone/>
-            </a:pPr>
-            <a:r>
-              <a:rPr lang="en-US" u="sng" dirty="0">
-                <a:hlinkClick r:id="rId2"/>
-              </a:rPr>
-              <a:t>SELECT</a:t>
-            </a:r>
             <a:r>
               <a:rPr lang="en-US" dirty="0"/>
-              <a:t> </a:t>
-            </a:r>
-            <a:r>
-              <a:rPr lang="en-US" dirty="0" err="1"/>
-              <a:t>c.CellNum</a:t>
-            </a:r>
+              <a:t>Restaurants</a:t>
+            </a:r>
+          </a:p>
+          <a:p>
             <a:r>
               <a:rPr lang="en-US" dirty="0"/>
-              <a:t>, </a:t>
-            </a:r>
-            <a:r>
-              <a:rPr lang="en-US" dirty="0" err="1"/>
-              <a:t>c.TicketID</a:t>
-            </a:r>
+              <a:t>Telecommunication Retailers (AT&amp;T, Verizon, T-Mobile, etc.)</a:t>
+            </a:r>
+          </a:p>
+          <a:p>
             <a:r>
               <a:rPr lang="en-US" dirty="0"/>
-              <a:t>, </a:t>
-            </a:r>
-            <a:r>
-              <a:rPr lang="en-US" dirty="0" err="1"/>
-              <a:t>e.EMPID</a:t>
-            </a:r>
-            <a:r>
-              <a:rPr lang="en-US" dirty="0"/>
-              <a:t> FROM customer </a:t>
-            </a:r>
-            <a:r>
-              <a:rPr lang="en-US" dirty="0" err="1"/>
-              <a:t>c,employee</a:t>
-            </a:r>
-            <a:r>
-              <a:rPr lang="en-US" dirty="0"/>
-              <a:t> e WHERE </a:t>
-            </a:r>
-            <a:r>
-              <a:rPr lang="en-US" dirty="0" err="1"/>
-              <a:t>c.TicketID</a:t>
-            </a:r>
-            <a:r>
-              <a:rPr lang="en-US" dirty="0"/>
-              <a:t>=</a:t>
-            </a:r>
-            <a:r>
-              <a:rPr lang="en-US" dirty="0" err="1"/>
-              <a:t>e.ticket_assigned</a:t>
-            </a:r>
-            <a:r>
-              <a:rPr lang="en-US" dirty="0"/>
-              <a:t> </a:t>
-            </a:r>
-            <a:r>
-              <a:rPr lang="en-US" u="sng" dirty="0">
-                <a:hlinkClick r:id="rId3"/>
-              </a:rPr>
-              <a:t>AND</a:t>
-            </a:r>
-            <a:r>
-              <a:rPr lang="en-US" dirty="0"/>
-              <a:t> </a:t>
-            </a:r>
-            <a:r>
-              <a:rPr lang="en-US" dirty="0" err="1"/>
-              <a:t>e.EMPID</a:t>
-            </a:r>
-            <a:r>
-              <a:rPr lang="en-US" dirty="0"/>
-              <a:t> &gt;(</a:t>
-            </a:r>
-            <a:r>
-              <a:rPr lang="en-US" u="sng" dirty="0">
-                <a:hlinkClick r:id="rId2"/>
-              </a:rPr>
-              <a:t>SELECT</a:t>
-            </a:r>
-            <a:r>
-              <a:rPr lang="en-US" dirty="0"/>
-              <a:t> EMPID FROM employee WHERE </a:t>
-            </a:r>
-            <a:r>
-              <a:rPr lang="en-US" dirty="0" err="1"/>
-              <a:t>ticket_assigned</a:t>
-            </a:r>
-            <a:r>
-              <a:rPr lang="en-US" dirty="0"/>
-              <a:t> ='A123456789');</a:t>
-            </a:r>
-          </a:p>
-          <a:p>
-            <a:pPr marL="0" indent="0">
-              <a:buNone/>
-            </a:pPr>
-            <a:r>
-              <a:rPr lang="en-US" dirty="0"/>
-              <a:t> </a:t>
-            </a:r>
-          </a:p>
-          <a:p>
-            <a:pPr marL="0" lvl="0" indent="0">
-              <a:buNone/>
-            </a:pPr>
-            <a:r>
-              <a:rPr lang="en-US" b="1" dirty="0"/>
-              <a:t>Retrieving the average amount of customers an employee assists:</a:t>
-            </a:r>
-          </a:p>
-          <a:p>
-            <a:pPr marL="0" lvl="0" indent="0">
-              <a:buNone/>
-            </a:pPr>
-            <a:endParaRPr lang="en-US" b="1" dirty="0"/>
-          </a:p>
-          <a:p>
-            <a:pPr marL="0" indent="0">
-              <a:buNone/>
-            </a:pPr>
-            <a:r>
-              <a:rPr lang="en-US" u="sng" dirty="0">
-                <a:hlinkClick r:id="rId2"/>
-              </a:rPr>
-              <a:t>SELECT</a:t>
-            </a:r>
-            <a:r>
-              <a:rPr lang="en-US" dirty="0"/>
-              <a:t> EMPID, </a:t>
-            </a:r>
-            <a:r>
-              <a:rPr lang="en-US" u="sng" dirty="0">
-                <a:hlinkClick r:id="rId4"/>
-              </a:rPr>
-              <a:t>AVG</a:t>
-            </a:r>
-            <a:r>
-              <a:rPr lang="en-US" dirty="0"/>
-              <a:t>(</a:t>
-            </a:r>
-            <a:r>
-              <a:rPr lang="en-US" dirty="0" err="1"/>
-              <a:t>ticket_assigned</a:t>
-            </a:r>
-            <a:r>
-              <a:rPr lang="en-US" dirty="0"/>
-              <a:t>) FROM employee GROUP BYEMPID</a:t>
-            </a:r>
-          </a:p>
-          <a:p>
-            <a:pPr marL="0" indent="0">
-              <a:buNone/>
-            </a:pPr>
-            <a:r>
-              <a:rPr lang="en-US" dirty="0"/>
-              <a:t> </a:t>
-            </a:r>
-          </a:p>
-          <a:p>
-            <a:pPr marL="0" lvl="0" indent="0">
-              <a:buNone/>
-            </a:pPr>
-            <a:r>
-              <a:rPr lang="en-US" b="1" dirty="0"/>
-              <a:t>Retrieving the amount of times a customer comes in and gets assisted by employee based on the amount of </a:t>
-            </a:r>
-            <a:r>
-              <a:rPr lang="en-US" b="1" dirty="0" err="1"/>
-              <a:t>ticketIDs</a:t>
-            </a:r>
-            <a:r>
-              <a:rPr lang="en-US" b="1" dirty="0"/>
-              <a:t> the that are associated with a customer’s cell number:</a:t>
-            </a:r>
-          </a:p>
-          <a:p>
-            <a:pPr marL="0" lvl="0" indent="0">
-              <a:buNone/>
-            </a:pPr>
-            <a:endParaRPr lang="en-US" b="1" dirty="0"/>
-          </a:p>
-          <a:p>
-            <a:pPr marL="0" indent="0">
-              <a:buNone/>
-            </a:pPr>
-            <a:r>
-              <a:rPr lang="en-US" u="sng" dirty="0">
-                <a:hlinkClick r:id="rId2"/>
-              </a:rPr>
-              <a:t>SELECT</a:t>
-            </a:r>
-            <a:r>
-              <a:rPr lang="en-US" dirty="0"/>
-              <a:t> </a:t>
-            </a:r>
-            <a:r>
-              <a:rPr lang="en-US" dirty="0" err="1"/>
-              <a:t>CellNum</a:t>
-            </a:r>
-            <a:r>
-              <a:rPr lang="en-US" dirty="0"/>
-              <a:t>, </a:t>
-            </a:r>
-            <a:r>
-              <a:rPr lang="en-US" u="sng" dirty="0">
-                <a:hlinkClick r:id="rId4"/>
-              </a:rPr>
-              <a:t>COUNT</a:t>
-            </a:r>
-            <a:r>
-              <a:rPr lang="en-US" u="sng" dirty="0"/>
-              <a:t> </a:t>
-            </a:r>
-            <a:r>
-              <a:rPr lang="en-US" dirty="0"/>
-              <a:t>(</a:t>
-            </a:r>
-            <a:r>
-              <a:rPr lang="en-US" dirty="0" err="1"/>
-              <a:t>TicketID</a:t>
-            </a:r>
-            <a:r>
-              <a:rPr lang="en-US" dirty="0"/>
-              <a:t>) FROM customer GROUP BY </a:t>
-            </a:r>
-            <a:r>
-              <a:rPr lang="en-US" dirty="0" err="1"/>
-              <a:t>CellNum</a:t>
-            </a:r>
+              <a:t>Cafes (Bread Co., etc.)</a:t>
+            </a:r>
+          </a:p>
+          <a:p>
             <a:endParaRPr lang="en-US" dirty="0"/>
           </a:p>
           <a:p>
-            <a:pPr marL="0" indent="0">
-              <a:buNone/>
-            </a:pPr>
             <a:endParaRPr lang="en-US" dirty="0"/>
           </a:p>
         </p:txBody>
@@ -7686,7 +9303,7 @@
     </p:spTree>
     <p:extLst>
       <p:ext uri="{BB962C8B-B14F-4D97-AF65-F5344CB8AC3E}">
-        <p14:creationId xmlns:p14="http://schemas.microsoft.com/office/powerpoint/2010/main" val="4213642597"/>
+        <p14:creationId xmlns:p14="http://schemas.microsoft.com/office/powerpoint/2010/main" val="3396665767"/>
       </p:ext>
     </p:extLst>
   </p:cSld>
@@ -7718,7 +9335,7 @@
           <p:cNvPr id="2" name="Title 1">
             <a:extLst>
               <a:ext uri="{FF2B5EF4-FFF2-40B4-BE49-F238E27FC236}">
-                <a16:creationId xmlns:a16="http://schemas.microsoft.com/office/drawing/2014/main" id="{2C195901-8E73-4C81-9A6C-E7E7AE9C3D44}"/>
+                <a16:creationId xmlns:a16="http://schemas.microsoft.com/office/drawing/2014/main" id="{5AED2544-F0DD-4A83-A091-96832E613A0B}"/>
               </a:ext>
             </a:extLst>
           </p:cNvPr>
@@ -7736,7 +9353,7 @@
           <a:p>
             <a:r>
               <a:rPr lang="en-US" b="1" dirty="0"/>
-              <a:t>Normal Forms</a:t>
+              <a:t>Importance of Database</a:t>
             </a:r>
           </a:p>
         </p:txBody>
@@ -7746,7 +9363,7 @@
           <p:cNvPr id="3" name="Content Placeholder 2">
             <a:extLst>
               <a:ext uri="{FF2B5EF4-FFF2-40B4-BE49-F238E27FC236}">
-                <a16:creationId xmlns:a16="http://schemas.microsoft.com/office/drawing/2014/main" id="{F8EE1CF2-99E4-4199-8E1D-9D7B9EC2263B}"/>
+                <a16:creationId xmlns:a16="http://schemas.microsoft.com/office/drawing/2014/main" id="{E6024858-89E4-46CC-82EC-E547AF361C99}"/>
               </a:ext>
             </a:extLst>
           </p:cNvPr>
@@ -7769,7 +9386,7 @@
     </p:spTree>
     <p:extLst>
       <p:ext uri="{BB962C8B-B14F-4D97-AF65-F5344CB8AC3E}">
-        <p14:creationId xmlns:p14="http://schemas.microsoft.com/office/powerpoint/2010/main" val="2186844450"/>
+        <p14:creationId xmlns:p14="http://schemas.microsoft.com/office/powerpoint/2010/main" val="2146869905"/>
       </p:ext>
     </p:extLst>
   </p:cSld>
@@ -7801,7 +9418,7 @@
           <p:cNvPr id="2" name="Title 1">
             <a:extLst>
               <a:ext uri="{FF2B5EF4-FFF2-40B4-BE49-F238E27FC236}">
-                <a16:creationId xmlns:a16="http://schemas.microsoft.com/office/drawing/2014/main" id="{BAE5D6E3-3E7E-4BC7-8CBA-F50D106673B6}"/>
+                <a16:creationId xmlns:a16="http://schemas.microsoft.com/office/drawing/2014/main" id="{6BF6E7D9-FC10-4A65-ADE5-25E3F943B3F0}"/>
               </a:ext>
             </a:extLst>
           </p:cNvPr>
@@ -7812,68 +9429,27 @@
             <p:ph type="title"/>
           </p:nvPr>
         </p:nvSpPr>
-        <p:spPr/>
+        <p:spPr>
+          <a:xfrm>
+            <a:off x="3346078" y="2614020"/>
+            <a:ext cx="5499844" cy="814980"/>
+          </a:xfrm>
+        </p:spPr>
         <p:txBody>
           <a:bodyPr/>
           <a:lstStyle/>
           <a:p>
             <a:r>
               <a:rPr lang="en-US" b="1" dirty="0"/>
-              <a:t>Possible Users</a:t>
-            </a:r>
-          </a:p>
-        </p:txBody>
-      </p:sp>
-      <p:sp>
-        <p:nvSpPr>
-          <p:cNvPr id="3" name="Content Placeholder 2">
-            <a:extLst>
-              <a:ext uri="{FF2B5EF4-FFF2-40B4-BE49-F238E27FC236}">
-                <a16:creationId xmlns:a16="http://schemas.microsoft.com/office/drawing/2014/main" id="{2D9412E7-40EA-48F1-B99B-C4887C820B18}"/>
-              </a:ext>
-            </a:extLst>
-          </p:cNvPr>
-          <p:cNvSpPr>
-            <a:spLocks noGrp="1"/>
-          </p:cNvSpPr>
-          <p:nvPr>
-            <p:ph idx="1"/>
-          </p:nvPr>
-        </p:nvSpPr>
-        <p:spPr/>
-        <p:txBody>
-          <a:bodyPr/>
-          <a:lstStyle/>
-          <a:p>
-            <a:r>
-              <a:rPr lang="en-US" dirty="0"/>
-              <a:t>Restaurants</a:t>
-            </a:r>
-          </a:p>
-          <a:p>
-            <a:r>
-              <a:rPr lang="en-US" dirty="0"/>
-              <a:t>Telecommunication Retailers (AT&amp;T, Verizon, T-Mobile, etc.)</a:t>
-            </a:r>
-          </a:p>
-          <a:p>
-            <a:r>
-              <a:rPr lang="en-US" dirty="0"/>
-              <a:t>Cafes (Bread Co., etc.)</a:t>
-            </a:r>
-          </a:p>
-          <a:p>
-            <a:endParaRPr lang="en-US" dirty="0"/>
-          </a:p>
-          <a:p>
-            <a:endParaRPr lang="en-US" dirty="0"/>
+              <a:t>Webpages + Queries</a:t>
+            </a:r>
           </a:p>
         </p:txBody>
       </p:sp>
     </p:spTree>
     <p:extLst>
       <p:ext uri="{BB962C8B-B14F-4D97-AF65-F5344CB8AC3E}">
-        <p14:creationId xmlns:p14="http://schemas.microsoft.com/office/powerpoint/2010/main" val="3396665767"/>
+        <p14:creationId xmlns:p14="http://schemas.microsoft.com/office/powerpoint/2010/main" val="1941153022"/>
       </p:ext>
     </p:extLst>
   </p:cSld>

</xml_diff>

<commit_message>
added pictures to structure slide.
</commit_message>
<xml_diff>
--- a/DB_Mgmt_Final_PPT.pptx
+++ b/DB_Mgmt_Final_PPT.pptx
@@ -119,7 +119,7 @@
   </p:defaultTextStyle>
   <p:extLst>
     <p:ext uri="{EFAFB233-063F-42B5-8137-9DF3F51BA10A}">
-      <p15:sldGuideLst xmlns:p15="http://schemas.microsoft.com/office/powerpoint/2012/main"/>
+      <p15:sldGuideLst xmlns:p15="http://schemas.microsoft.com/office/powerpoint/2012/main" xmlns=""/>
     </p:ext>
   </p:extLst>
 </p:presentation>
@@ -315,6 +315,7 @@
           <a:p>
             <a:fld id="{4AAD347D-5ACD-4C99-B74B-A9C85AD731AF}" type="datetimeFigureOut">
               <a:rPr lang="en-US" dirty="0"/>
+              <a:pPr/>
               <a:t>12/12/2017</a:t>
             </a:fld>
             <a:endParaRPr lang="en-US" dirty="0"/>
@@ -357,6 +358,7 @@
           <a:p>
             <a:fld id="{D57F1E4F-1CFF-5643-939E-02111984F565}" type="slidenum">
               <a:rPr lang="en-US" dirty="0"/>
+              <a:pPr/>
               <a:t>‹#›</a:t>
             </a:fld>
             <a:endParaRPr lang="en-US" dirty="0"/>
@@ -585,6 +587,7 @@
           <a:p>
             <a:fld id="{4509A250-FF31-4206-8172-F9D3106AACB1}" type="datetimeFigureOut">
               <a:rPr lang="en-US" dirty="0"/>
+              <a:pPr/>
               <a:t>12/12/2017</a:t>
             </a:fld>
             <a:endParaRPr lang="en-US" dirty="0"/>
@@ -627,6 +630,7 @@
           <a:p>
             <a:fld id="{D57F1E4F-1CFF-5643-939E-02111984F565}" type="slidenum">
               <a:rPr lang="en-US" dirty="0"/>
+              <a:pPr/>
               <a:t>‹#›</a:t>
             </a:fld>
             <a:endParaRPr lang="en-US" dirty="0"/>
@@ -774,6 +778,7 @@
           <a:p>
             <a:fld id="{4509A250-FF31-4206-8172-F9D3106AACB1}" type="datetimeFigureOut">
               <a:rPr lang="en-US" dirty="0"/>
+              <a:pPr/>
               <a:t>12/12/2017</a:t>
             </a:fld>
             <a:endParaRPr lang="en-US" dirty="0"/>
@@ -816,6 +821,7 @@
           <a:p>
             <a:fld id="{D57F1E4F-1CFF-5643-939E-02111984F565}" type="slidenum">
               <a:rPr lang="en-US" dirty="0"/>
+              <a:pPr/>
               <a:t>‹#›</a:t>
             </a:fld>
             <a:endParaRPr lang="en-US" dirty="0"/>
@@ -1042,6 +1048,7 @@
           <a:p>
             <a:fld id="{4509A250-FF31-4206-8172-F9D3106AACB1}" type="datetimeFigureOut">
               <a:rPr lang="en-US" dirty="0"/>
+              <a:pPr/>
               <a:t>12/12/2017</a:t>
             </a:fld>
             <a:endParaRPr lang="en-US" dirty="0"/>
@@ -1084,6 +1091,7 @@
           <a:p>
             <a:fld id="{D57F1E4F-1CFF-5643-939E-02111984F565}" type="slidenum">
               <a:rPr lang="en-US" dirty="0"/>
+              <a:pPr/>
               <a:t>‹#›</a:t>
             </a:fld>
             <a:endParaRPr lang="en-US" dirty="0"/>
@@ -1378,6 +1386,7 @@
           <a:p>
             <a:fld id="{4509A250-FF31-4206-8172-F9D3106AACB1}" type="datetimeFigureOut">
               <a:rPr lang="en-US" dirty="0"/>
+              <a:pPr/>
               <a:t>12/12/2017</a:t>
             </a:fld>
             <a:endParaRPr lang="en-US" dirty="0"/>
@@ -1420,6 +1429,7 @@
           <a:p>
             <a:fld id="{D57F1E4F-1CFF-5643-939E-02111984F565}" type="slidenum">
               <a:rPr lang="en-US" dirty="0"/>
+              <a:pPr/>
               <a:t>‹#›</a:t>
             </a:fld>
             <a:endParaRPr lang="en-US" dirty="0"/>
@@ -1996,6 +2006,7 @@
           <a:p>
             <a:fld id="{4509A250-FF31-4206-8172-F9D3106AACB1}" type="datetimeFigureOut">
               <a:rPr lang="en-US" dirty="0"/>
+              <a:pPr/>
               <a:t>12/12/2017</a:t>
             </a:fld>
             <a:endParaRPr lang="en-US" dirty="0"/>
@@ -2038,6 +2049,7 @@
           <a:p>
             <a:fld id="{D57F1E4F-1CFF-5643-939E-02111984F565}" type="slidenum">
               <a:rPr lang="en-US" dirty="0"/>
+              <a:pPr/>
               <a:t>‹#›</a:t>
             </a:fld>
             <a:endParaRPr lang="en-US" dirty="0"/>
@@ -2851,6 +2863,7 @@
           <a:p>
             <a:fld id="{4509A250-FF31-4206-8172-F9D3106AACB1}" type="datetimeFigureOut">
               <a:rPr lang="en-US" dirty="0"/>
+              <a:pPr/>
               <a:t>12/12/2017</a:t>
             </a:fld>
             <a:endParaRPr lang="en-US" dirty="0"/>
@@ -2893,6 +2906,7 @@
           <a:p>
             <a:fld id="{D57F1E4F-1CFF-5643-939E-02111984F565}" type="slidenum">
               <a:rPr lang="en-US" dirty="0"/>
+              <a:pPr/>
               <a:t>‹#›</a:t>
             </a:fld>
             <a:endParaRPr lang="en-US" dirty="0"/>
@@ -3016,6 +3030,7 @@
           <a:p>
             <a:fld id="{4509A250-FF31-4206-8172-F9D3106AACB1}" type="datetimeFigureOut">
               <a:rPr lang="en-US" dirty="0"/>
+              <a:pPr/>
               <a:t>12/12/2017</a:t>
             </a:fld>
             <a:endParaRPr lang="en-US" dirty="0"/>
@@ -3058,6 +3073,7 @@
           <a:p>
             <a:fld id="{D57F1E4F-1CFF-5643-939E-02111984F565}" type="slidenum">
               <a:rPr lang="en-US" dirty="0"/>
+              <a:pPr/>
               <a:t>‹#›</a:t>
             </a:fld>
             <a:endParaRPr lang="en-US" dirty="0"/>
@@ -3191,6 +3207,7 @@
           <a:p>
             <a:fld id="{4509A250-FF31-4206-8172-F9D3106AACB1}" type="datetimeFigureOut">
               <a:rPr lang="en-US" dirty="0"/>
+              <a:pPr/>
               <a:t>12/12/2017</a:t>
             </a:fld>
             <a:endParaRPr lang="en-US" dirty="0"/>
@@ -3233,6 +3250,7 @@
           <a:p>
             <a:fld id="{D57F1E4F-1CFF-5643-939E-02111984F565}" type="slidenum">
               <a:rPr lang="en-US" dirty="0"/>
+              <a:pPr/>
               <a:t>‹#›</a:t>
             </a:fld>
             <a:endParaRPr lang="en-US" dirty="0"/>
@@ -3356,6 +3374,7 @@
           <a:p>
             <a:fld id="{4509A250-FF31-4206-8172-F9D3106AACB1}" type="datetimeFigureOut">
               <a:rPr lang="en-US" dirty="0"/>
+              <a:pPr/>
               <a:t>12/12/2017</a:t>
             </a:fld>
             <a:endParaRPr lang="en-US" dirty="0"/>
@@ -3398,6 +3417,7 @@
           <a:p>
             <a:fld id="{D57F1E4F-1CFF-5643-939E-02111984F565}" type="slidenum">
               <a:rPr lang="en-US" dirty="0"/>
+              <a:pPr/>
               <a:t>‹#›</a:t>
             </a:fld>
             <a:endParaRPr lang="en-US" dirty="0"/>
@@ -3598,6 +3618,7 @@
           <a:p>
             <a:fld id="{9796027F-7875-4030-9381-8BD8C4F21935}" type="datetimeFigureOut">
               <a:rPr lang="en-US" dirty="0"/>
+              <a:pPr/>
               <a:t>12/12/2017</a:t>
             </a:fld>
             <a:endParaRPr lang="en-US" dirty="0"/>
@@ -3640,6 +3661,7 @@
           <a:p>
             <a:fld id="{D57F1E4F-1CFF-5643-939E-02111984F565}" type="slidenum">
               <a:rPr lang="en-US" dirty="0"/>
+              <a:pPr/>
               <a:t>‹#›</a:t>
             </a:fld>
             <a:endParaRPr lang="en-US" dirty="0"/>
@@ -3885,6 +3907,7 @@
           <a:p>
             <a:fld id="{9796027F-7875-4030-9381-8BD8C4F21935}" type="datetimeFigureOut">
               <a:rPr lang="en-US" dirty="0"/>
+              <a:pPr/>
               <a:t>12/12/2017</a:t>
             </a:fld>
             <a:endParaRPr lang="en-US" dirty="0"/>
@@ -3927,6 +3950,7 @@
           <a:p>
             <a:fld id="{D57F1E4F-1CFF-5643-939E-02111984F565}" type="slidenum">
               <a:rPr lang="en-US" dirty="0"/>
+              <a:pPr/>
               <a:t>‹#›</a:t>
             </a:fld>
             <a:endParaRPr lang="en-US" dirty="0"/>
@@ -4324,6 +4348,7 @@
           <a:p>
             <a:fld id="{9796027F-7875-4030-9381-8BD8C4F21935}" type="datetimeFigureOut">
               <a:rPr lang="en-US" dirty="0"/>
+              <a:pPr/>
               <a:t>12/12/2017</a:t>
             </a:fld>
             <a:endParaRPr lang="en-US" dirty="0"/>
@@ -4366,6 +4391,7 @@
           <a:p>
             <a:fld id="{D57F1E4F-1CFF-5643-939E-02111984F565}" type="slidenum">
               <a:rPr lang="en-US" dirty="0"/>
+              <a:pPr/>
               <a:t>‹#›</a:t>
             </a:fld>
             <a:endParaRPr lang="en-US" dirty="0"/>
@@ -4437,6 +4463,7 @@
           <a:p>
             <a:fld id="{4509A250-FF31-4206-8172-F9D3106AACB1}" type="datetimeFigureOut">
               <a:rPr lang="en-US" dirty="0"/>
+              <a:pPr/>
               <a:t>12/12/2017</a:t>
             </a:fld>
             <a:endParaRPr lang="en-US" dirty="0"/>
@@ -4479,6 +4506,7 @@
           <a:p>
             <a:fld id="{D57F1E4F-1CFF-5643-939E-02111984F565}" type="slidenum">
               <a:rPr lang="en-US" dirty="0"/>
+              <a:pPr/>
               <a:t>‹#›</a:t>
             </a:fld>
             <a:endParaRPr lang="en-US" dirty="0"/>
@@ -4527,6 +4555,7 @@
           <a:p>
             <a:fld id="{4509A250-FF31-4206-8172-F9D3106AACB1}" type="datetimeFigureOut">
               <a:rPr lang="en-US" dirty="0"/>
+              <a:pPr/>
               <a:t>12/12/2017</a:t>
             </a:fld>
             <a:endParaRPr lang="en-US" dirty="0"/>
@@ -4569,6 +4598,7 @@
           <a:p>
             <a:fld id="{D57F1E4F-1CFF-5643-939E-02111984F565}" type="slidenum">
               <a:rPr lang="en-US" dirty="0"/>
+              <a:pPr/>
               <a:t>‹#›</a:t>
             </a:fld>
             <a:endParaRPr lang="en-US" dirty="0"/>
@@ -4801,6 +4831,7 @@
           <a:p>
             <a:fld id="{4509A250-FF31-4206-8172-F9D3106AACB1}" type="datetimeFigureOut">
               <a:rPr lang="en-US" dirty="0"/>
+              <a:pPr/>
               <a:t>12/12/2017</a:t>
             </a:fld>
             <a:endParaRPr lang="en-US" dirty="0"/>
@@ -4843,6 +4874,7 @@
           <a:p>
             <a:fld id="{D57F1E4F-1CFF-5643-939E-02111984F565}" type="slidenum">
               <a:rPr lang="en-US" dirty="0"/>
+              <a:pPr/>
               <a:t>‹#›</a:t>
             </a:fld>
             <a:endParaRPr lang="en-US" dirty="0"/>
@@ -5071,6 +5103,7 @@
           <a:p>
             <a:fld id="{4509A250-FF31-4206-8172-F9D3106AACB1}" type="datetimeFigureOut">
               <a:rPr lang="en-US" dirty="0"/>
+              <a:pPr/>
               <a:t>12/12/2017</a:t>
             </a:fld>
             <a:endParaRPr lang="en-US" dirty="0"/>
@@ -5113,6 +5146,7 @@
           <a:p>
             <a:fld id="{D57F1E4F-1CFF-5643-939E-02111984F565}" type="slidenum">
               <a:rPr lang="en-US" dirty="0"/>
+              <a:pPr/>
               <a:t>‹#›</a:t>
             </a:fld>
             <a:endParaRPr lang="en-US" dirty="0"/>
@@ -5161,7 +5195,7 @@
           <a:blip r:embed="rId19">
             <a:extLst>
               <a:ext uri="{28A0092B-C50C-407E-A947-70E740481C1C}">
-                <a14:useLocalDpi xmlns:a14="http://schemas.microsoft.com/office/drawing/2010/main" val="0"/>
+                <a14:useLocalDpi xmlns:a14="http://schemas.microsoft.com/office/drawing/2010/main" xmlns="" val="0"/>
               </a:ext>
             </a:extLst>
           </a:blip>
@@ -5190,7 +5224,7 @@
           <a:blip r:embed="rId20">
             <a:extLst>
               <a:ext uri="{28A0092B-C50C-407E-A947-70E740481C1C}">
-                <a14:useLocalDpi xmlns:a14="http://schemas.microsoft.com/office/drawing/2010/main" val="0"/>
+                <a14:useLocalDpi xmlns:a14="http://schemas.microsoft.com/office/drawing/2010/main" xmlns="" val="0"/>
               </a:ext>
             </a:extLst>
           </a:blip>
@@ -5282,7 +5316,7 @@
           <a:blip r:embed="rId21">
             <a:extLst>
               <a:ext uri="{28A0092B-C50C-407E-A947-70E740481C1C}">
-                <a14:useLocalDpi xmlns:a14="http://schemas.microsoft.com/office/drawing/2010/main" val="0"/>
+                <a14:useLocalDpi xmlns:a14="http://schemas.microsoft.com/office/drawing/2010/main" xmlns="" val="0"/>
               </a:ext>
             </a:extLst>
           </a:blip>
@@ -5311,7 +5345,7 @@
           <a:blip r:embed="rId22">
             <a:extLst>
               <a:ext uri="{28A0092B-C50C-407E-A947-70E740481C1C}">
-                <a14:useLocalDpi xmlns:a14="http://schemas.microsoft.com/office/drawing/2010/main" val="0"/>
+                <a14:useLocalDpi xmlns:a14="http://schemas.microsoft.com/office/drawing/2010/main" xmlns="" val="0"/>
               </a:ext>
             </a:extLst>
           </a:blip>
@@ -5495,6 +5529,7 @@
           <a:p>
             <a:fld id="{4AAD347D-5ACD-4C99-B74B-A9C85AD731AF}" type="datetimeFigureOut">
               <a:rPr lang="en-US" dirty="0"/>
+              <a:pPr/>
               <a:t>12/12/2017</a:t>
             </a:fld>
             <a:endParaRPr lang="en-US" dirty="0"/>
@@ -5574,6 +5609,7 @@
           <a:p>
             <a:fld id="{D57F1E4F-1CFF-5643-939E-02111984F565}" type="slidenum">
               <a:rPr lang="en-US" dirty="0"/>
+              <a:pPr/>
               <a:t>‹#›</a:t>
             </a:fld>
             <a:endParaRPr lang="en-US" dirty="0"/>
@@ -6024,7 +6060,7 @@
           <p:cNvPr id="3" name="Subtitle 2">
             <a:extLst>
               <a:ext uri="{FF2B5EF4-FFF2-40B4-BE49-F238E27FC236}">
-                <a16:creationId xmlns:a16="http://schemas.microsoft.com/office/drawing/2014/main" id="{A5FC81A8-A395-4CD6-8FC6-F2AF2BB48DA3}"/>
+                <a16:creationId xmlns:a16="http://schemas.microsoft.com/office/drawing/2014/main" xmlns="" id="{A5FC81A8-A395-4CD6-8FC6-F2AF2BB48DA3}"/>
               </a:ext>
             </a:extLst>
           </p:cNvPr>
@@ -6060,7 +6096,7 @@
           <p:cNvPr id="5" name="Picture 4" descr="A close up of a device&#10;&#10;Description generated with high confidence">
             <a:extLst>
               <a:ext uri="{FF2B5EF4-FFF2-40B4-BE49-F238E27FC236}">
-                <a16:creationId xmlns:a16="http://schemas.microsoft.com/office/drawing/2014/main" id="{ACDC7692-D730-48DD-8A60-859B45DEB719}"/>
+                <a16:creationId xmlns:a16="http://schemas.microsoft.com/office/drawing/2014/main" xmlns="" id="{ACDC7692-D730-48DD-8A60-859B45DEB719}"/>
               </a:ext>
             </a:extLst>
           </p:cNvPr>
@@ -6088,7 +6124,7 @@
     </p:spTree>
     <p:extLst>
       <p:ext uri="{BB962C8B-B14F-4D97-AF65-F5344CB8AC3E}">
-        <p14:creationId xmlns:p14="http://schemas.microsoft.com/office/powerpoint/2010/main" val="3008839548"/>
+        <p14:creationId xmlns:p14="http://schemas.microsoft.com/office/powerpoint/2010/main" xmlns="" val="3008839548"/>
       </p:ext>
     </p:extLst>
   </p:cSld>
@@ -6120,7 +6156,7 @@
           <p:cNvPr id="4" name="Content Placeholder 2">
             <a:extLst>
               <a:ext uri="{FF2B5EF4-FFF2-40B4-BE49-F238E27FC236}">
-                <a16:creationId xmlns:a16="http://schemas.microsoft.com/office/drawing/2014/main" id="{9C239D31-D67C-4619-AD39-D9908B8AB357}"/>
+                <a16:creationId xmlns:a16="http://schemas.microsoft.com/office/drawing/2014/main" xmlns="" id="{9C239D31-D67C-4619-AD39-D9908B8AB357}"/>
               </a:ext>
             </a:extLst>
           </p:cNvPr>
@@ -6493,7 +6529,7 @@
     </p:spTree>
     <p:extLst>
       <p:ext uri="{BB962C8B-B14F-4D97-AF65-F5344CB8AC3E}">
-        <p14:creationId xmlns:p14="http://schemas.microsoft.com/office/powerpoint/2010/main" val="1877137906"/>
+        <p14:creationId xmlns:p14="http://schemas.microsoft.com/office/powerpoint/2010/main" xmlns="" val="1877137906"/>
       </p:ext>
     </p:extLst>
   </p:cSld>
@@ -6525,7 +6561,7 @@
           <p:cNvPr id="5" name="Content Placeholder 2">
             <a:extLst>
               <a:ext uri="{FF2B5EF4-FFF2-40B4-BE49-F238E27FC236}">
-                <a16:creationId xmlns:a16="http://schemas.microsoft.com/office/drawing/2014/main" id="{05CFF522-5AD6-462A-B38C-FCBC0AC012CC}"/>
+                <a16:creationId xmlns:a16="http://schemas.microsoft.com/office/drawing/2014/main" xmlns="" id="{05CFF522-5AD6-462A-B38C-FCBC0AC012CC}"/>
               </a:ext>
             </a:extLst>
           </p:cNvPr>
@@ -6916,7 +6952,7 @@
     </p:spTree>
     <p:extLst>
       <p:ext uri="{BB962C8B-B14F-4D97-AF65-F5344CB8AC3E}">
-        <p14:creationId xmlns:p14="http://schemas.microsoft.com/office/powerpoint/2010/main" val="1721690073"/>
+        <p14:creationId xmlns:p14="http://schemas.microsoft.com/office/powerpoint/2010/main" xmlns="" val="1721690073"/>
       </p:ext>
     </p:extLst>
   </p:cSld>
@@ -6948,7 +6984,7 @@
           <p:cNvPr id="4" name="Content Placeholder 2">
             <a:extLst>
               <a:ext uri="{FF2B5EF4-FFF2-40B4-BE49-F238E27FC236}">
-                <a16:creationId xmlns:a16="http://schemas.microsoft.com/office/drawing/2014/main" id="{5EFFA28E-55AF-48A9-A303-7569CEE02E08}"/>
+                <a16:creationId xmlns:a16="http://schemas.microsoft.com/office/drawing/2014/main" xmlns="" id="{5EFFA28E-55AF-48A9-A303-7569CEE02E08}"/>
               </a:ext>
             </a:extLst>
           </p:cNvPr>
@@ -7448,7 +7484,7 @@
     </p:spTree>
     <p:extLst>
       <p:ext uri="{BB962C8B-B14F-4D97-AF65-F5344CB8AC3E}">
-        <p14:creationId xmlns:p14="http://schemas.microsoft.com/office/powerpoint/2010/main" val="2173686961"/>
+        <p14:creationId xmlns:p14="http://schemas.microsoft.com/office/powerpoint/2010/main" xmlns="" val="2173686961"/>
       </p:ext>
     </p:extLst>
   </p:cSld>
@@ -7480,7 +7516,7 @@
           <p:cNvPr id="4" name="Content Placeholder 2">
             <a:extLst>
               <a:ext uri="{FF2B5EF4-FFF2-40B4-BE49-F238E27FC236}">
-                <a16:creationId xmlns:a16="http://schemas.microsoft.com/office/drawing/2014/main" id="{B6403606-01B7-45D1-81EE-F802CA04897B}"/>
+                <a16:creationId xmlns:a16="http://schemas.microsoft.com/office/drawing/2014/main" xmlns="" id="{B6403606-01B7-45D1-81EE-F802CA04897B}"/>
               </a:ext>
             </a:extLst>
           </p:cNvPr>
@@ -7829,7 +7865,7 @@
     </p:spTree>
     <p:extLst>
       <p:ext uri="{BB962C8B-B14F-4D97-AF65-F5344CB8AC3E}">
-        <p14:creationId xmlns:p14="http://schemas.microsoft.com/office/powerpoint/2010/main" val="2174073728"/>
+        <p14:creationId xmlns:p14="http://schemas.microsoft.com/office/powerpoint/2010/main" xmlns="" val="2174073728"/>
       </p:ext>
     </p:extLst>
   </p:cSld>
@@ -7861,7 +7897,7 @@
           <p:cNvPr id="4" name="Content Placeholder 2">
             <a:extLst>
               <a:ext uri="{FF2B5EF4-FFF2-40B4-BE49-F238E27FC236}">
-                <a16:creationId xmlns:a16="http://schemas.microsoft.com/office/drawing/2014/main" id="{2910983C-776A-4B8D-A86F-8E751890271C}"/>
+                <a16:creationId xmlns:a16="http://schemas.microsoft.com/office/drawing/2014/main" xmlns="" id="{2910983C-776A-4B8D-A86F-8E751890271C}"/>
               </a:ext>
             </a:extLst>
           </p:cNvPr>
@@ -8259,7 +8295,7 @@
     </p:spTree>
     <p:extLst>
       <p:ext uri="{BB962C8B-B14F-4D97-AF65-F5344CB8AC3E}">
-        <p14:creationId xmlns:p14="http://schemas.microsoft.com/office/powerpoint/2010/main" val="1315464262"/>
+        <p14:creationId xmlns:p14="http://schemas.microsoft.com/office/powerpoint/2010/main" xmlns="" val="1315464262"/>
       </p:ext>
     </p:extLst>
   </p:cSld>
@@ -8291,7 +8327,7 @@
           <p:cNvPr id="2" name="Title 1">
             <a:extLst>
               <a:ext uri="{FF2B5EF4-FFF2-40B4-BE49-F238E27FC236}">
-                <a16:creationId xmlns:a16="http://schemas.microsoft.com/office/drawing/2014/main" id="{717EF8A5-63C4-42CA-9B3C-C33842F996EA}"/>
+                <a16:creationId xmlns:a16="http://schemas.microsoft.com/office/drawing/2014/main" xmlns="" id="{717EF8A5-63C4-42CA-9B3C-C33842F996EA}"/>
               </a:ext>
             </a:extLst>
           </p:cNvPr>
@@ -8332,7 +8368,7 @@
           <p:cNvPr id="3" name="Content Placeholder 2">
             <a:extLst>
               <a:ext uri="{FF2B5EF4-FFF2-40B4-BE49-F238E27FC236}">
-                <a16:creationId xmlns:a16="http://schemas.microsoft.com/office/drawing/2014/main" id="{AE36E492-372A-4B96-9166-76D5E4C8287E}"/>
+                <a16:creationId xmlns:a16="http://schemas.microsoft.com/office/drawing/2014/main" xmlns="" id="{AE36E492-372A-4B96-9166-76D5E4C8287E}"/>
               </a:ext>
             </a:extLst>
           </p:cNvPr>
@@ -8417,7 +8453,7 @@
           <p:cNvPr id="7" name="Picture 6" descr="A close up of a sign&#10;&#10;Description generated with high confidence">
             <a:extLst>
               <a:ext uri="{FF2B5EF4-FFF2-40B4-BE49-F238E27FC236}">
-                <a16:creationId xmlns:a16="http://schemas.microsoft.com/office/drawing/2014/main" id="{C8CE9474-AF42-4D51-A58D-1E4A459330A4}"/>
+                <a16:creationId xmlns:a16="http://schemas.microsoft.com/office/drawing/2014/main" xmlns="" id="{C8CE9474-AF42-4D51-A58D-1E4A459330A4}"/>
               </a:ext>
             </a:extLst>
           </p:cNvPr>
@@ -8445,7 +8481,7 @@
     </p:spTree>
     <p:extLst>
       <p:ext uri="{BB962C8B-B14F-4D97-AF65-F5344CB8AC3E}">
-        <p14:creationId xmlns:p14="http://schemas.microsoft.com/office/powerpoint/2010/main" val="780514042"/>
+        <p14:creationId xmlns:p14="http://schemas.microsoft.com/office/powerpoint/2010/main" xmlns="" val="780514042"/>
       </p:ext>
     </p:extLst>
   </p:cSld>
@@ -8477,7 +8513,7 @@
           <p:cNvPr id="2" name="Title 1">
             <a:extLst>
               <a:ext uri="{FF2B5EF4-FFF2-40B4-BE49-F238E27FC236}">
-                <a16:creationId xmlns:a16="http://schemas.microsoft.com/office/drawing/2014/main" id="{C3DE2F59-DB94-4345-B978-4370435C8CFE}"/>
+                <a16:creationId xmlns:a16="http://schemas.microsoft.com/office/drawing/2014/main" xmlns="" id="{C3DE2F59-DB94-4345-B978-4370435C8CFE}"/>
               </a:ext>
             </a:extLst>
           </p:cNvPr>
@@ -8505,7 +8541,7 @@
           <p:cNvPr id="4" name="Table 3">
             <a:extLst>
               <a:ext uri="{FF2B5EF4-FFF2-40B4-BE49-F238E27FC236}">
-                <a16:creationId xmlns:a16="http://schemas.microsoft.com/office/drawing/2014/main" id="{1E5FB244-06A5-48D1-8F6E-10E31088749A}"/>
+                <a16:creationId xmlns:a16="http://schemas.microsoft.com/office/drawing/2014/main" xmlns="" id="{1E5FB244-06A5-48D1-8F6E-10E31088749A}"/>
               </a:ext>
             </a:extLst>
           </p:cNvPr>
@@ -8515,7 +8551,7 @@
           <p:nvPr>
             <p:extLst>
               <p:ext uri="{D42A27DB-BD31-4B8C-83A1-F6EECF244321}">
-                <p14:modId xmlns:p14="http://schemas.microsoft.com/office/powerpoint/2010/main" val="140797090"/>
+                <p14:modId xmlns:p14="http://schemas.microsoft.com/office/powerpoint/2010/main" xmlns="" val="140797090"/>
               </p:ext>
             </p:extLst>
           </p:nvPr>
@@ -8534,28 +8570,28 @@
                 <a:gridCol w="2454672">
                   <a:extLst>
                     <a:ext uri="{9D8B030D-6E8A-4147-A177-3AD203B41FA5}">
-                      <a16:colId xmlns:a16="http://schemas.microsoft.com/office/drawing/2014/main" val="2686735304"/>
+                      <a16:colId xmlns:a16="http://schemas.microsoft.com/office/drawing/2014/main" xmlns="" val="2686735304"/>
                     </a:ext>
                   </a:extLst>
                 </a:gridCol>
                 <a:gridCol w="2454672">
                   <a:extLst>
                     <a:ext uri="{9D8B030D-6E8A-4147-A177-3AD203B41FA5}">
-                      <a16:colId xmlns:a16="http://schemas.microsoft.com/office/drawing/2014/main" val="2738445259"/>
+                      <a16:colId xmlns:a16="http://schemas.microsoft.com/office/drawing/2014/main" xmlns="" val="2738445259"/>
                     </a:ext>
                   </a:extLst>
                 </a:gridCol>
                 <a:gridCol w="2454672">
                   <a:extLst>
                     <a:ext uri="{9D8B030D-6E8A-4147-A177-3AD203B41FA5}">
-                      <a16:colId xmlns:a16="http://schemas.microsoft.com/office/drawing/2014/main" val="2988021207"/>
+                      <a16:colId xmlns:a16="http://schemas.microsoft.com/office/drawing/2014/main" xmlns="" val="2988021207"/>
                     </a:ext>
                   </a:extLst>
                 </a:gridCol>
                 <a:gridCol w="2454672">
                   <a:extLst>
                     <a:ext uri="{9D8B030D-6E8A-4147-A177-3AD203B41FA5}">
-                      <a16:colId xmlns:a16="http://schemas.microsoft.com/office/drawing/2014/main" val="2790341670"/>
+                      <a16:colId xmlns:a16="http://schemas.microsoft.com/office/drawing/2014/main" xmlns="" val="2790341670"/>
                     </a:ext>
                   </a:extLst>
                 </a:gridCol>
@@ -8624,7 +8660,7 @@
                 </a:tc>
                 <a:extLst>
                   <a:ext uri="{0D108BD9-81ED-4DB2-BD59-A6C34878D82A}">
-                    <a16:rowId xmlns:a16="http://schemas.microsoft.com/office/drawing/2014/main" val="1841192602"/>
+                    <a16:rowId xmlns:a16="http://schemas.microsoft.com/office/drawing/2014/main" xmlns="" val="1841192602"/>
                   </a:ext>
                 </a:extLst>
               </a:tr>
@@ -8700,7 +8736,7 @@
                 </a:tc>
                 <a:extLst>
                   <a:ext uri="{0D108BD9-81ED-4DB2-BD59-A6C34878D82A}">
-                    <a16:rowId xmlns:a16="http://schemas.microsoft.com/office/drawing/2014/main" val="952059657"/>
+                    <a16:rowId xmlns:a16="http://schemas.microsoft.com/office/drawing/2014/main" xmlns="" val="952059657"/>
                   </a:ext>
                 </a:extLst>
               </a:tr>
@@ -8784,7 +8820,7 @@
                 </a:tc>
                 <a:extLst>
                   <a:ext uri="{0D108BD9-81ED-4DB2-BD59-A6C34878D82A}">
-                    <a16:rowId xmlns:a16="http://schemas.microsoft.com/office/drawing/2014/main" val="1234601518"/>
+                    <a16:rowId xmlns:a16="http://schemas.microsoft.com/office/drawing/2014/main" xmlns="" val="1234601518"/>
                   </a:ext>
                 </a:extLst>
               </a:tr>
@@ -8870,7 +8906,7 @@
                 </a:tc>
                 <a:extLst>
                   <a:ext uri="{0D108BD9-81ED-4DB2-BD59-A6C34878D82A}">
-                    <a16:rowId xmlns:a16="http://schemas.microsoft.com/office/drawing/2014/main" val="3033431834"/>
+                    <a16:rowId xmlns:a16="http://schemas.microsoft.com/office/drawing/2014/main" xmlns="" val="3033431834"/>
                   </a:ext>
                 </a:extLst>
               </a:tr>
@@ -8883,7 +8919,7 @@
           <p:cNvPr id="6" name="Picture 5" descr="A picture containing object, indoor&#10;&#10;Description generated with high confidence">
             <a:extLst>
               <a:ext uri="{FF2B5EF4-FFF2-40B4-BE49-F238E27FC236}">
-                <a16:creationId xmlns:a16="http://schemas.microsoft.com/office/drawing/2014/main" id="{7527D287-D6FA-4670-95CB-B20A0B0625D5}"/>
+                <a16:creationId xmlns:a16="http://schemas.microsoft.com/office/drawing/2014/main" xmlns="" id="{7527D287-D6FA-4670-95CB-B20A0B0625D5}"/>
               </a:ext>
             </a:extLst>
           </p:cNvPr>
@@ -8913,7 +8949,7 @@
           <p:cNvPr id="8" name="Picture 7" descr="Screen of a cell phone&#10;&#10;Description generated with very high confidence">
             <a:extLst>
               <a:ext uri="{FF2B5EF4-FFF2-40B4-BE49-F238E27FC236}">
-                <a16:creationId xmlns:a16="http://schemas.microsoft.com/office/drawing/2014/main" id="{420722F3-5DBE-4FEE-9B8E-365831FDD3B1}"/>
+                <a16:creationId xmlns:a16="http://schemas.microsoft.com/office/drawing/2014/main" xmlns="" id="{420722F3-5DBE-4FEE-9B8E-365831FDD3B1}"/>
               </a:ext>
             </a:extLst>
           </p:cNvPr>
@@ -8943,7 +8979,7 @@
           <p:cNvPr id="9" name="Picture 8" descr="A close up of a device&#10;&#10;Description generated with high confidence">
             <a:extLst>
               <a:ext uri="{FF2B5EF4-FFF2-40B4-BE49-F238E27FC236}">
-                <a16:creationId xmlns:a16="http://schemas.microsoft.com/office/drawing/2014/main" id="{CE16D1CE-BA39-48CF-BA6B-4A4C4006CD89}"/>
+                <a16:creationId xmlns:a16="http://schemas.microsoft.com/office/drawing/2014/main" xmlns="" id="{CE16D1CE-BA39-48CF-BA6B-4A4C4006CD89}"/>
               </a:ext>
             </a:extLst>
           </p:cNvPr>
@@ -8970,7 +9006,7 @@
     </p:spTree>
     <p:extLst>
       <p:ext uri="{BB962C8B-B14F-4D97-AF65-F5344CB8AC3E}">
-        <p14:creationId xmlns:p14="http://schemas.microsoft.com/office/powerpoint/2010/main" val="3060915881"/>
+        <p14:creationId xmlns:p14="http://schemas.microsoft.com/office/powerpoint/2010/main" xmlns="" val="3060915881"/>
       </p:ext>
     </p:extLst>
   </p:cSld>
@@ -9002,7 +9038,7 @@
           <p:cNvPr id="2" name="Title 1">
             <a:extLst>
               <a:ext uri="{FF2B5EF4-FFF2-40B4-BE49-F238E27FC236}">
-                <a16:creationId xmlns:a16="http://schemas.microsoft.com/office/drawing/2014/main" id="{920DD001-66B0-4738-B3C3-600B82C53CAC}"/>
+                <a16:creationId xmlns:a16="http://schemas.microsoft.com/office/drawing/2014/main" xmlns="" id="{920DD001-66B0-4738-B3C3-600B82C53CAC}"/>
               </a:ext>
             </a:extLst>
           </p:cNvPr>
@@ -9030,7 +9066,7 @@
           <p:cNvPr id="5" name="Picture 4" descr="A close up of a map&#10;&#10;Description generated with high confidence">
             <a:extLst>
               <a:ext uri="{FF2B5EF4-FFF2-40B4-BE49-F238E27FC236}">
-                <a16:creationId xmlns:a16="http://schemas.microsoft.com/office/drawing/2014/main" id="{744BC207-AF1D-4B03-98B4-9FE6FB860B3F}"/>
+                <a16:creationId xmlns:a16="http://schemas.microsoft.com/office/drawing/2014/main" xmlns="" id="{744BC207-AF1D-4B03-98B4-9FE6FB860B3F}"/>
               </a:ext>
             </a:extLst>
           </p:cNvPr>
@@ -9058,7 +9094,7 @@
     </p:spTree>
     <p:extLst>
       <p:ext uri="{BB962C8B-B14F-4D97-AF65-F5344CB8AC3E}">
-        <p14:creationId xmlns:p14="http://schemas.microsoft.com/office/powerpoint/2010/main" val="782323404"/>
+        <p14:creationId xmlns:p14="http://schemas.microsoft.com/office/powerpoint/2010/main" xmlns="" val="782323404"/>
       </p:ext>
     </p:extLst>
   </p:cSld>
@@ -9090,7 +9126,7 @@
           <p:cNvPr id="2" name="Title 1">
             <a:extLst>
               <a:ext uri="{FF2B5EF4-FFF2-40B4-BE49-F238E27FC236}">
-                <a16:creationId xmlns:a16="http://schemas.microsoft.com/office/drawing/2014/main" id="{ED7C249C-015A-4F6D-BCF6-8E4DECDAE822}"/>
+                <a16:creationId xmlns:a16="http://schemas.microsoft.com/office/drawing/2014/main" xmlns="" id="{ED7C249C-015A-4F6D-BCF6-8E4DECDAE822}"/>
               </a:ext>
             </a:extLst>
           </p:cNvPr>
@@ -9113,10 +9149,138 @@
           </a:p>
         </p:txBody>
       </p:sp>
+      <p:pic>
+        <p:nvPicPr>
+          <p:cNvPr id="1026" name="Picture 2"/>
+          <p:cNvPicPr>
+            <a:picLocks noChangeAspect="1" noChangeArrowheads="1"/>
+          </p:cNvPicPr>
+          <p:nvPr/>
+        </p:nvPicPr>
+        <p:blipFill>
+          <a:blip r:embed="rId2"/>
+          <a:srcRect/>
+          <a:stretch>
+            <a:fillRect/>
+          </a:stretch>
+        </p:blipFill>
+        <p:spPr bwMode="auto">
+          <a:xfrm>
+            <a:off x="772089" y="1382253"/>
+            <a:ext cx="8255000" cy="1136650"/>
+          </a:xfrm>
+          <a:prstGeom prst="rect">
+            <a:avLst/>
+          </a:prstGeom>
+          <a:noFill/>
+          <a:ln w="9525">
+            <a:noFill/>
+            <a:miter lim="800000"/>
+            <a:headEnd/>
+            <a:tailEnd/>
+          </a:ln>
+        </p:spPr>
+      </p:pic>
+      <p:pic>
+        <p:nvPicPr>
+          <p:cNvPr id="1028" name="Picture 4"/>
+          <p:cNvPicPr>
+            <a:picLocks noChangeAspect="1" noChangeArrowheads="1"/>
+          </p:cNvPicPr>
+          <p:nvPr/>
+        </p:nvPicPr>
+        <p:blipFill>
+          <a:blip r:embed="rId3"/>
+          <a:srcRect/>
+          <a:stretch>
+            <a:fillRect/>
+          </a:stretch>
+        </p:blipFill>
+        <p:spPr bwMode="auto">
+          <a:xfrm>
+            <a:off x="250232" y="2700471"/>
+            <a:ext cx="3333750" cy="3401226"/>
+          </a:xfrm>
+          <a:prstGeom prst="rect">
+            <a:avLst/>
+          </a:prstGeom>
+          <a:noFill/>
+          <a:ln w="9525">
+            <a:noFill/>
+            <a:miter lim="800000"/>
+            <a:headEnd/>
+            <a:tailEnd/>
+          </a:ln>
+        </p:spPr>
+      </p:pic>
+      <p:pic>
+        <p:nvPicPr>
+          <p:cNvPr id="1029" name="Picture 5"/>
+          <p:cNvPicPr>
+            <a:picLocks noChangeAspect="1" noChangeArrowheads="1"/>
+          </p:cNvPicPr>
+          <p:nvPr/>
+        </p:nvPicPr>
+        <p:blipFill>
+          <a:blip r:embed="rId4"/>
+          <a:srcRect/>
+          <a:stretch>
+            <a:fillRect/>
+          </a:stretch>
+        </p:blipFill>
+        <p:spPr bwMode="auto">
+          <a:xfrm>
+            <a:off x="3891320" y="2716227"/>
+            <a:ext cx="3571875" cy="3385469"/>
+          </a:xfrm>
+          <a:prstGeom prst="rect">
+            <a:avLst/>
+          </a:prstGeom>
+          <a:noFill/>
+          <a:ln w="9525">
+            <a:noFill/>
+            <a:miter lim="800000"/>
+            <a:headEnd/>
+            <a:tailEnd/>
+          </a:ln>
+        </p:spPr>
+      </p:pic>
+      <p:pic>
+        <p:nvPicPr>
+          <p:cNvPr id="1030" name="Picture 6"/>
+          <p:cNvPicPr>
+            <a:picLocks noChangeAspect="1" noChangeArrowheads="1"/>
+          </p:cNvPicPr>
+          <p:nvPr/>
+        </p:nvPicPr>
+        <p:blipFill>
+          <a:blip r:embed="rId5"/>
+          <a:srcRect/>
+          <a:stretch>
+            <a:fillRect/>
+          </a:stretch>
+        </p:blipFill>
+        <p:spPr bwMode="auto">
+          <a:xfrm>
+            <a:off x="7702743" y="2698957"/>
+            <a:ext cx="3571875" cy="3419832"/>
+          </a:xfrm>
+          <a:prstGeom prst="rect">
+            <a:avLst/>
+          </a:prstGeom>
+          <a:noFill/>
+          <a:ln w="9525">
+            <a:noFill/>
+            <a:miter lim="800000"/>
+            <a:headEnd/>
+            <a:tailEnd/>
+          </a:ln>
+        </p:spPr>
+      </p:pic>
     </p:spTree>
     <p:extLst>
       <p:ext uri="{BB962C8B-B14F-4D97-AF65-F5344CB8AC3E}">
-        <p14:creationId xmlns:p14="http://schemas.microsoft.com/office/powerpoint/2010/main" val="1038964542"/>
+        <p14:creationId xmlns:p14="http://schemas.microsoft.com/office/powerpoint/2010/main" xmlns="" val="1038964542"/>
       </p:ext>
     </p:extLst>
   </p:cSld>
@@ -9148,7 +9312,7 @@
           <p:cNvPr id="2" name="Title 1">
             <a:extLst>
               <a:ext uri="{FF2B5EF4-FFF2-40B4-BE49-F238E27FC236}">
-                <a16:creationId xmlns:a16="http://schemas.microsoft.com/office/drawing/2014/main" id="{2C195901-8E73-4C81-9A6C-E7E7AE9C3D44}"/>
+                <a16:creationId xmlns:a16="http://schemas.microsoft.com/office/drawing/2014/main" xmlns="" id="{2C195901-8E73-4C81-9A6C-E7E7AE9C3D44}"/>
               </a:ext>
             </a:extLst>
           </p:cNvPr>
@@ -9176,7 +9340,7 @@
           <p:cNvPr id="3" name="Content Placeholder 2">
             <a:extLst>
               <a:ext uri="{FF2B5EF4-FFF2-40B4-BE49-F238E27FC236}">
-                <a16:creationId xmlns:a16="http://schemas.microsoft.com/office/drawing/2014/main" id="{F8EE1CF2-99E4-4199-8E1D-9D7B9EC2263B}"/>
+                <a16:creationId xmlns:a16="http://schemas.microsoft.com/office/drawing/2014/main" xmlns="" id="{F8EE1CF2-99E4-4199-8E1D-9D7B9EC2263B}"/>
               </a:ext>
             </a:extLst>
           </p:cNvPr>
@@ -9199,7 +9363,7 @@
     </p:spTree>
     <p:extLst>
       <p:ext uri="{BB962C8B-B14F-4D97-AF65-F5344CB8AC3E}">
-        <p14:creationId xmlns:p14="http://schemas.microsoft.com/office/powerpoint/2010/main" val="2186844450"/>
+        <p14:creationId xmlns:p14="http://schemas.microsoft.com/office/powerpoint/2010/main" xmlns="" val="2186844450"/>
       </p:ext>
     </p:extLst>
   </p:cSld>
@@ -9231,7 +9395,7 @@
           <p:cNvPr id="2" name="Title 1">
             <a:extLst>
               <a:ext uri="{FF2B5EF4-FFF2-40B4-BE49-F238E27FC236}">
-                <a16:creationId xmlns:a16="http://schemas.microsoft.com/office/drawing/2014/main" id="{BAE5D6E3-3E7E-4BC7-8CBA-F50D106673B6}"/>
+                <a16:creationId xmlns:a16="http://schemas.microsoft.com/office/drawing/2014/main" xmlns="" id="{BAE5D6E3-3E7E-4BC7-8CBA-F50D106673B6}"/>
               </a:ext>
             </a:extLst>
           </p:cNvPr>
@@ -9259,7 +9423,7 @@
           <p:cNvPr id="3" name="Content Placeholder 2">
             <a:extLst>
               <a:ext uri="{FF2B5EF4-FFF2-40B4-BE49-F238E27FC236}">
-                <a16:creationId xmlns:a16="http://schemas.microsoft.com/office/drawing/2014/main" id="{2D9412E7-40EA-48F1-B99B-C4887C820B18}"/>
+                <a16:creationId xmlns:a16="http://schemas.microsoft.com/office/drawing/2014/main" xmlns="" id="{2D9412E7-40EA-48F1-B99B-C4887C820B18}"/>
               </a:ext>
             </a:extLst>
           </p:cNvPr>
@@ -9303,7 +9467,7 @@
     </p:spTree>
     <p:extLst>
       <p:ext uri="{BB962C8B-B14F-4D97-AF65-F5344CB8AC3E}">
-        <p14:creationId xmlns:p14="http://schemas.microsoft.com/office/powerpoint/2010/main" val="3396665767"/>
+        <p14:creationId xmlns:p14="http://schemas.microsoft.com/office/powerpoint/2010/main" xmlns="" val="3396665767"/>
       </p:ext>
     </p:extLst>
   </p:cSld>
@@ -9335,7 +9499,7 @@
           <p:cNvPr id="2" name="Title 1">
             <a:extLst>
               <a:ext uri="{FF2B5EF4-FFF2-40B4-BE49-F238E27FC236}">
-                <a16:creationId xmlns:a16="http://schemas.microsoft.com/office/drawing/2014/main" id="{5AED2544-F0DD-4A83-A091-96832E613A0B}"/>
+                <a16:creationId xmlns:a16="http://schemas.microsoft.com/office/drawing/2014/main" xmlns="" id="{5AED2544-F0DD-4A83-A091-96832E613A0B}"/>
               </a:ext>
             </a:extLst>
           </p:cNvPr>
@@ -9363,7 +9527,7 @@
           <p:cNvPr id="3" name="Content Placeholder 2">
             <a:extLst>
               <a:ext uri="{FF2B5EF4-FFF2-40B4-BE49-F238E27FC236}">
-                <a16:creationId xmlns:a16="http://schemas.microsoft.com/office/drawing/2014/main" id="{E6024858-89E4-46CC-82EC-E547AF361C99}"/>
+                <a16:creationId xmlns:a16="http://schemas.microsoft.com/office/drawing/2014/main" xmlns="" id="{E6024858-89E4-46CC-82EC-E547AF361C99}"/>
               </a:ext>
             </a:extLst>
           </p:cNvPr>
@@ -9386,7 +9550,7 @@
     </p:spTree>
     <p:extLst>
       <p:ext uri="{BB962C8B-B14F-4D97-AF65-F5344CB8AC3E}">
-        <p14:creationId xmlns:p14="http://schemas.microsoft.com/office/powerpoint/2010/main" val="2146869905"/>
+        <p14:creationId xmlns:p14="http://schemas.microsoft.com/office/powerpoint/2010/main" xmlns="" val="2146869905"/>
       </p:ext>
     </p:extLst>
   </p:cSld>
@@ -9418,7 +9582,7 @@
           <p:cNvPr id="2" name="Title 1">
             <a:extLst>
               <a:ext uri="{FF2B5EF4-FFF2-40B4-BE49-F238E27FC236}">
-                <a16:creationId xmlns:a16="http://schemas.microsoft.com/office/drawing/2014/main" id="{6BF6E7D9-FC10-4A65-ADE5-25E3F943B3F0}"/>
+                <a16:creationId xmlns:a16="http://schemas.microsoft.com/office/drawing/2014/main" xmlns="" id="{6BF6E7D9-FC10-4A65-ADE5-25E3F943B3F0}"/>
               </a:ext>
             </a:extLst>
           </p:cNvPr>
@@ -9449,7 +9613,7 @@
     </p:spTree>
     <p:extLst>
       <p:ext uri="{BB962C8B-B14F-4D97-AF65-F5344CB8AC3E}">
-        <p14:creationId xmlns:p14="http://schemas.microsoft.com/office/powerpoint/2010/main" val="1941153022"/>
+        <p14:creationId xmlns:p14="http://schemas.microsoft.com/office/powerpoint/2010/main" xmlns="" val="1941153022"/>
       </p:ext>
     </p:extLst>
   </p:cSld>
@@ -9502,7 +9666,7 @@
     </a:clrScheme>
     <a:fontScheme name="Ion">
       <a:majorFont>
-        <a:latin typeface="Century Gothic" panose="020B0502020202020204"/>
+        <a:latin typeface="Century Gothic"/>
         <a:ea typeface=""/>
         <a:cs typeface=""/>
         <a:font script="Jpan" typeface="メイリオ"/>
@@ -9537,7 +9701,7 @@
         <a:font script="Geor" typeface="Sylfaen"/>
       </a:majorFont>
       <a:minorFont>
-        <a:latin typeface="Century Gothic" panose="020B0502020202020204"/>
+        <a:latin typeface="Century Gothic"/>
         <a:ea typeface=""/>
         <a:cs typeface=""/>
         <a:font script="Jpan" typeface="メイリオ"/>
@@ -9719,7 +9883,7 @@
   <a:extraClrSchemeLst/>
   <a:extLst>
     <a:ext uri="{05A4C25C-085E-4340-85A3-A5531E510DB2}">
-      <thm15:themeFamily xmlns:thm15="http://schemas.microsoft.com/office/thememl/2012/main" name="Ion" id="{B8441ADB-2E43-4AF7-B97A-BD870242C6A8}" vid="{292E63A9-BB86-4E3D-B92A-7223C6510D2E}"/>
+      <thm15:themeFamily xmlns:thm15="http://schemas.microsoft.com/office/thememl/2012/main" xmlns="" name="Ion" id="{B8441ADB-2E43-4AF7-B97A-BD870242C6A8}" vid="{292E63A9-BB86-4E3D-B92A-7223C6510D2E}"/>
     </a:ext>
   </a:extLst>
 </a:theme>

</xml_diff>

<commit_message>
Added text to normal forms slide.
</commit_message>
<xml_diff>
--- a/DB_Mgmt_Final_PPT.pptx
+++ b/DB_Mgmt_Final_PPT.pptx
@@ -119,7 +119,7 @@
   </p:defaultTextStyle>
   <p:extLst>
     <p:ext uri="{EFAFB233-063F-42B5-8137-9DF3F51BA10A}">
-      <p15:sldGuideLst xmlns:p15="http://schemas.microsoft.com/office/powerpoint/2012/main" xmlns=""/>
+      <p15:sldGuideLst xmlns="" xmlns:p15="http://schemas.microsoft.com/office/powerpoint/2012/main"/>
     </p:ext>
   </p:extLst>
 </p:presentation>
@@ -5195,7 +5195,7 @@
           <a:blip r:embed="rId19">
             <a:extLst>
               <a:ext uri="{28A0092B-C50C-407E-A947-70E740481C1C}">
-                <a14:useLocalDpi xmlns:a14="http://schemas.microsoft.com/office/drawing/2010/main" xmlns="" val="0"/>
+                <a14:useLocalDpi xmlns="" xmlns:a14="http://schemas.microsoft.com/office/drawing/2010/main" val="0"/>
               </a:ext>
             </a:extLst>
           </a:blip>
@@ -5224,7 +5224,7 @@
           <a:blip r:embed="rId20">
             <a:extLst>
               <a:ext uri="{28A0092B-C50C-407E-A947-70E740481C1C}">
-                <a14:useLocalDpi xmlns:a14="http://schemas.microsoft.com/office/drawing/2010/main" xmlns="" val="0"/>
+                <a14:useLocalDpi xmlns="" xmlns:a14="http://schemas.microsoft.com/office/drawing/2010/main" val="0"/>
               </a:ext>
             </a:extLst>
           </a:blip>
@@ -5316,7 +5316,7 @@
           <a:blip r:embed="rId21">
             <a:extLst>
               <a:ext uri="{28A0092B-C50C-407E-A947-70E740481C1C}">
-                <a14:useLocalDpi xmlns:a14="http://schemas.microsoft.com/office/drawing/2010/main" xmlns="" val="0"/>
+                <a14:useLocalDpi xmlns="" xmlns:a14="http://schemas.microsoft.com/office/drawing/2010/main" val="0"/>
               </a:ext>
             </a:extLst>
           </a:blip>
@@ -5345,7 +5345,7 @@
           <a:blip r:embed="rId22">
             <a:extLst>
               <a:ext uri="{28A0092B-C50C-407E-A947-70E740481C1C}">
-                <a14:useLocalDpi xmlns:a14="http://schemas.microsoft.com/office/drawing/2010/main" xmlns="" val="0"/>
+                <a14:useLocalDpi xmlns="" xmlns:a14="http://schemas.microsoft.com/office/drawing/2010/main" val="0"/>
               </a:ext>
             </a:extLst>
           </a:blip>
@@ -6060,7 +6060,7 @@
           <p:cNvPr id="3" name="Subtitle 2">
             <a:extLst>
               <a:ext uri="{FF2B5EF4-FFF2-40B4-BE49-F238E27FC236}">
-                <a16:creationId xmlns:a16="http://schemas.microsoft.com/office/drawing/2014/main" xmlns="" id="{A5FC81A8-A395-4CD6-8FC6-F2AF2BB48DA3}"/>
+                <a16:creationId xmlns="" xmlns:a16="http://schemas.microsoft.com/office/drawing/2014/main" id="{A5FC81A8-A395-4CD6-8FC6-F2AF2BB48DA3}"/>
               </a:ext>
             </a:extLst>
           </p:cNvPr>
@@ -6096,7 +6096,7 @@
           <p:cNvPr id="5" name="Picture 4" descr="A close up of a device&#10;&#10;Description generated with high confidence">
             <a:extLst>
               <a:ext uri="{FF2B5EF4-FFF2-40B4-BE49-F238E27FC236}">
-                <a16:creationId xmlns:a16="http://schemas.microsoft.com/office/drawing/2014/main" xmlns="" id="{ACDC7692-D730-48DD-8A60-859B45DEB719}"/>
+                <a16:creationId xmlns="" xmlns:a16="http://schemas.microsoft.com/office/drawing/2014/main" id="{ACDC7692-D730-48DD-8A60-859B45DEB719}"/>
               </a:ext>
             </a:extLst>
           </p:cNvPr>
@@ -6124,7 +6124,7 @@
     </p:spTree>
     <p:extLst>
       <p:ext uri="{BB962C8B-B14F-4D97-AF65-F5344CB8AC3E}">
-        <p14:creationId xmlns:p14="http://schemas.microsoft.com/office/powerpoint/2010/main" xmlns="" val="3008839548"/>
+        <p14:creationId xmlns="" xmlns:p14="http://schemas.microsoft.com/office/powerpoint/2010/main" val="3008839548"/>
       </p:ext>
     </p:extLst>
   </p:cSld>
@@ -6156,7 +6156,7 @@
           <p:cNvPr id="4" name="Content Placeholder 2">
             <a:extLst>
               <a:ext uri="{FF2B5EF4-FFF2-40B4-BE49-F238E27FC236}">
-                <a16:creationId xmlns:a16="http://schemas.microsoft.com/office/drawing/2014/main" xmlns="" id="{9C239D31-D67C-4619-AD39-D9908B8AB357}"/>
+                <a16:creationId xmlns="" xmlns:a16="http://schemas.microsoft.com/office/drawing/2014/main" id="{9C239D31-D67C-4619-AD39-D9908B8AB357}"/>
               </a:ext>
             </a:extLst>
           </p:cNvPr>
@@ -6529,7 +6529,7 @@
     </p:spTree>
     <p:extLst>
       <p:ext uri="{BB962C8B-B14F-4D97-AF65-F5344CB8AC3E}">
-        <p14:creationId xmlns:p14="http://schemas.microsoft.com/office/powerpoint/2010/main" xmlns="" val="1877137906"/>
+        <p14:creationId xmlns="" xmlns:p14="http://schemas.microsoft.com/office/powerpoint/2010/main" val="1877137906"/>
       </p:ext>
     </p:extLst>
   </p:cSld>
@@ -6561,7 +6561,7 @@
           <p:cNvPr id="5" name="Content Placeholder 2">
             <a:extLst>
               <a:ext uri="{FF2B5EF4-FFF2-40B4-BE49-F238E27FC236}">
-                <a16:creationId xmlns:a16="http://schemas.microsoft.com/office/drawing/2014/main" xmlns="" id="{05CFF522-5AD6-462A-B38C-FCBC0AC012CC}"/>
+                <a16:creationId xmlns="" xmlns:a16="http://schemas.microsoft.com/office/drawing/2014/main" id="{05CFF522-5AD6-462A-B38C-FCBC0AC012CC}"/>
               </a:ext>
             </a:extLst>
           </p:cNvPr>
@@ -6952,7 +6952,7 @@
     </p:spTree>
     <p:extLst>
       <p:ext uri="{BB962C8B-B14F-4D97-AF65-F5344CB8AC3E}">
-        <p14:creationId xmlns:p14="http://schemas.microsoft.com/office/powerpoint/2010/main" xmlns="" val="1721690073"/>
+        <p14:creationId xmlns="" xmlns:p14="http://schemas.microsoft.com/office/powerpoint/2010/main" val="1721690073"/>
       </p:ext>
     </p:extLst>
   </p:cSld>
@@ -6984,7 +6984,7 @@
           <p:cNvPr id="4" name="Content Placeholder 2">
             <a:extLst>
               <a:ext uri="{FF2B5EF4-FFF2-40B4-BE49-F238E27FC236}">
-                <a16:creationId xmlns:a16="http://schemas.microsoft.com/office/drawing/2014/main" xmlns="" id="{5EFFA28E-55AF-48A9-A303-7569CEE02E08}"/>
+                <a16:creationId xmlns="" xmlns:a16="http://schemas.microsoft.com/office/drawing/2014/main" id="{5EFFA28E-55AF-48A9-A303-7569CEE02E08}"/>
               </a:ext>
             </a:extLst>
           </p:cNvPr>
@@ -7484,7 +7484,7 @@
     </p:spTree>
     <p:extLst>
       <p:ext uri="{BB962C8B-B14F-4D97-AF65-F5344CB8AC3E}">
-        <p14:creationId xmlns:p14="http://schemas.microsoft.com/office/powerpoint/2010/main" xmlns="" val="2173686961"/>
+        <p14:creationId xmlns="" xmlns:p14="http://schemas.microsoft.com/office/powerpoint/2010/main" val="2173686961"/>
       </p:ext>
     </p:extLst>
   </p:cSld>
@@ -7516,7 +7516,7 @@
           <p:cNvPr id="4" name="Content Placeholder 2">
             <a:extLst>
               <a:ext uri="{FF2B5EF4-FFF2-40B4-BE49-F238E27FC236}">
-                <a16:creationId xmlns:a16="http://schemas.microsoft.com/office/drawing/2014/main" xmlns="" id="{B6403606-01B7-45D1-81EE-F802CA04897B}"/>
+                <a16:creationId xmlns="" xmlns:a16="http://schemas.microsoft.com/office/drawing/2014/main" id="{B6403606-01B7-45D1-81EE-F802CA04897B}"/>
               </a:ext>
             </a:extLst>
           </p:cNvPr>
@@ -7865,7 +7865,7 @@
     </p:spTree>
     <p:extLst>
       <p:ext uri="{BB962C8B-B14F-4D97-AF65-F5344CB8AC3E}">
-        <p14:creationId xmlns:p14="http://schemas.microsoft.com/office/powerpoint/2010/main" xmlns="" val="2174073728"/>
+        <p14:creationId xmlns="" xmlns:p14="http://schemas.microsoft.com/office/powerpoint/2010/main" val="2174073728"/>
       </p:ext>
     </p:extLst>
   </p:cSld>
@@ -7897,7 +7897,7 @@
           <p:cNvPr id="4" name="Content Placeholder 2">
             <a:extLst>
               <a:ext uri="{FF2B5EF4-FFF2-40B4-BE49-F238E27FC236}">
-                <a16:creationId xmlns:a16="http://schemas.microsoft.com/office/drawing/2014/main" xmlns="" id="{2910983C-776A-4B8D-A86F-8E751890271C}"/>
+                <a16:creationId xmlns="" xmlns:a16="http://schemas.microsoft.com/office/drawing/2014/main" id="{2910983C-776A-4B8D-A86F-8E751890271C}"/>
               </a:ext>
             </a:extLst>
           </p:cNvPr>
@@ -8295,7 +8295,7 @@
     </p:spTree>
     <p:extLst>
       <p:ext uri="{BB962C8B-B14F-4D97-AF65-F5344CB8AC3E}">
-        <p14:creationId xmlns:p14="http://schemas.microsoft.com/office/powerpoint/2010/main" xmlns="" val="1315464262"/>
+        <p14:creationId xmlns="" xmlns:p14="http://schemas.microsoft.com/office/powerpoint/2010/main" val="1315464262"/>
       </p:ext>
     </p:extLst>
   </p:cSld>
@@ -8327,7 +8327,7 @@
           <p:cNvPr id="2" name="Title 1">
             <a:extLst>
               <a:ext uri="{FF2B5EF4-FFF2-40B4-BE49-F238E27FC236}">
-                <a16:creationId xmlns:a16="http://schemas.microsoft.com/office/drawing/2014/main" xmlns="" id="{717EF8A5-63C4-42CA-9B3C-C33842F996EA}"/>
+                <a16:creationId xmlns="" xmlns:a16="http://schemas.microsoft.com/office/drawing/2014/main" id="{717EF8A5-63C4-42CA-9B3C-C33842F996EA}"/>
               </a:ext>
             </a:extLst>
           </p:cNvPr>
@@ -8368,7 +8368,7 @@
           <p:cNvPr id="3" name="Content Placeholder 2">
             <a:extLst>
               <a:ext uri="{FF2B5EF4-FFF2-40B4-BE49-F238E27FC236}">
-                <a16:creationId xmlns:a16="http://schemas.microsoft.com/office/drawing/2014/main" xmlns="" id="{AE36E492-372A-4B96-9166-76D5E4C8287E}"/>
+                <a16:creationId xmlns="" xmlns:a16="http://schemas.microsoft.com/office/drawing/2014/main" id="{AE36E492-372A-4B96-9166-76D5E4C8287E}"/>
               </a:ext>
             </a:extLst>
           </p:cNvPr>
@@ -8453,7 +8453,7 @@
           <p:cNvPr id="7" name="Picture 6" descr="A close up of a sign&#10;&#10;Description generated with high confidence">
             <a:extLst>
               <a:ext uri="{FF2B5EF4-FFF2-40B4-BE49-F238E27FC236}">
-                <a16:creationId xmlns:a16="http://schemas.microsoft.com/office/drawing/2014/main" xmlns="" id="{C8CE9474-AF42-4D51-A58D-1E4A459330A4}"/>
+                <a16:creationId xmlns="" xmlns:a16="http://schemas.microsoft.com/office/drawing/2014/main" id="{C8CE9474-AF42-4D51-A58D-1E4A459330A4}"/>
               </a:ext>
             </a:extLst>
           </p:cNvPr>
@@ -8481,7 +8481,7 @@
     </p:spTree>
     <p:extLst>
       <p:ext uri="{BB962C8B-B14F-4D97-AF65-F5344CB8AC3E}">
-        <p14:creationId xmlns:p14="http://schemas.microsoft.com/office/powerpoint/2010/main" xmlns="" val="780514042"/>
+        <p14:creationId xmlns="" xmlns:p14="http://schemas.microsoft.com/office/powerpoint/2010/main" val="780514042"/>
       </p:ext>
     </p:extLst>
   </p:cSld>
@@ -8513,7 +8513,7 @@
           <p:cNvPr id="2" name="Title 1">
             <a:extLst>
               <a:ext uri="{FF2B5EF4-FFF2-40B4-BE49-F238E27FC236}">
-                <a16:creationId xmlns:a16="http://schemas.microsoft.com/office/drawing/2014/main" xmlns="" id="{C3DE2F59-DB94-4345-B978-4370435C8CFE}"/>
+                <a16:creationId xmlns="" xmlns:a16="http://schemas.microsoft.com/office/drawing/2014/main" id="{C3DE2F59-DB94-4345-B978-4370435C8CFE}"/>
               </a:ext>
             </a:extLst>
           </p:cNvPr>
@@ -8541,7 +8541,7 @@
           <p:cNvPr id="4" name="Table 3">
             <a:extLst>
               <a:ext uri="{FF2B5EF4-FFF2-40B4-BE49-F238E27FC236}">
-                <a16:creationId xmlns:a16="http://schemas.microsoft.com/office/drawing/2014/main" xmlns="" id="{1E5FB244-06A5-48D1-8F6E-10E31088749A}"/>
+                <a16:creationId xmlns="" xmlns:a16="http://schemas.microsoft.com/office/drawing/2014/main" id="{1E5FB244-06A5-48D1-8F6E-10E31088749A}"/>
               </a:ext>
             </a:extLst>
           </p:cNvPr>
@@ -8551,7 +8551,7 @@
           <p:nvPr>
             <p:extLst>
               <p:ext uri="{D42A27DB-BD31-4B8C-83A1-F6EECF244321}">
-                <p14:modId xmlns:p14="http://schemas.microsoft.com/office/powerpoint/2010/main" xmlns="" val="140797090"/>
+                <p14:modId xmlns="" xmlns:p14="http://schemas.microsoft.com/office/powerpoint/2010/main" val="140797090"/>
               </p:ext>
             </p:extLst>
           </p:nvPr>
@@ -8570,28 +8570,28 @@
                 <a:gridCol w="2454672">
                   <a:extLst>
                     <a:ext uri="{9D8B030D-6E8A-4147-A177-3AD203B41FA5}">
-                      <a16:colId xmlns:a16="http://schemas.microsoft.com/office/drawing/2014/main" xmlns="" val="2686735304"/>
+                      <a16:colId xmlns="" xmlns:a16="http://schemas.microsoft.com/office/drawing/2014/main" val="2686735304"/>
                     </a:ext>
                   </a:extLst>
                 </a:gridCol>
                 <a:gridCol w="2454672">
                   <a:extLst>
                     <a:ext uri="{9D8B030D-6E8A-4147-A177-3AD203B41FA5}">
-                      <a16:colId xmlns:a16="http://schemas.microsoft.com/office/drawing/2014/main" xmlns="" val="2738445259"/>
+                      <a16:colId xmlns="" xmlns:a16="http://schemas.microsoft.com/office/drawing/2014/main" val="2738445259"/>
                     </a:ext>
                   </a:extLst>
                 </a:gridCol>
                 <a:gridCol w="2454672">
                   <a:extLst>
                     <a:ext uri="{9D8B030D-6E8A-4147-A177-3AD203B41FA5}">
-                      <a16:colId xmlns:a16="http://schemas.microsoft.com/office/drawing/2014/main" xmlns="" val="2988021207"/>
+                      <a16:colId xmlns="" xmlns:a16="http://schemas.microsoft.com/office/drawing/2014/main" val="2988021207"/>
                     </a:ext>
                   </a:extLst>
                 </a:gridCol>
                 <a:gridCol w="2454672">
                   <a:extLst>
                     <a:ext uri="{9D8B030D-6E8A-4147-A177-3AD203B41FA5}">
-                      <a16:colId xmlns:a16="http://schemas.microsoft.com/office/drawing/2014/main" xmlns="" val="2790341670"/>
+                      <a16:colId xmlns="" xmlns:a16="http://schemas.microsoft.com/office/drawing/2014/main" val="2790341670"/>
                     </a:ext>
                   </a:extLst>
                 </a:gridCol>
@@ -8660,7 +8660,7 @@
                 </a:tc>
                 <a:extLst>
                   <a:ext uri="{0D108BD9-81ED-4DB2-BD59-A6C34878D82A}">
-                    <a16:rowId xmlns:a16="http://schemas.microsoft.com/office/drawing/2014/main" xmlns="" val="1841192602"/>
+                    <a16:rowId xmlns="" xmlns:a16="http://schemas.microsoft.com/office/drawing/2014/main" val="1841192602"/>
                   </a:ext>
                 </a:extLst>
               </a:tr>
@@ -8736,7 +8736,7 @@
                 </a:tc>
                 <a:extLst>
                   <a:ext uri="{0D108BD9-81ED-4DB2-BD59-A6C34878D82A}">
-                    <a16:rowId xmlns:a16="http://schemas.microsoft.com/office/drawing/2014/main" xmlns="" val="952059657"/>
+                    <a16:rowId xmlns="" xmlns:a16="http://schemas.microsoft.com/office/drawing/2014/main" val="952059657"/>
                   </a:ext>
                 </a:extLst>
               </a:tr>
@@ -8820,7 +8820,7 @@
                 </a:tc>
                 <a:extLst>
                   <a:ext uri="{0D108BD9-81ED-4DB2-BD59-A6C34878D82A}">
-                    <a16:rowId xmlns:a16="http://schemas.microsoft.com/office/drawing/2014/main" xmlns="" val="1234601518"/>
+                    <a16:rowId xmlns="" xmlns:a16="http://schemas.microsoft.com/office/drawing/2014/main" val="1234601518"/>
                   </a:ext>
                 </a:extLst>
               </a:tr>
@@ -8906,7 +8906,7 @@
                 </a:tc>
                 <a:extLst>
                   <a:ext uri="{0D108BD9-81ED-4DB2-BD59-A6C34878D82A}">
-                    <a16:rowId xmlns:a16="http://schemas.microsoft.com/office/drawing/2014/main" xmlns="" val="3033431834"/>
+                    <a16:rowId xmlns="" xmlns:a16="http://schemas.microsoft.com/office/drawing/2014/main" val="3033431834"/>
                   </a:ext>
                 </a:extLst>
               </a:tr>
@@ -8919,7 +8919,7 @@
           <p:cNvPr id="6" name="Picture 5" descr="A picture containing object, indoor&#10;&#10;Description generated with high confidence">
             <a:extLst>
               <a:ext uri="{FF2B5EF4-FFF2-40B4-BE49-F238E27FC236}">
-                <a16:creationId xmlns:a16="http://schemas.microsoft.com/office/drawing/2014/main" xmlns="" id="{7527D287-D6FA-4670-95CB-B20A0B0625D5}"/>
+                <a16:creationId xmlns="" xmlns:a16="http://schemas.microsoft.com/office/drawing/2014/main" id="{7527D287-D6FA-4670-95CB-B20A0B0625D5}"/>
               </a:ext>
             </a:extLst>
           </p:cNvPr>
@@ -8949,7 +8949,7 @@
           <p:cNvPr id="8" name="Picture 7" descr="Screen of a cell phone&#10;&#10;Description generated with very high confidence">
             <a:extLst>
               <a:ext uri="{FF2B5EF4-FFF2-40B4-BE49-F238E27FC236}">
-                <a16:creationId xmlns:a16="http://schemas.microsoft.com/office/drawing/2014/main" xmlns="" id="{420722F3-5DBE-4FEE-9B8E-365831FDD3B1}"/>
+                <a16:creationId xmlns="" xmlns:a16="http://schemas.microsoft.com/office/drawing/2014/main" id="{420722F3-5DBE-4FEE-9B8E-365831FDD3B1}"/>
               </a:ext>
             </a:extLst>
           </p:cNvPr>
@@ -8979,7 +8979,7 @@
           <p:cNvPr id="9" name="Picture 8" descr="A close up of a device&#10;&#10;Description generated with high confidence">
             <a:extLst>
               <a:ext uri="{FF2B5EF4-FFF2-40B4-BE49-F238E27FC236}">
-                <a16:creationId xmlns:a16="http://schemas.microsoft.com/office/drawing/2014/main" xmlns="" id="{CE16D1CE-BA39-48CF-BA6B-4A4C4006CD89}"/>
+                <a16:creationId xmlns="" xmlns:a16="http://schemas.microsoft.com/office/drawing/2014/main" id="{CE16D1CE-BA39-48CF-BA6B-4A4C4006CD89}"/>
               </a:ext>
             </a:extLst>
           </p:cNvPr>
@@ -9006,7 +9006,7 @@
     </p:spTree>
     <p:extLst>
       <p:ext uri="{BB962C8B-B14F-4D97-AF65-F5344CB8AC3E}">
-        <p14:creationId xmlns:p14="http://schemas.microsoft.com/office/powerpoint/2010/main" xmlns="" val="3060915881"/>
+        <p14:creationId xmlns="" xmlns:p14="http://schemas.microsoft.com/office/powerpoint/2010/main" val="3060915881"/>
       </p:ext>
     </p:extLst>
   </p:cSld>
@@ -9038,7 +9038,7 @@
           <p:cNvPr id="2" name="Title 1">
             <a:extLst>
               <a:ext uri="{FF2B5EF4-FFF2-40B4-BE49-F238E27FC236}">
-                <a16:creationId xmlns:a16="http://schemas.microsoft.com/office/drawing/2014/main" xmlns="" id="{920DD001-66B0-4738-B3C3-600B82C53CAC}"/>
+                <a16:creationId xmlns="" xmlns:a16="http://schemas.microsoft.com/office/drawing/2014/main" id="{920DD001-66B0-4738-B3C3-600B82C53CAC}"/>
               </a:ext>
             </a:extLst>
           </p:cNvPr>
@@ -9066,7 +9066,7 @@
           <p:cNvPr id="5" name="Picture 4" descr="A close up of a map&#10;&#10;Description generated with high confidence">
             <a:extLst>
               <a:ext uri="{FF2B5EF4-FFF2-40B4-BE49-F238E27FC236}">
-                <a16:creationId xmlns:a16="http://schemas.microsoft.com/office/drawing/2014/main" xmlns="" id="{744BC207-AF1D-4B03-98B4-9FE6FB860B3F}"/>
+                <a16:creationId xmlns="" xmlns:a16="http://schemas.microsoft.com/office/drawing/2014/main" id="{744BC207-AF1D-4B03-98B4-9FE6FB860B3F}"/>
               </a:ext>
             </a:extLst>
           </p:cNvPr>
@@ -9094,7 +9094,7 @@
     </p:spTree>
     <p:extLst>
       <p:ext uri="{BB962C8B-B14F-4D97-AF65-F5344CB8AC3E}">
-        <p14:creationId xmlns:p14="http://schemas.microsoft.com/office/powerpoint/2010/main" xmlns="" val="782323404"/>
+        <p14:creationId xmlns="" xmlns:p14="http://schemas.microsoft.com/office/powerpoint/2010/main" val="782323404"/>
       </p:ext>
     </p:extLst>
   </p:cSld>
@@ -9126,7 +9126,7 @@
           <p:cNvPr id="2" name="Title 1">
             <a:extLst>
               <a:ext uri="{FF2B5EF4-FFF2-40B4-BE49-F238E27FC236}">
-                <a16:creationId xmlns:a16="http://schemas.microsoft.com/office/drawing/2014/main" xmlns="" id="{ED7C249C-015A-4F6D-BCF6-8E4DECDAE822}"/>
+                <a16:creationId xmlns="" xmlns:a16="http://schemas.microsoft.com/office/drawing/2014/main" id="{ED7C249C-015A-4F6D-BCF6-8E4DECDAE822}"/>
               </a:ext>
             </a:extLst>
           </p:cNvPr>
@@ -9280,7 +9280,7 @@
     </p:spTree>
     <p:extLst>
       <p:ext uri="{BB962C8B-B14F-4D97-AF65-F5344CB8AC3E}">
-        <p14:creationId xmlns:p14="http://schemas.microsoft.com/office/powerpoint/2010/main" xmlns="" val="1038964542"/>
+        <p14:creationId xmlns="" xmlns:p14="http://schemas.microsoft.com/office/powerpoint/2010/main" val="1038964542"/>
       </p:ext>
     </p:extLst>
   </p:cSld>
@@ -9312,7 +9312,7 @@
           <p:cNvPr id="2" name="Title 1">
             <a:extLst>
               <a:ext uri="{FF2B5EF4-FFF2-40B4-BE49-F238E27FC236}">
-                <a16:creationId xmlns:a16="http://schemas.microsoft.com/office/drawing/2014/main" xmlns="" id="{2C195901-8E73-4C81-9A6C-E7E7AE9C3D44}"/>
+                <a16:creationId xmlns="" xmlns:a16="http://schemas.microsoft.com/office/drawing/2014/main" id="{2C195901-8E73-4C81-9A6C-E7E7AE9C3D44}"/>
               </a:ext>
             </a:extLst>
           </p:cNvPr>
@@ -9340,7 +9340,7 @@
           <p:cNvPr id="3" name="Content Placeholder 2">
             <a:extLst>
               <a:ext uri="{FF2B5EF4-FFF2-40B4-BE49-F238E27FC236}">
-                <a16:creationId xmlns:a16="http://schemas.microsoft.com/office/drawing/2014/main" xmlns="" id="{F8EE1CF2-99E4-4199-8E1D-9D7B9EC2263B}"/>
+                <a16:creationId xmlns="" xmlns:a16="http://schemas.microsoft.com/office/drawing/2014/main" id="{F8EE1CF2-99E4-4199-8E1D-9D7B9EC2263B}"/>
               </a:ext>
             </a:extLst>
           </p:cNvPr>
@@ -9351,19 +9351,261 @@
             <p:ph idx="1"/>
           </p:nvPr>
         </p:nvSpPr>
-        <p:spPr/>
-        <p:txBody>
-          <a:bodyPr/>
+        <p:spPr>
+          <a:xfrm>
+            <a:off x="538385" y="1222050"/>
+            <a:ext cx="10323319" cy="5026350"/>
+          </a:xfrm>
+        </p:spPr>
+        <p:txBody>
+          <a:bodyPr>
+            <a:normAutofit fontScale="85000" lnSpcReduction="10000"/>
+          </a:bodyPr>
           <a:lstStyle/>
           <a:p>
-            <a:endParaRPr lang="en-US"/>
+            <a:r>
+              <a:rPr lang="en-US" dirty="0" smtClean="0"/>
+              <a:t>employee(</a:t>
+            </a:r>
+            <a:r>
+              <a:rPr lang="en-US" u="sng" dirty="0" err="1" smtClean="0"/>
+              <a:t>EMPID</a:t>
+            </a:r>
+            <a:r>
+              <a:rPr lang="en-US" dirty="0" err="1" smtClean="0"/>
+              <a:t>,TicketID,fname,lname</a:t>
+            </a:r>
+            <a:r>
+              <a:rPr lang="en-US" dirty="0" smtClean="0"/>
+              <a:t>)</a:t>
+            </a:r>
+          </a:p>
+          <a:p>
+            <a:pPr lvl="1"/>
+            <a:r>
+              <a:rPr lang="en-US" dirty="0" smtClean="0"/>
+              <a:t>2NF</a:t>
+            </a:r>
+          </a:p>
+          <a:p>
+            <a:pPr lvl="1"/>
+            <a:r>
+              <a:rPr lang="en-US" dirty="0" smtClean="0"/>
+              <a:t>Candidate keys: EMPID, </a:t>
+            </a:r>
+            <a:r>
+              <a:rPr lang="en-US" dirty="0" err="1" smtClean="0"/>
+              <a:t>TicketID</a:t>
+            </a:r>
+            <a:endParaRPr lang="en-US" dirty="0" smtClean="0"/>
+          </a:p>
+          <a:p>
+            <a:pPr lvl="1"/>
+            <a:r>
+              <a:rPr lang="en-US" dirty="0" smtClean="0"/>
+              <a:t>Functional dependency (EMPID-&gt;</a:t>
+            </a:r>
+            <a:r>
+              <a:rPr lang="en-US" dirty="0" err="1" smtClean="0"/>
+              <a:t>fname,lname</a:t>
+            </a:r>
+            <a:r>
+              <a:rPr lang="en-US" dirty="0" smtClean="0"/>
+              <a:t>)</a:t>
+            </a:r>
+          </a:p>
+          <a:p>
+            <a:pPr lvl="1"/>
+            <a:r>
+              <a:rPr lang="en-US" dirty="0" smtClean="0"/>
+              <a:t>Functional dependency (</a:t>
+            </a:r>
+            <a:r>
+              <a:rPr lang="en-US" dirty="0" err="1" smtClean="0"/>
+              <a:t>TicketID</a:t>
+            </a:r>
+            <a:r>
+              <a:rPr lang="en-US" dirty="0" smtClean="0"/>
+              <a:t>-&gt;EMPID)</a:t>
+            </a:r>
+          </a:p>
+          <a:p>
+            <a:r>
+              <a:rPr lang="en-US" dirty="0" smtClean="0"/>
+              <a:t>device(</a:t>
+            </a:r>
+            <a:r>
+              <a:rPr lang="en-US" dirty="0" err="1" smtClean="0"/>
+              <a:t>Make,Model,Damaged,</a:t>
+            </a:r>
+            <a:r>
+              <a:rPr lang="en-US" u="sng" dirty="0" err="1" smtClean="0"/>
+              <a:t>Serial_Number</a:t>
+            </a:r>
+            <a:r>
+              <a:rPr lang="en-US" u="sng" dirty="0" smtClean="0"/>
+              <a:t>,</a:t>
+            </a:r>
+            <a:r>
+              <a:rPr lang="en-US" dirty="0" smtClean="0"/>
+              <a:t> </a:t>
+            </a:r>
+            <a:r>
+              <a:rPr lang="en-US" dirty="0" err="1" smtClean="0"/>
+              <a:t>Ticket_ID</a:t>
+            </a:r>
+            <a:r>
+              <a:rPr lang="en-US" dirty="0" smtClean="0"/>
+              <a:t>)</a:t>
+            </a:r>
+          </a:p>
+          <a:p>
+            <a:pPr lvl="1"/>
+            <a:r>
+              <a:rPr lang="en-US" dirty="0" smtClean="0"/>
+              <a:t>BCNF</a:t>
+            </a:r>
+          </a:p>
+          <a:p>
+            <a:pPr lvl="1"/>
+            <a:r>
+              <a:rPr lang="en-US" dirty="0" smtClean="0"/>
+              <a:t>Candidate keys: </a:t>
+            </a:r>
+            <a:r>
+              <a:rPr lang="en-US" dirty="0" err="1" smtClean="0"/>
+              <a:t>Serial_Number</a:t>
+            </a:r>
+            <a:endParaRPr lang="en-US" dirty="0" smtClean="0"/>
+          </a:p>
+          <a:p>
+            <a:pPr lvl="1"/>
+            <a:r>
+              <a:rPr lang="en-US" dirty="0" smtClean="0"/>
+              <a:t>Functional dependency device(</a:t>
+            </a:r>
+            <a:r>
+              <a:rPr lang="en-US" dirty="0" err="1" smtClean="0"/>
+              <a:t>Serial_Number</a:t>
+            </a:r>
+            <a:r>
+              <a:rPr lang="en-US" dirty="0" smtClean="0"/>
+              <a:t> -&gt;Make, Model, Damaged, </a:t>
+            </a:r>
+            <a:r>
+              <a:rPr lang="en-US" dirty="0" err="1" smtClean="0"/>
+              <a:t>Ticket_ID</a:t>
+            </a:r>
+            <a:r>
+              <a:rPr lang="en-US" dirty="0" smtClean="0"/>
+              <a:t>)</a:t>
+            </a:r>
+          </a:p>
+          <a:p>
+            <a:endParaRPr lang="en-US" dirty="0" smtClean="0"/>
+          </a:p>
+          <a:p>
+            <a:r>
+              <a:rPr lang="en-US" dirty="0" smtClean="0"/>
+              <a:t>customer(Fname,Lname,</a:t>
+            </a:r>
+            <a:r>
+              <a:rPr lang="en-US" u="sng" dirty="0" smtClean="0"/>
+              <a:t>CellNum</a:t>
+            </a:r>
+            <a:r>
+              <a:rPr lang="en-US" dirty="0" smtClean="0"/>
+              <a:t>,Email,NotifyFreq,ReasonForVisit,TicketID,Preference</a:t>
+            </a:r>
+            <a:r>
+              <a:rPr lang="en-US" dirty="0" smtClean="0"/>
+              <a:t>) </a:t>
+            </a:r>
+          </a:p>
+          <a:p>
+            <a:pPr lvl="1"/>
+            <a:r>
+              <a:rPr lang="en-US" dirty="0" smtClean="0"/>
+              <a:t>BCNF</a:t>
+            </a:r>
+          </a:p>
+          <a:p>
+            <a:pPr lvl="1"/>
+            <a:r>
+              <a:rPr lang="en-US" dirty="0" smtClean="0"/>
+              <a:t>Candidate keys: </a:t>
+            </a:r>
+            <a:r>
+              <a:rPr lang="en-US" dirty="0" err="1" smtClean="0"/>
+              <a:t>CellNum</a:t>
+            </a:r>
+            <a:r>
+              <a:rPr lang="en-US" dirty="0" smtClean="0"/>
+              <a:t> </a:t>
+            </a:r>
+          </a:p>
+          <a:p>
+            <a:pPr lvl="1"/>
+            <a:r>
+              <a:rPr lang="en-US" dirty="0" smtClean="0"/>
+              <a:t>Functional dependency (</a:t>
+            </a:r>
+            <a:r>
+              <a:rPr lang="en-US" dirty="0" err="1" smtClean="0"/>
+              <a:t>CellNum</a:t>
+            </a:r>
+            <a:r>
+              <a:rPr lang="en-US" dirty="0" smtClean="0"/>
+              <a:t> -&gt;</a:t>
+            </a:r>
+            <a:r>
+              <a:rPr lang="en-US" dirty="0" err="1" smtClean="0"/>
+              <a:t>Fname</a:t>
+            </a:r>
+            <a:r>
+              <a:rPr lang="en-US" dirty="0" smtClean="0"/>
+              <a:t>, </a:t>
+            </a:r>
+            <a:r>
+              <a:rPr lang="en-US" dirty="0" err="1" smtClean="0"/>
+              <a:t>Lname</a:t>
+            </a:r>
+            <a:r>
+              <a:rPr lang="en-US" dirty="0" smtClean="0"/>
+              <a:t>, Email, </a:t>
+            </a:r>
+            <a:r>
+              <a:rPr lang="en-US" dirty="0" err="1" smtClean="0"/>
+              <a:t>NotifyFreq</a:t>
+            </a:r>
+            <a:r>
+              <a:rPr lang="en-US" dirty="0" smtClean="0"/>
+              <a:t>, </a:t>
+            </a:r>
+            <a:r>
+              <a:rPr lang="en-US" dirty="0" err="1" smtClean="0"/>
+              <a:t>ReasonForVisit</a:t>
+            </a:r>
+            <a:r>
+              <a:rPr lang="en-US" dirty="0" smtClean="0"/>
+              <a:t>, </a:t>
+            </a:r>
+            <a:r>
+              <a:rPr lang="en-US" dirty="0" err="1" smtClean="0"/>
+              <a:t>TicketID</a:t>
+            </a:r>
+            <a:r>
+              <a:rPr lang="en-US" dirty="0" smtClean="0"/>
+              <a:t>, Preference)</a:t>
+            </a:r>
+            <a:endParaRPr lang="en-US" dirty="0"/>
           </a:p>
         </p:txBody>
       </p:sp>
     </p:spTree>
     <p:extLst>
       <p:ext uri="{BB962C8B-B14F-4D97-AF65-F5344CB8AC3E}">
-        <p14:creationId xmlns:p14="http://schemas.microsoft.com/office/powerpoint/2010/main" xmlns="" val="2186844450"/>
+        <p14:creationId xmlns="" xmlns:p14="http://schemas.microsoft.com/office/powerpoint/2010/main" val="2186844450"/>
       </p:ext>
     </p:extLst>
   </p:cSld>
@@ -9395,7 +9637,7 @@
           <p:cNvPr id="2" name="Title 1">
             <a:extLst>
               <a:ext uri="{FF2B5EF4-FFF2-40B4-BE49-F238E27FC236}">
-                <a16:creationId xmlns:a16="http://schemas.microsoft.com/office/drawing/2014/main" xmlns="" id="{BAE5D6E3-3E7E-4BC7-8CBA-F50D106673B6}"/>
+                <a16:creationId xmlns="" xmlns:a16="http://schemas.microsoft.com/office/drawing/2014/main" id="{BAE5D6E3-3E7E-4BC7-8CBA-F50D106673B6}"/>
               </a:ext>
             </a:extLst>
           </p:cNvPr>
@@ -9423,7 +9665,7 @@
           <p:cNvPr id="3" name="Content Placeholder 2">
             <a:extLst>
               <a:ext uri="{FF2B5EF4-FFF2-40B4-BE49-F238E27FC236}">
-                <a16:creationId xmlns:a16="http://schemas.microsoft.com/office/drawing/2014/main" xmlns="" id="{2D9412E7-40EA-48F1-B99B-C4887C820B18}"/>
+                <a16:creationId xmlns="" xmlns:a16="http://schemas.microsoft.com/office/drawing/2014/main" id="{2D9412E7-40EA-48F1-B99B-C4887C820B18}"/>
               </a:ext>
             </a:extLst>
           </p:cNvPr>
@@ -9467,7 +9709,7 @@
     </p:spTree>
     <p:extLst>
       <p:ext uri="{BB962C8B-B14F-4D97-AF65-F5344CB8AC3E}">
-        <p14:creationId xmlns:p14="http://schemas.microsoft.com/office/powerpoint/2010/main" xmlns="" val="3396665767"/>
+        <p14:creationId xmlns="" xmlns:p14="http://schemas.microsoft.com/office/powerpoint/2010/main" val="3396665767"/>
       </p:ext>
     </p:extLst>
   </p:cSld>
@@ -9499,7 +9741,7 @@
           <p:cNvPr id="2" name="Title 1">
             <a:extLst>
               <a:ext uri="{FF2B5EF4-FFF2-40B4-BE49-F238E27FC236}">
-                <a16:creationId xmlns:a16="http://schemas.microsoft.com/office/drawing/2014/main" xmlns="" id="{5AED2544-F0DD-4A83-A091-96832E613A0B}"/>
+                <a16:creationId xmlns="" xmlns:a16="http://schemas.microsoft.com/office/drawing/2014/main" id="{5AED2544-F0DD-4A83-A091-96832E613A0B}"/>
               </a:ext>
             </a:extLst>
           </p:cNvPr>
@@ -9527,7 +9769,7 @@
           <p:cNvPr id="3" name="Content Placeholder 2">
             <a:extLst>
               <a:ext uri="{FF2B5EF4-FFF2-40B4-BE49-F238E27FC236}">
-                <a16:creationId xmlns:a16="http://schemas.microsoft.com/office/drawing/2014/main" xmlns="" id="{E6024858-89E4-46CC-82EC-E547AF361C99}"/>
+                <a16:creationId xmlns="" xmlns:a16="http://schemas.microsoft.com/office/drawing/2014/main" id="{E6024858-89E4-46CC-82EC-E547AF361C99}"/>
               </a:ext>
             </a:extLst>
           </p:cNvPr>
@@ -9550,7 +9792,7 @@
     </p:spTree>
     <p:extLst>
       <p:ext uri="{BB962C8B-B14F-4D97-AF65-F5344CB8AC3E}">
-        <p14:creationId xmlns:p14="http://schemas.microsoft.com/office/powerpoint/2010/main" xmlns="" val="2146869905"/>
+        <p14:creationId xmlns="" xmlns:p14="http://schemas.microsoft.com/office/powerpoint/2010/main" val="2146869905"/>
       </p:ext>
     </p:extLst>
   </p:cSld>
@@ -9582,7 +9824,7 @@
           <p:cNvPr id="2" name="Title 1">
             <a:extLst>
               <a:ext uri="{FF2B5EF4-FFF2-40B4-BE49-F238E27FC236}">
-                <a16:creationId xmlns:a16="http://schemas.microsoft.com/office/drawing/2014/main" xmlns="" id="{6BF6E7D9-FC10-4A65-ADE5-25E3F943B3F0}"/>
+                <a16:creationId xmlns="" xmlns:a16="http://schemas.microsoft.com/office/drawing/2014/main" id="{6BF6E7D9-FC10-4A65-ADE5-25E3F943B3F0}"/>
               </a:ext>
             </a:extLst>
           </p:cNvPr>
@@ -9613,7 +9855,7 @@
     </p:spTree>
     <p:extLst>
       <p:ext uri="{BB962C8B-B14F-4D97-AF65-F5344CB8AC3E}">
-        <p14:creationId xmlns:p14="http://schemas.microsoft.com/office/powerpoint/2010/main" xmlns="" val="1941153022"/>
+        <p14:creationId xmlns="" xmlns:p14="http://schemas.microsoft.com/office/powerpoint/2010/main" val="1941153022"/>
       </p:ext>
     </p:extLst>
   </p:cSld>
@@ -9883,7 +10125,7 @@
   <a:extraClrSchemeLst/>
   <a:extLst>
     <a:ext uri="{05A4C25C-085E-4340-85A3-A5531E510DB2}">
-      <thm15:themeFamily xmlns:thm15="http://schemas.microsoft.com/office/thememl/2012/main" xmlns="" name="Ion" id="{B8441ADB-2E43-4AF7-B97A-BD870242C6A8}" vid="{292E63A9-BB86-4E3D-B92A-7223C6510D2E}"/>
+      <thm15:themeFamily xmlns="" xmlns:thm15="http://schemas.microsoft.com/office/thememl/2012/main" name="Ion" id="{B8441ADB-2E43-4AF7-B97A-BD870242C6A8}" vid="{292E63A9-BB86-4E3D-B92A-7223C6510D2E}"/>
     </a:ext>
   </a:extLst>
 </a:theme>

</xml_diff>